<commit_message>
Idk what I did but I commit anyway
</commit_message>
<xml_diff>
--- a/BigDataProject presentation.pptx
+++ b/BigDataProject presentation.pptx
@@ -6,6 +6,9 @@
   </p:sldMasterIdLst>
   <p:sldIdLst>
     <p:sldId id="256" r:id="rId2"/>
+    <p:sldId id="257" r:id="rId3"/>
+    <p:sldId id="258" r:id="rId4"/>
+    <p:sldId id="259" r:id="rId5"/>
   </p:sldIdLst>
   <p:sldSz cx="12192000" cy="6858000"/>
   <p:notesSz cx="6858000" cy="9144000"/>
@@ -104,13 +107,18 @@
       </a:defRPr>
     </a:lvl9pPr>
   </p:defaultTextStyle>
+  <p:extLst>
+    <p:ext uri="{EFAFB233-063F-42B5-8137-9DF3F51BA10A}">
+      <p15:sldGuideLst xmlns:p15="http://schemas.microsoft.com/office/powerpoint/2012/main"/>
+    </p:ext>
+  </p:extLst>
 </p:presentation>
 </file>
 
 <file path=ppt/revisionInfo.xml><?xml version="1.0" encoding="utf-8"?>
 <p1510:revInfo xmlns:a="http://schemas.openxmlformats.org/drawingml/2006/main" xmlns:r="http://schemas.openxmlformats.org/officeDocument/2006/relationships" xmlns:p1510="http://schemas.microsoft.com/office/powerpoint/2015/10/main">
   <p1510:revLst>
-    <p1510:client id="{26A4DA2E-3B26-4A19-981B-FA4B6FD33F58}" v="5" dt="2023-09-20T11:40:20.233"/>
+    <p1510:client id="{26A4DA2E-3B26-4A19-981B-FA4B6FD33F58}" v="17" dt="2023-09-26T09:44:08.598"/>
   </p1510:revLst>
 </p1510:revInfo>
 </file>
@@ -120,18 +128,18 @@
   <pc:docChgLst>
     <pc:chgData name="Roy Liu" userId="755465ea-a681-4840-afaf-3106d4ded39d" providerId="ADAL" clId="{26A4DA2E-3B26-4A19-981B-FA4B6FD33F58}"/>
     <pc:docChg chg="undo custSel addSld modSld addMainMaster delMainMaster">
-      <pc:chgData name="Roy Liu" userId="755465ea-a681-4840-afaf-3106d4ded39d" providerId="ADAL" clId="{26A4DA2E-3B26-4A19-981B-FA4B6FD33F58}" dt="2023-09-20T11:40:20.233" v="154"/>
+      <pc:chgData name="Roy Liu" userId="755465ea-a681-4840-afaf-3106d4ded39d" providerId="ADAL" clId="{26A4DA2E-3B26-4A19-981B-FA4B6FD33F58}" dt="2023-09-26T09:44:02.538" v="257" actId="20577"/>
       <pc:docMkLst>
         <pc:docMk/>
       </pc:docMkLst>
       <pc:sldChg chg="addSp delSp modSp new mod modTransition modMedia setBg modClrScheme addAnim delAnim modAnim chgLayout">
-        <pc:chgData name="Roy Liu" userId="755465ea-a681-4840-afaf-3106d4ded39d" providerId="ADAL" clId="{26A4DA2E-3B26-4A19-981B-FA4B6FD33F58}" dt="2023-09-20T11:40:20.233" v="154"/>
+        <pc:chgData name="Roy Liu" userId="755465ea-a681-4840-afaf-3106d4ded39d" providerId="ADAL" clId="{26A4DA2E-3B26-4A19-981B-FA4B6FD33F58}" dt="2023-09-26T09:44:02.538" v="257" actId="20577"/>
         <pc:sldMkLst>
           <pc:docMk/>
           <pc:sldMk cId="4059361716" sldId="256"/>
         </pc:sldMkLst>
         <pc:spChg chg="mod">
-          <ac:chgData name="Roy Liu" userId="755465ea-a681-4840-afaf-3106d4ded39d" providerId="ADAL" clId="{26A4DA2E-3B26-4A19-981B-FA4B6FD33F58}" dt="2023-09-20T11:39:52.354" v="148" actId="26606"/>
+          <ac:chgData name="Roy Liu" userId="755465ea-a681-4840-afaf-3106d4ded39d" providerId="ADAL" clId="{26A4DA2E-3B26-4A19-981B-FA4B6FD33F58}" dt="2023-09-20T11:44:14.964" v="163"/>
           <ac:spMkLst>
             <pc:docMk/>
             <pc:sldMk cId="4059361716" sldId="256"/>
@@ -139,7 +147,7 @@
           </ac:spMkLst>
         </pc:spChg>
         <pc:spChg chg="mod">
-          <ac:chgData name="Roy Liu" userId="755465ea-a681-4840-afaf-3106d4ded39d" providerId="ADAL" clId="{26A4DA2E-3B26-4A19-981B-FA4B6FD33F58}" dt="2023-09-20T11:39:52.354" v="148" actId="26606"/>
+          <ac:chgData name="Roy Liu" userId="755465ea-a681-4840-afaf-3106d4ded39d" providerId="ADAL" clId="{26A4DA2E-3B26-4A19-981B-FA4B6FD33F58}" dt="2023-09-26T09:44:02.538" v="257" actId="20577"/>
           <ac:spMkLst>
             <pc:docMk/>
             <pc:sldMk cId="4059361716" sldId="256"/>
@@ -306,6 +314,51 @@
             <ac:picMk id="39" creationId="{B80152C7-DADA-79AF-671F-ED9DFFAEEDA7}"/>
           </ac:picMkLst>
         </pc:picChg>
+      </pc:sldChg>
+      <pc:sldChg chg="modSp new mod">
+        <pc:chgData name="Roy Liu" userId="755465ea-a681-4840-afaf-3106d4ded39d" providerId="ADAL" clId="{26A4DA2E-3B26-4A19-981B-FA4B6FD33F58}" dt="2023-09-26T09:42:09.074" v="190" actId="20577"/>
+        <pc:sldMkLst>
+          <pc:docMk/>
+          <pc:sldMk cId="1499829321" sldId="257"/>
+        </pc:sldMkLst>
+        <pc:spChg chg="mod">
+          <ac:chgData name="Roy Liu" userId="755465ea-a681-4840-afaf-3106d4ded39d" providerId="ADAL" clId="{26A4DA2E-3B26-4A19-981B-FA4B6FD33F58}" dt="2023-09-26T09:42:09.074" v="190" actId="20577"/>
+          <ac:spMkLst>
+            <pc:docMk/>
+            <pc:sldMk cId="1499829321" sldId="257"/>
+            <ac:spMk id="2" creationId="{6E7FAB23-3BBF-1A08-4ADC-40F67AE0A9F3}"/>
+          </ac:spMkLst>
+        </pc:spChg>
+      </pc:sldChg>
+      <pc:sldChg chg="modSp new mod">
+        <pc:chgData name="Roy Liu" userId="755465ea-a681-4840-afaf-3106d4ded39d" providerId="ADAL" clId="{26A4DA2E-3B26-4A19-981B-FA4B6FD33F58}" dt="2023-09-26T09:42:21.876" v="214" actId="20577"/>
+        <pc:sldMkLst>
+          <pc:docMk/>
+          <pc:sldMk cId="3596416156" sldId="258"/>
+        </pc:sldMkLst>
+        <pc:spChg chg="mod">
+          <ac:chgData name="Roy Liu" userId="755465ea-a681-4840-afaf-3106d4ded39d" providerId="ADAL" clId="{26A4DA2E-3B26-4A19-981B-FA4B6FD33F58}" dt="2023-09-26T09:42:21.876" v="214" actId="20577"/>
+          <ac:spMkLst>
+            <pc:docMk/>
+            <pc:sldMk cId="3596416156" sldId="258"/>
+            <ac:spMk id="2" creationId="{027F2EE5-1AEC-892A-0F33-1DAF05804E15}"/>
+          </ac:spMkLst>
+        </pc:spChg>
+      </pc:sldChg>
+      <pc:sldChg chg="modSp new mod">
+        <pc:chgData name="Roy Liu" userId="755465ea-a681-4840-afaf-3106d4ded39d" providerId="ADAL" clId="{26A4DA2E-3B26-4A19-981B-FA4B6FD33F58}" dt="2023-09-26T09:42:57.288" v="247" actId="20577"/>
+        <pc:sldMkLst>
+          <pc:docMk/>
+          <pc:sldMk cId="2063800821" sldId="259"/>
+        </pc:sldMkLst>
+        <pc:spChg chg="mod">
+          <ac:chgData name="Roy Liu" userId="755465ea-a681-4840-afaf-3106d4ded39d" providerId="ADAL" clId="{26A4DA2E-3B26-4A19-981B-FA4B6FD33F58}" dt="2023-09-26T09:42:57.288" v="247" actId="20577"/>
+          <ac:spMkLst>
+            <pc:docMk/>
+            <pc:sldMk cId="2063800821" sldId="259"/>
+            <ac:spMk id="2" creationId="{9DA16EE9-A1C6-5746-186A-A83C444481EE}"/>
+          </ac:spMkLst>
+        </pc:spChg>
       </pc:sldChg>
       <pc:sldMasterChg chg="add del addSldLayout delSldLayout">
         <pc:chgData name="Roy Liu" userId="755465ea-a681-4840-afaf-3106d4ded39d" providerId="ADAL" clId="{26A4DA2E-3B26-4A19-981B-FA4B6FD33F58}" dt="2023-09-20T11:39:52.354" v="148" actId="26606"/>
@@ -950,7 +1003,7 @@
             <a:fld id="{11A6662E-FAF4-44BC-88B5-85A7CBFB6D30}" type="datetime1">
               <a:rPr lang="en-US" smtClean="0"/>
               <a:pPr/>
-              <a:t>9/20/2023</a:t>
+              <a:t>9/26/2023</a:t>
             </a:fld>
             <a:endParaRPr lang="en-US" dirty="0"/>
           </a:p>
@@ -1177,7 +1230,7 @@
           <a:p>
             <a:fld id="{4C559632-1575-4E14-B53B-3DC3D5ED3947}" type="datetime1">
               <a:rPr lang="en-US" smtClean="0"/>
-              <a:t>9/20/2023</a:t>
+              <a:t>9/26/2023</a:t>
             </a:fld>
             <a:endParaRPr lang="en-US"/>
           </a:p>
@@ -1385,7 +1438,7 @@
           <a:p>
             <a:fld id="{CC4A6868-2568-4CC9-B302-F37117B01A6E}" type="datetime1">
               <a:rPr lang="en-US" smtClean="0"/>
-              <a:t>9/20/2023</a:t>
+              <a:t>9/26/2023</a:t>
             </a:fld>
             <a:endParaRPr lang="en-US"/>
           </a:p>
@@ -1590,7 +1643,7 @@
           <a:p>
             <a:fld id="{0055F08A-1E71-4B2B-BB49-E743F2903911}" type="datetime1">
               <a:rPr lang="en-US" smtClean="0"/>
-              <a:t>9/20/2023</a:t>
+              <a:t>9/26/2023</a:t>
             </a:fld>
             <a:endParaRPr lang="en-US" dirty="0"/>
           </a:p>
@@ -1864,7 +1917,7 @@
           <a:p>
             <a:fld id="{15417D9E-721A-44BB-8863-9873FE64DA75}" type="datetime1">
               <a:rPr lang="en-US" smtClean="0"/>
-              <a:t>9/20/2023</a:t>
+              <a:t>9/26/2023</a:t>
             </a:fld>
             <a:endParaRPr lang="en-US"/>
           </a:p>
@@ -2137,7 +2190,7 @@
           <a:p>
             <a:fld id="{5F31DA2F-80B8-49CF-99FB-5ABCA53A607A}" type="datetime1">
               <a:rPr lang="en-US" smtClean="0"/>
-              <a:t>9/20/2023</a:t>
+              <a:t>9/26/2023</a:t>
             </a:fld>
             <a:endParaRPr lang="en-US"/>
           </a:p>
@@ -2552,7 +2605,7 @@
           <a:p>
             <a:fld id="{28852172-E6C9-4B6C-929A-A9DE3837BBF1}" type="datetime1">
               <a:rPr lang="en-US" smtClean="0"/>
-              <a:t>9/20/2023</a:t>
+              <a:t>9/26/2023</a:t>
             </a:fld>
             <a:endParaRPr lang="en-US"/>
           </a:p>
@@ -2704,7 +2757,7 @@
           <a:p>
             <a:fld id="{3AB41CFF-90C9-47B3-9DA1-F2BF8D839F7E}" type="datetime1">
               <a:rPr lang="en-US" smtClean="0"/>
-              <a:t>9/20/2023</a:t>
+              <a:t>9/26/2023</a:t>
             </a:fld>
             <a:endParaRPr lang="en-US"/>
           </a:p>
@@ -2817,7 +2870,7 @@
           <a:p>
             <a:fld id="{F06048FA-06AB-4884-A69B-986B96E68A24}" type="datetime1">
               <a:rPr lang="en-US" smtClean="0"/>
-              <a:t>9/20/2023</a:t>
+              <a:t>9/26/2023</a:t>
             </a:fld>
             <a:endParaRPr lang="en-US"/>
           </a:p>
@@ -3128,7 +3181,7 @@
           <a:p>
             <a:fld id="{50DB7ABA-0172-4F9C-889D-567164F66BCD}" type="datetime1">
               <a:rPr lang="en-US" smtClean="0"/>
-              <a:t>9/20/2023</a:t>
+              <a:t>9/26/2023</a:t>
             </a:fld>
             <a:endParaRPr lang="en-US"/>
           </a:p>
@@ -3419,7 +3472,7 @@
           <a:p>
             <a:fld id="{78AC6A5B-8AE7-4A41-B5A7-9ADC6686DC18}" type="datetime1">
               <a:rPr lang="en-US" smtClean="0"/>
-              <a:t>9/20/2023</a:t>
+              <a:t>9/26/2023</a:t>
             </a:fld>
             <a:endParaRPr lang="en-US"/>
           </a:p>
@@ -3728,7 +3781,7 @@
             <a:fld id="{57E0CF6C-748E-4B7A-BC8B-3011EF78ED13}" type="datetime1">
               <a:rPr lang="en-US" smtClean="0"/>
               <a:pPr/>
-              <a:t>9/20/2023</a:t>
+              <a:t>9/26/2023</a:t>
             </a:fld>
             <a:endParaRPr lang="en-US" dirty="0"/>
           </a:p>
@@ -4415,33 +4468,61 @@
           <a:p>
             <a:pPr algn="l"/>
             <a:r>
-              <a:rPr lang="fi-FI" sz="5200" dirty="0">
+              <a:rPr lang="fi-FI" sz="5200" b="1" dirty="0">
                 <a:solidFill>
                   <a:srgbClr val="FFFFFF"/>
                 </a:solidFill>
+                <a:effectLst>
+                  <a:outerShdw blurRad="38100" dist="38100" dir="2700000" algn="tl">
+                    <a:srgbClr val="000000">
+                      <a:alpha val="43137"/>
+                    </a:srgbClr>
+                  </a:outerShdw>
+                </a:effectLst>
               </a:rPr>
               <a:t>Analysis </a:t>
             </a:r>
             <a:r>
-              <a:rPr lang="en-US" sz="5200" dirty="0">
+              <a:rPr lang="en-US" sz="5200" b="1" dirty="0">
                 <a:solidFill>
                   <a:srgbClr val="FFFFFF"/>
                 </a:solidFill>
+                <a:effectLst>
+                  <a:outerShdw blurRad="38100" dist="38100" dir="2700000" algn="tl">
+                    <a:srgbClr val="000000">
+                      <a:alpha val="43137"/>
+                    </a:srgbClr>
+                  </a:outerShdw>
+                </a:effectLst>
               </a:rPr>
               <a:t>reports</a:t>
             </a:r>
             <a:r>
-              <a:rPr lang="fi-FI" sz="5200" dirty="0">
+              <a:rPr lang="fi-FI" sz="5200" b="1" dirty="0">
                 <a:solidFill>
                   <a:srgbClr val="FFFFFF"/>
                 </a:solidFill>
+                <a:effectLst>
+                  <a:outerShdw blurRad="38100" dist="38100" dir="2700000" algn="tl">
+                    <a:srgbClr val="000000">
+                      <a:alpha val="43137"/>
+                    </a:srgbClr>
+                  </a:outerShdw>
+                </a:effectLst>
               </a:rPr>
               <a:t> for</a:t>
             </a:r>
-            <a:endParaRPr lang="LID4096" sz="5200" dirty="0">
+            <a:endParaRPr lang="LID4096" sz="5200" b="1" dirty="0">
               <a:solidFill>
                 <a:srgbClr val="FFFFFF"/>
               </a:solidFill>
+              <a:effectLst>
+                <a:outerShdw blurRad="38100" dist="38100" dir="2700000" algn="tl">
+                  <a:srgbClr val="000000">
+                    <a:alpha val="43137"/>
+                  </a:srgbClr>
+                </a:outerShdw>
+              </a:effectLst>
             </a:endParaRPr>
           </a:p>
         </p:txBody>
@@ -4470,7 +4551,7 @@
         </p:spPr>
         <p:txBody>
           <a:bodyPr>
-            <a:normAutofit/>
+            <a:normAutofit lnSpcReduction="10000"/>
           </a:bodyPr>
           <a:lstStyle/>
           <a:p>
@@ -4480,12 +4561,19 @@
               </a:lnSpc>
             </a:pPr>
             <a:r>
-              <a:rPr lang="en-US" dirty="0">
+              <a:rPr lang="en-US" sz="2400" dirty="0">
                 <a:solidFill>
                   <a:srgbClr val="FFFFFF"/>
                 </a:solidFill>
+                <a:effectLst>
+                  <a:outerShdw blurRad="38100" dist="38100" dir="2700000" algn="tl">
+                    <a:srgbClr val="000000">
+                      <a:alpha val="43137"/>
+                    </a:srgbClr>
+                  </a:outerShdw>
+                </a:effectLst>
               </a:rPr>
-              <a:t>Shop satisfaction survey dataset</a:t>
+              <a:t>Workplace satisfaction survey</a:t>
             </a:r>
           </a:p>
           <a:p>
@@ -4498,6 +4586,13 @@
               <a:solidFill>
                 <a:srgbClr val="FFFFFF"/>
               </a:solidFill>
+              <a:effectLst>
+                <a:outerShdw blurRad="38100" dist="38100" dir="2700000" algn="tl">
+                  <a:srgbClr val="000000">
+                    <a:alpha val="43137"/>
+                  </a:srgbClr>
+                </a:outerShdw>
+              </a:effectLst>
             </a:endParaRPr>
           </a:p>
           <a:p>
@@ -4511,40 +4606,15 @@
                 <a:solidFill>
                   <a:srgbClr val="FFFFFF"/>
                 </a:solidFill>
+                <a:effectLst>
+                  <a:outerShdw blurRad="38100" dist="38100" dir="2700000" algn="tl">
+                    <a:srgbClr val="000000">
+                      <a:alpha val="43137"/>
+                    </a:srgbClr>
+                  </a:outerShdw>
+                </a:effectLst>
               </a:rPr>
-              <a:t>Keita </a:t>
-            </a:r>
-            <a:r>
-              <a:rPr lang="en-US" dirty="0" err="1">
-                <a:solidFill>
-                  <a:srgbClr val="FFFFFF"/>
-                </a:solidFill>
-              </a:rPr>
-              <a:t>Brudere</a:t>
-            </a:r>
-            <a:r>
-              <a:rPr lang="en-US" dirty="0">
-                <a:solidFill>
-                  <a:srgbClr val="FFFFFF"/>
-                </a:solidFill>
-              </a:rPr>
-              <a:t>, </a:t>
-            </a:r>
-            <a:r>
-              <a:rPr lang="en-US" dirty="0" err="1">
-                <a:solidFill>
-                  <a:srgbClr val="FFFFFF"/>
-                </a:solidFill>
-              </a:rPr>
-              <a:t>Viktória</a:t>
-            </a:r>
-            <a:r>
-              <a:rPr lang="en-US" dirty="0">
-                <a:solidFill>
-                  <a:srgbClr val="FFFFFF"/>
-                </a:solidFill>
-              </a:rPr>
-              <a:t> Szabó, Roy Liu</a:t>
+              <a:t>Keita Brudere, Viktória Szabó, Roy Liu</a:t>
             </a:r>
           </a:p>
         </p:txBody>
@@ -4553,6 +4623,310 @@
     <p:extLst>
       <p:ext uri="{BB962C8B-B14F-4D97-AF65-F5344CB8AC3E}">
         <p14:creationId xmlns:p14="http://schemas.microsoft.com/office/powerpoint/2010/main" val="4059361716"/>
+      </p:ext>
+    </p:extLst>
+  </p:cSld>
+  <p:clrMapOvr>
+    <a:masterClrMapping/>
+  </p:clrMapOvr>
+</p:sld>
+</file>
+
+<file path=ppt/slides/slide2.xml><?xml version="1.0" encoding="utf-8"?>
+<p:sld xmlns:a="http://schemas.openxmlformats.org/drawingml/2006/main" xmlns:r="http://schemas.openxmlformats.org/officeDocument/2006/relationships" xmlns:p="http://schemas.openxmlformats.org/presentationml/2006/main">
+  <p:cSld>
+    <p:spTree>
+      <p:nvGrpSpPr>
+        <p:cNvPr id="1" name=""/>
+        <p:cNvGrpSpPr/>
+        <p:nvPr/>
+      </p:nvGrpSpPr>
+      <p:grpSpPr>
+        <a:xfrm>
+          <a:off x="0" y="0"/>
+          <a:ext cx="0" cy="0"/>
+          <a:chOff x="0" y="0"/>
+          <a:chExt cx="0" cy="0"/>
+        </a:xfrm>
+      </p:grpSpPr>
+      <p:sp>
+        <p:nvSpPr>
+          <p:cNvPr id="2" name="Title 1">
+            <a:extLst>
+              <a:ext uri="{FF2B5EF4-FFF2-40B4-BE49-F238E27FC236}">
+                <a16:creationId xmlns:a16="http://schemas.microsoft.com/office/drawing/2014/main" id="{6E7FAB23-3BBF-1A08-4ADC-40F67AE0A9F3}"/>
+              </a:ext>
+            </a:extLst>
+          </p:cNvPr>
+          <p:cNvSpPr>
+            <a:spLocks noGrp="1"/>
+          </p:cNvSpPr>
+          <p:nvPr>
+            <p:ph type="title"/>
+          </p:nvPr>
+        </p:nvSpPr>
+        <p:spPr/>
+        <p:txBody>
+          <a:bodyPr/>
+          <a:lstStyle/>
+          <a:p>
+            <a:r>
+              <a:rPr lang="fi-FI" dirty="0" err="1"/>
+              <a:t>Background</a:t>
+            </a:r>
+            <a:r>
+              <a:rPr lang="fi-FI" dirty="0"/>
+              <a:t> of </a:t>
+            </a:r>
+            <a:r>
+              <a:rPr lang="fi-FI" dirty="0" err="1"/>
+              <a:t>the</a:t>
+            </a:r>
+            <a:r>
+              <a:rPr lang="fi-FI" dirty="0"/>
+              <a:t> </a:t>
+            </a:r>
+            <a:r>
+              <a:rPr lang="fi-FI" dirty="0" err="1"/>
+              <a:t>survey</a:t>
+            </a:r>
+            <a:endParaRPr lang="LID4096" dirty="0"/>
+          </a:p>
+        </p:txBody>
+      </p:sp>
+      <p:sp>
+        <p:nvSpPr>
+          <p:cNvPr id="3" name="Content Placeholder 2">
+            <a:extLst>
+              <a:ext uri="{FF2B5EF4-FFF2-40B4-BE49-F238E27FC236}">
+                <a16:creationId xmlns:a16="http://schemas.microsoft.com/office/drawing/2014/main" id="{27880FD4-D46A-B9D5-23AC-6C0D8D9629D2}"/>
+              </a:ext>
+            </a:extLst>
+          </p:cNvPr>
+          <p:cNvSpPr>
+            <a:spLocks noGrp="1"/>
+          </p:cNvSpPr>
+          <p:nvPr>
+            <p:ph idx="1"/>
+          </p:nvPr>
+        </p:nvSpPr>
+        <p:spPr/>
+        <p:txBody>
+          <a:bodyPr/>
+          <a:lstStyle/>
+          <a:p>
+            <a:endParaRPr lang="LID4096"/>
+          </a:p>
+        </p:txBody>
+      </p:sp>
+    </p:spTree>
+    <p:extLst>
+      <p:ext uri="{BB962C8B-B14F-4D97-AF65-F5344CB8AC3E}">
+        <p14:creationId xmlns:p14="http://schemas.microsoft.com/office/powerpoint/2010/main" val="1499829321"/>
+      </p:ext>
+    </p:extLst>
+  </p:cSld>
+  <p:clrMapOvr>
+    <a:masterClrMapping/>
+  </p:clrMapOvr>
+</p:sld>
+</file>
+
+<file path=ppt/slides/slide3.xml><?xml version="1.0" encoding="utf-8"?>
+<p:sld xmlns:a="http://schemas.openxmlformats.org/drawingml/2006/main" xmlns:r="http://schemas.openxmlformats.org/officeDocument/2006/relationships" xmlns:p="http://schemas.openxmlformats.org/presentationml/2006/main">
+  <p:cSld>
+    <p:spTree>
+      <p:nvGrpSpPr>
+        <p:cNvPr id="1" name=""/>
+        <p:cNvGrpSpPr/>
+        <p:nvPr/>
+      </p:nvGrpSpPr>
+      <p:grpSpPr>
+        <a:xfrm>
+          <a:off x="0" y="0"/>
+          <a:ext cx="0" cy="0"/>
+          <a:chOff x="0" y="0"/>
+          <a:chExt cx="0" cy="0"/>
+        </a:xfrm>
+      </p:grpSpPr>
+      <p:sp>
+        <p:nvSpPr>
+          <p:cNvPr id="2" name="Title 1">
+            <a:extLst>
+              <a:ext uri="{FF2B5EF4-FFF2-40B4-BE49-F238E27FC236}">
+                <a16:creationId xmlns:a16="http://schemas.microsoft.com/office/drawing/2014/main" id="{027F2EE5-1AEC-892A-0F33-1DAF05804E15}"/>
+              </a:ext>
+            </a:extLst>
+          </p:cNvPr>
+          <p:cNvSpPr>
+            <a:spLocks noGrp="1"/>
+          </p:cNvSpPr>
+          <p:nvPr>
+            <p:ph type="title"/>
+          </p:nvPr>
+        </p:nvSpPr>
+        <p:spPr/>
+        <p:txBody>
+          <a:bodyPr/>
+          <a:lstStyle/>
+          <a:p>
+            <a:r>
+              <a:rPr lang="fi-FI" dirty="0" err="1"/>
+              <a:t>Variables</a:t>
+            </a:r>
+            <a:r>
+              <a:rPr lang="fi-FI" dirty="0"/>
+              <a:t> of </a:t>
+            </a:r>
+            <a:r>
+              <a:rPr lang="fi-FI" dirty="0" err="1"/>
+              <a:t>the</a:t>
+            </a:r>
+            <a:r>
+              <a:rPr lang="fi-FI" dirty="0"/>
+              <a:t> </a:t>
+            </a:r>
+            <a:r>
+              <a:rPr lang="fi-FI" dirty="0" err="1"/>
+              <a:t>survey</a:t>
+            </a:r>
+            <a:endParaRPr lang="LID4096" dirty="0"/>
+          </a:p>
+        </p:txBody>
+      </p:sp>
+      <p:sp>
+        <p:nvSpPr>
+          <p:cNvPr id="3" name="Content Placeholder 2">
+            <a:extLst>
+              <a:ext uri="{FF2B5EF4-FFF2-40B4-BE49-F238E27FC236}">
+                <a16:creationId xmlns:a16="http://schemas.microsoft.com/office/drawing/2014/main" id="{C5FBD0D9-1F3E-B448-0B80-6863AE3ECA96}"/>
+              </a:ext>
+            </a:extLst>
+          </p:cNvPr>
+          <p:cNvSpPr>
+            <a:spLocks noGrp="1"/>
+          </p:cNvSpPr>
+          <p:nvPr>
+            <p:ph idx="1"/>
+          </p:nvPr>
+        </p:nvSpPr>
+        <p:spPr/>
+        <p:txBody>
+          <a:bodyPr/>
+          <a:lstStyle/>
+          <a:p>
+            <a:endParaRPr lang="LID4096"/>
+          </a:p>
+        </p:txBody>
+      </p:sp>
+    </p:spTree>
+    <p:extLst>
+      <p:ext uri="{BB962C8B-B14F-4D97-AF65-F5344CB8AC3E}">
+        <p14:creationId xmlns:p14="http://schemas.microsoft.com/office/powerpoint/2010/main" val="3596416156"/>
+      </p:ext>
+    </p:extLst>
+  </p:cSld>
+  <p:clrMapOvr>
+    <a:masterClrMapping/>
+  </p:clrMapOvr>
+</p:sld>
+</file>
+
+<file path=ppt/slides/slide4.xml><?xml version="1.0" encoding="utf-8"?>
+<p:sld xmlns:a="http://schemas.openxmlformats.org/drawingml/2006/main" xmlns:r="http://schemas.openxmlformats.org/officeDocument/2006/relationships" xmlns:p="http://schemas.openxmlformats.org/presentationml/2006/main">
+  <p:cSld>
+    <p:spTree>
+      <p:nvGrpSpPr>
+        <p:cNvPr id="1" name=""/>
+        <p:cNvGrpSpPr/>
+        <p:nvPr/>
+      </p:nvGrpSpPr>
+      <p:grpSpPr>
+        <a:xfrm>
+          <a:off x="0" y="0"/>
+          <a:ext cx="0" cy="0"/>
+          <a:chOff x="0" y="0"/>
+          <a:chExt cx="0" cy="0"/>
+        </a:xfrm>
+      </p:grpSpPr>
+      <p:sp>
+        <p:nvSpPr>
+          <p:cNvPr id="2" name="Title 1">
+            <a:extLst>
+              <a:ext uri="{FF2B5EF4-FFF2-40B4-BE49-F238E27FC236}">
+                <a16:creationId xmlns:a16="http://schemas.microsoft.com/office/drawing/2014/main" id="{9DA16EE9-A1C6-5746-186A-A83C444481EE}"/>
+              </a:ext>
+            </a:extLst>
+          </p:cNvPr>
+          <p:cNvSpPr>
+            <a:spLocks noGrp="1"/>
+          </p:cNvSpPr>
+          <p:nvPr>
+            <p:ph type="title"/>
+          </p:nvPr>
+        </p:nvSpPr>
+        <p:spPr/>
+        <p:txBody>
+          <a:bodyPr/>
+          <a:lstStyle/>
+          <a:p>
+            <a:r>
+              <a:rPr lang="fi-FI" dirty="0" err="1"/>
+              <a:t>Background</a:t>
+            </a:r>
+            <a:r>
+              <a:rPr lang="fi-FI" dirty="0"/>
+              <a:t> </a:t>
+            </a:r>
+            <a:r>
+              <a:rPr lang="fi-FI" dirty="0" err="1"/>
+              <a:t>analysis</a:t>
+            </a:r>
+            <a:r>
+              <a:rPr lang="fi-FI" dirty="0"/>
+              <a:t> (</a:t>
+            </a:r>
+            <a:r>
+              <a:rPr lang="fi-FI" dirty="0" err="1"/>
+              <a:t>Education</a:t>
+            </a:r>
+            <a:r>
+              <a:rPr lang="fi-FI" dirty="0"/>
+              <a:t>) </a:t>
+            </a:r>
+            <a:endParaRPr lang="LID4096" dirty="0"/>
+          </a:p>
+        </p:txBody>
+      </p:sp>
+      <p:sp>
+        <p:nvSpPr>
+          <p:cNvPr id="3" name="Content Placeholder 2">
+            <a:extLst>
+              <a:ext uri="{FF2B5EF4-FFF2-40B4-BE49-F238E27FC236}">
+                <a16:creationId xmlns:a16="http://schemas.microsoft.com/office/drawing/2014/main" id="{A7DC99B2-0AA5-82F2-5810-A5951B38BAB4}"/>
+              </a:ext>
+            </a:extLst>
+          </p:cNvPr>
+          <p:cNvSpPr>
+            <a:spLocks noGrp="1"/>
+          </p:cNvSpPr>
+          <p:nvPr>
+            <p:ph idx="1"/>
+          </p:nvPr>
+        </p:nvSpPr>
+        <p:spPr/>
+        <p:txBody>
+          <a:bodyPr/>
+          <a:lstStyle/>
+          <a:p>
+            <a:endParaRPr lang="LID4096"/>
+          </a:p>
+        </p:txBody>
+      </p:sp>
+    </p:spTree>
+    <p:extLst>
+      <p:ext uri="{BB962C8B-B14F-4D97-AF65-F5344CB8AC3E}">
+        <p14:creationId xmlns:p14="http://schemas.microsoft.com/office/powerpoint/2010/main" val="2063800821"/>
       </p:ext>
     </p:extLst>
   </p:cSld>

</xml_diff>

<commit_message>
I don't know what's new
</commit_message>
<xml_diff>
--- a/BigDataProject presentation.pptx
+++ b/BigDataProject presentation.pptx
@@ -128,13 +128,7 @@
 <file path=ppt/revisionInfo.xml><?xml version="1.0" encoding="utf-8"?>
 <p1510:revInfo xmlns:a="http://schemas.openxmlformats.org/drawingml/2006/main" xmlns:r="http://schemas.openxmlformats.org/officeDocument/2006/relationships" xmlns:p1510="http://schemas.microsoft.com/office/powerpoint/2015/10/main">
   <p1510:revLst>
-    <p1510:client id="{26A4DA2E-3B26-4A19-981B-FA4B6FD33F58}" v="1605" dt="2023-09-27T10:06:48.402"/>
-    <p1510:client id="{2FDE26DA-918B-C5FD-BEDC-B05DF466947D}" v="235" dt="2023-09-27T10:08:34.225"/>
-    <p1510:client id="{6E52E18D-70C0-C0CD-E9D5-B6670395D0A7}" v="31" dt="2023-09-27T10:30:17.758"/>
-    <p1510:client id="{8FE56CCC-2F3F-47D6-8213-205A330088DA}" v="1845" dt="2023-09-27T09:58:19.167"/>
-    <p1510:client id="{99DD3772-D7DA-ACAF-C41D-2125D048CA4C}" v="732" dt="2023-09-26T10:46:13.237"/>
-    <p1510:client id="{C4D42948-8866-3437-1BA9-3871038CE292}" v="55" dt="2023-09-27T10:25:38.896"/>
-    <p1510:client id="{F5E7641A-2F92-30B9-302F-3094BD75C4AE}" v="1" dt="2023-09-26T10:06:33.241"/>
+    <p1510:client id="{26A4DA2E-3B26-4A19-981B-FA4B6FD33F58}" v="1606" dt="2023-10-01T17:04:07.263"/>
   </p1510:revLst>
 </p1510:revInfo>
 </file>
@@ -142,80 +136,2035 @@
 <file path=ppt/changesInfos/changesInfo1.xml><?xml version="1.0" encoding="utf-8"?>
 <pc:chgInfo xmlns:a="http://schemas.openxmlformats.org/drawingml/2006/main" xmlns:r="http://schemas.openxmlformats.org/officeDocument/2006/relationships" xmlns:ac="http://schemas.microsoft.com/office/drawing/2013/main/command" xmlns:pc="http://schemas.microsoft.com/office/powerpoint/2013/main/command">
   <pc:docChgLst>
-    <pc:chgData name="Viktória Szabó" userId="S::viktoria22000@student.hamk.fi::55ff7ae3-70d3-4f82-942e-28ce8109f0e2" providerId="AD" clId="Web-{2FDE26DA-918B-C5FD-BEDC-B05DF466947D}"/>
-    <pc:docChg chg="modSld">
-      <pc:chgData name="Viktória Szabó" userId="S::viktoria22000@student.hamk.fi::55ff7ae3-70d3-4f82-942e-28ce8109f0e2" providerId="AD" clId="Web-{2FDE26DA-918B-C5FD-BEDC-B05DF466947D}" dt="2023-09-27T10:08:32.022" v="232" actId="20577"/>
+    <pc:chgData name="Roy Liu" userId="755465ea-a681-4840-afaf-3106d4ded39d" providerId="ADAL" clId="{26A4DA2E-3B26-4A19-981B-FA4B6FD33F58}"/>
+    <pc:docChg chg="undo custSel addSld delSld modSld sldOrd addMainMaster delMainMaster">
+      <pc:chgData name="Roy Liu" userId="755465ea-a681-4840-afaf-3106d4ded39d" providerId="ADAL" clId="{26A4DA2E-3B26-4A19-981B-FA4B6FD33F58}" dt="2023-10-01T17:13:08.855" v="2130" actId="20577"/>
       <pc:docMkLst>
         <pc:docMk/>
       </pc:docMkLst>
-      <pc:sldChg chg="modSp">
-        <pc:chgData name="Viktória Szabó" userId="S::viktoria22000@student.hamk.fi::55ff7ae3-70d3-4f82-942e-28ce8109f0e2" providerId="AD" clId="Web-{2FDE26DA-918B-C5FD-BEDC-B05DF466947D}" dt="2023-09-27T10:08:32.022" v="232" actId="20577"/>
+      <pc:sldChg chg="addSp delSp modSp new mod modTransition modMedia setBg modClrScheme addAnim delAnim modAnim chgLayout">
+        <pc:chgData name="Roy Liu" userId="755465ea-a681-4840-afaf-3106d4ded39d" providerId="ADAL" clId="{26A4DA2E-3B26-4A19-981B-FA4B6FD33F58}" dt="2023-09-26T09:44:02.538" v="257" actId="20577"/>
+        <pc:sldMkLst>
+          <pc:docMk/>
+          <pc:sldMk cId="4059361716" sldId="256"/>
+        </pc:sldMkLst>
+        <pc:spChg chg="mod">
+          <ac:chgData name="Roy Liu" userId="755465ea-a681-4840-afaf-3106d4ded39d" providerId="ADAL" clId="{26A4DA2E-3B26-4A19-981B-FA4B6FD33F58}" dt="2023-09-20T11:44:14.964" v="163"/>
+          <ac:spMkLst>
+            <pc:docMk/>
+            <pc:sldMk cId="4059361716" sldId="256"/>
+            <ac:spMk id="2" creationId="{FB1621ED-E470-38C9-3C00-E64A512B7968}"/>
+          </ac:spMkLst>
+        </pc:spChg>
+        <pc:spChg chg="mod">
+          <ac:chgData name="Roy Liu" userId="755465ea-a681-4840-afaf-3106d4ded39d" providerId="ADAL" clId="{26A4DA2E-3B26-4A19-981B-FA4B6FD33F58}" dt="2023-09-26T09:44:02.538" v="257" actId="20577"/>
+          <ac:spMkLst>
+            <pc:docMk/>
+            <pc:sldMk cId="4059361716" sldId="256"/>
+            <ac:spMk id="3" creationId="{A1373B98-8ED3-37B9-5EB5-687324157D0A}"/>
+          </ac:spMkLst>
+        </pc:spChg>
+        <pc:spChg chg="add del">
+          <ac:chgData name="Roy Liu" userId="755465ea-a681-4840-afaf-3106d4ded39d" providerId="ADAL" clId="{26A4DA2E-3B26-4A19-981B-FA4B6FD33F58}" dt="2023-09-20T11:39:00.334" v="135" actId="26606"/>
+          <ac:spMkLst>
+            <pc:docMk/>
+            <pc:sldMk cId="4059361716" sldId="256"/>
+            <ac:spMk id="9" creationId="{1E644DE9-8D09-43E2-BA69-F57482CFC93A}"/>
+          </ac:spMkLst>
+        </pc:spChg>
+        <pc:spChg chg="add del">
+          <ac:chgData name="Roy Liu" userId="755465ea-a681-4840-afaf-3106d4ded39d" providerId="ADAL" clId="{26A4DA2E-3B26-4A19-981B-FA4B6FD33F58}" dt="2023-09-20T11:39:00.334" v="135" actId="26606"/>
+          <ac:spMkLst>
+            <pc:docMk/>
+            <pc:sldMk cId="4059361716" sldId="256"/>
+            <ac:spMk id="11" creationId="{6C23C919-B32E-40FF-B3D8-631316E84E3E}"/>
+          </ac:spMkLst>
+        </pc:spChg>
+        <pc:spChg chg="add del">
+          <ac:chgData name="Roy Liu" userId="755465ea-a681-4840-afaf-3106d4ded39d" providerId="ADAL" clId="{26A4DA2E-3B26-4A19-981B-FA4B6FD33F58}" dt="2023-09-20T11:39:10.769" v="139" actId="26606"/>
+          <ac:spMkLst>
+            <pc:docMk/>
+            <pc:sldMk cId="4059361716" sldId="256"/>
+            <ac:spMk id="13" creationId="{3768F94E-2BF1-56A5-87AC-0C427079334B}"/>
+          </ac:spMkLst>
+        </pc:spChg>
+        <pc:spChg chg="add del">
+          <ac:chgData name="Roy Liu" userId="755465ea-a681-4840-afaf-3106d4ded39d" providerId="ADAL" clId="{26A4DA2E-3B26-4A19-981B-FA4B6FD33F58}" dt="2023-09-20T11:39:10.769" v="139" actId="26606"/>
+          <ac:spMkLst>
+            <pc:docMk/>
+            <pc:sldMk cId="4059361716" sldId="256"/>
+            <ac:spMk id="15" creationId="{393D8CD4-7FBE-9118-0CEB-9C1A2FA6AE5A}"/>
+          </ac:spMkLst>
+        </pc:spChg>
+        <pc:spChg chg="add del">
+          <ac:chgData name="Roy Liu" userId="755465ea-a681-4840-afaf-3106d4ded39d" providerId="ADAL" clId="{26A4DA2E-3B26-4A19-981B-FA4B6FD33F58}" dt="2023-09-20T11:39:47.178" v="143" actId="26606"/>
+          <ac:spMkLst>
+            <pc:docMk/>
+            <pc:sldMk cId="4059361716" sldId="256"/>
+            <ac:spMk id="17" creationId="{1E644DE9-8D09-43E2-BA69-F57482CFC93A}"/>
+          </ac:spMkLst>
+        </pc:spChg>
+        <pc:spChg chg="add del">
+          <ac:chgData name="Roy Liu" userId="755465ea-a681-4840-afaf-3106d4ded39d" providerId="ADAL" clId="{26A4DA2E-3B26-4A19-981B-FA4B6FD33F58}" dt="2023-09-20T11:39:47.178" v="143" actId="26606"/>
+          <ac:spMkLst>
+            <pc:docMk/>
+            <pc:sldMk cId="4059361716" sldId="256"/>
+            <ac:spMk id="18" creationId="{6C23C919-B32E-40FF-B3D8-631316E84E3E}"/>
+          </ac:spMkLst>
+        </pc:spChg>
+        <pc:spChg chg="add del">
+          <ac:chgData name="Roy Liu" userId="755465ea-a681-4840-afaf-3106d4ded39d" providerId="ADAL" clId="{26A4DA2E-3B26-4A19-981B-FA4B6FD33F58}" dt="2023-09-20T11:39:49.982" v="145" actId="26606"/>
+          <ac:spMkLst>
+            <pc:docMk/>
+            <pc:sldMk cId="4059361716" sldId="256"/>
+            <ac:spMk id="21" creationId="{0623FB3B-24E7-5304-70D8-3CA402902220}"/>
+          </ac:spMkLst>
+        </pc:spChg>
+        <pc:spChg chg="add del">
+          <ac:chgData name="Roy Liu" userId="755465ea-a681-4840-afaf-3106d4ded39d" providerId="ADAL" clId="{26A4DA2E-3B26-4A19-981B-FA4B6FD33F58}" dt="2023-09-20T11:39:49.982" v="145" actId="26606"/>
+          <ac:spMkLst>
+            <pc:docMk/>
+            <pc:sldMk cId="4059361716" sldId="256"/>
+            <ac:spMk id="22" creationId="{97081EE3-B6BE-9584-F5AF-E5F6484DA7A1}"/>
+          </ac:spMkLst>
+        </pc:spChg>
+        <pc:spChg chg="add del">
+          <ac:chgData name="Roy Liu" userId="755465ea-a681-4840-afaf-3106d4ded39d" providerId="ADAL" clId="{26A4DA2E-3B26-4A19-981B-FA4B6FD33F58}" dt="2023-09-20T11:39:49.982" v="145" actId="26606"/>
+          <ac:spMkLst>
+            <pc:docMk/>
+            <pc:sldMk cId="4059361716" sldId="256"/>
+            <ac:spMk id="24" creationId="{4711BF64-C99B-2F90-ADA1-0C08F9BE8392}"/>
+          </ac:spMkLst>
+        </pc:spChg>
+        <pc:spChg chg="add del">
+          <ac:chgData name="Roy Liu" userId="755465ea-a681-4840-afaf-3106d4ded39d" providerId="ADAL" clId="{26A4DA2E-3B26-4A19-981B-FA4B6FD33F58}" dt="2023-09-20T11:39:52.314" v="147" actId="26606"/>
+          <ac:spMkLst>
+            <pc:docMk/>
+            <pc:sldMk cId="4059361716" sldId="256"/>
+            <ac:spMk id="26" creationId="{733E0473-C315-42D8-A82A-A2FE49DC67DA}"/>
+          </ac:spMkLst>
+        </pc:spChg>
+        <pc:spChg chg="add del">
+          <ac:chgData name="Roy Liu" userId="755465ea-a681-4840-afaf-3106d4ded39d" providerId="ADAL" clId="{26A4DA2E-3B26-4A19-981B-FA4B6FD33F58}" dt="2023-09-20T11:39:52.314" v="147" actId="26606"/>
+          <ac:spMkLst>
+            <pc:docMk/>
+            <pc:sldMk cId="4059361716" sldId="256"/>
+            <ac:spMk id="27" creationId="{AD23A251-68F2-43E5-812B-4BBAE1AF535E}"/>
+          </ac:spMkLst>
+        </pc:spChg>
+        <pc:spChg chg="add">
+          <ac:chgData name="Roy Liu" userId="755465ea-a681-4840-afaf-3106d4ded39d" providerId="ADAL" clId="{26A4DA2E-3B26-4A19-981B-FA4B6FD33F58}" dt="2023-09-20T11:39:52.354" v="148" actId="26606"/>
+          <ac:spMkLst>
+            <pc:docMk/>
+            <pc:sldMk cId="4059361716" sldId="256"/>
+            <ac:spMk id="37" creationId="{1E644DE9-8D09-43E2-BA69-F57482CFC93A}"/>
+          </ac:spMkLst>
+        </pc:spChg>
+        <pc:spChg chg="add">
+          <ac:chgData name="Roy Liu" userId="755465ea-a681-4840-afaf-3106d4ded39d" providerId="ADAL" clId="{26A4DA2E-3B26-4A19-981B-FA4B6FD33F58}" dt="2023-09-20T11:39:52.354" v="148" actId="26606"/>
+          <ac:spMkLst>
+            <pc:docMk/>
+            <pc:sldMk cId="4059361716" sldId="256"/>
+            <ac:spMk id="38" creationId="{6C23C919-B32E-40FF-B3D8-631316E84E3E}"/>
+          </ac:spMkLst>
+        </pc:spChg>
+        <pc:grpChg chg="add del">
+          <ac:chgData name="Roy Liu" userId="755465ea-a681-4840-afaf-3106d4ded39d" providerId="ADAL" clId="{26A4DA2E-3B26-4A19-981B-FA4B6FD33F58}" dt="2023-09-20T11:39:52.314" v="147" actId="26606"/>
+          <ac:grpSpMkLst>
+            <pc:docMk/>
+            <pc:sldMk cId="4059361716" sldId="256"/>
+            <ac:grpSpMk id="29" creationId="{0350AF23-2606-421F-AB7B-23D9B48F3E9B}"/>
+          </ac:grpSpMkLst>
+        </pc:grpChg>
+        <pc:picChg chg="add del">
+          <ac:chgData name="Roy Liu" userId="755465ea-a681-4840-afaf-3106d4ded39d" providerId="ADAL" clId="{26A4DA2E-3B26-4A19-981B-FA4B6FD33F58}" dt="2023-09-20T11:39:00.334" v="135" actId="26606"/>
+          <ac:picMkLst>
+            <pc:docMk/>
+            <pc:sldMk cId="4059361716" sldId="256"/>
+            <ac:picMk id="4" creationId="{B80152C7-DADA-79AF-671F-ED9DFFAEEDA7}"/>
+          </ac:picMkLst>
+        </pc:picChg>
+        <pc:picChg chg="add del mod">
+          <ac:chgData name="Roy Liu" userId="755465ea-a681-4840-afaf-3106d4ded39d" providerId="ADAL" clId="{26A4DA2E-3B26-4A19-981B-FA4B6FD33F58}" dt="2023-09-20T11:39:10.769" v="139" actId="26606"/>
+          <ac:picMkLst>
+            <pc:docMk/>
+            <pc:sldMk cId="4059361716" sldId="256"/>
+            <ac:picMk id="14" creationId="{896F5DF2-BCFC-2FB4-5329-B94F5C89D821}"/>
+          </ac:picMkLst>
+        </pc:picChg>
+        <pc:picChg chg="add del">
+          <ac:chgData name="Roy Liu" userId="755465ea-a681-4840-afaf-3106d4ded39d" providerId="ADAL" clId="{26A4DA2E-3B26-4A19-981B-FA4B6FD33F58}" dt="2023-09-20T11:39:47.178" v="143" actId="26606"/>
+          <ac:picMkLst>
+            <pc:docMk/>
+            <pc:sldMk cId="4059361716" sldId="256"/>
+            <ac:picMk id="19" creationId="{B80152C7-DADA-79AF-671F-ED9DFFAEEDA7}"/>
+          </ac:picMkLst>
+        </pc:picChg>
+        <pc:picChg chg="add del">
+          <ac:chgData name="Roy Liu" userId="755465ea-a681-4840-afaf-3106d4ded39d" providerId="ADAL" clId="{26A4DA2E-3B26-4A19-981B-FA4B6FD33F58}" dt="2023-09-20T11:39:49.982" v="145" actId="26606"/>
+          <ac:picMkLst>
+            <pc:docMk/>
+            <pc:sldMk cId="4059361716" sldId="256"/>
+            <ac:picMk id="23" creationId="{063B0685-32E7-D1F1-01AE-972466F1B3F9}"/>
+          </ac:picMkLst>
+        </pc:picChg>
+        <pc:picChg chg="add del">
+          <ac:chgData name="Roy Liu" userId="755465ea-a681-4840-afaf-3106d4ded39d" providerId="ADAL" clId="{26A4DA2E-3B26-4A19-981B-FA4B6FD33F58}" dt="2023-09-20T11:39:52.314" v="147" actId="26606"/>
+          <ac:picMkLst>
+            <pc:docMk/>
+            <pc:sldMk cId="4059361716" sldId="256"/>
+            <ac:picMk id="28" creationId="{B3EE9219-1F6E-EC8E-1308-4E7893ED0E74}"/>
+          </ac:picMkLst>
+        </pc:picChg>
+        <pc:picChg chg="add">
+          <ac:chgData name="Roy Liu" userId="755465ea-a681-4840-afaf-3106d4ded39d" providerId="ADAL" clId="{26A4DA2E-3B26-4A19-981B-FA4B6FD33F58}" dt="2023-09-20T11:39:52.354" v="148" actId="26606"/>
+          <ac:picMkLst>
+            <pc:docMk/>
+            <pc:sldMk cId="4059361716" sldId="256"/>
+            <ac:picMk id="39" creationId="{B80152C7-DADA-79AF-671F-ED9DFFAEEDA7}"/>
+          </ac:picMkLst>
+        </pc:picChg>
+      </pc:sldChg>
+      <pc:sldChg chg="modSp new mod">
+        <pc:chgData name="Roy Liu" userId="755465ea-a681-4840-afaf-3106d4ded39d" providerId="ADAL" clId="{26A4DA2E-3B26-4A19-981B-FA4B6FD33F58}" dt="2023-09-26T10:08:46.662" v="652" actId="20577"/>
+        <pc:sldMkLst>
+          <pc:docMk/>
+          <pc:sldMk cId="1499829321" sldId="257"/>
+        </pc:sldMkLst>
+        <pc:spChg chg="mod">
+          <ac:chgData name="Roy Liu" userId="755465ea-a681-4840-afaf-3106d4ded39d" providerId="ADAL" clId="{26A4DA2E-3B26-4A19-981B-FA4B6FD33F58}" dt="2023-09-26T09:49:19.300" v="258" actId="790"/>
+          <ac:spMkLst>
+            <pc:docMk/>
+            <pc:sldMk cId="1499829321" sldId="257"/>
+            <ac:spMk id="2" creationId="{6E7FAB23-3BBF-1A08-4ADC-40F67AE0A9F3}"/>
+          </ac:spMkLst>
+        </pc:spChg>
+        <pc:spChg chg="mod">
+          <ac:chgData name="Roy Liu" userId="755465ea-a681-4840-afaf-3106d4ded39d" providerId="ADAL" clId="{26A4DA2E-3B26-4A19-981B-FA4B6FD33F58}" dt="2023-09-26T10:08:46.662" v="652" actId="20577"/>
+          <ac:spMkLst>
+            <pc:docMk/>
+            <pc:sldMk cId="1499829321" sldId="257"/>
+            <ac:spMk id="3" creationId="{27880FD4-D46A-B9D5-23AC-6C0D8D9629D2}"/>
+          </ac:spMkLst>
+        </pc:spChg>
+      </pc:sldChg>
+      <pc:sldChg chg="modSp new mod">
+        <pc:chgData name="Roy Liu" userId="755465ea-a681-4840-afaf-3106d4ded39d" providerId="ADAL" clId="{26A4DA2E-3B26-4A19-981B-FA4B6FD33F58}" dt="2023-09-27T09:57:53.830" v="1536" actId="20577"/>
+        <pc:sldMkLst>
+          <pc:docMk/>
+          <pc:sldMk cId="3596416156" sldId="258"/>
+        </pc:sldMkLst>
+        <pc:spChg chg="mod">
+          <ac:chgData name="Roy Liu" userId="755465ea-a681-4840-afaf-3106d4ded39d" providerId="ADAL" clId="{26A4DA2E-3B26-4A19-981B-FA4B6FD33F58}" dt="2023-09-26T09:58:33.208" v="368" actId="20577"/>
+          <ac:spMkLst>
+            <pc:docMk/>
+            <pc:sldMk cId="3596416156" sldId="258"/>
+            <ac:spMk id="2" creationId="{027F2EE5-1AEC-892A-0F33-1DAF05804E15}"/>
+          </ac:spMkLst>
+        </pc:spChg>
+        <pc:spChg chg="mod">
+          <ac:chgData name="Roy Liu" userId="755465ea-a681-4840-afaf-3106d4ded39d" providerId="ADAL" clId="{26A4DA2E-3B26-4A19-981B-FA4B6FD33F58}" dt="2023-09-27T09:57:53.830" v="1536" actId="20577"/>
+          <ac:spMkLst>
+            <pc:docMk/>
+            <pc:sldMk cId="3596416156" sldId="258"/>
+            <ac:spMk id="3" creationId="{C5FBD0D9-1F3E-B448-0B80-6863AE3ECA96}"/>
+          </ac:spMkLst>
+        </pc:spChg>
+      </pc:sldChg>
+      <pc:sldChg chg="modSp new del mod">
+        <pc:chgData name="Roy Liu" userId="755465ea-a681-4840-afaf-3106d4ded39d" providerId="ADAL" clId="{26A4DA2E-3B26-4A19-981B-FA4B6FD33F58}" dt="2023-09-26T09:59:07.693" v="466" actId="2696"/>
+        <pc:sldMkLst>
+          <pc:docMk/>
+          <pc:sldMk cId="2063800821" sldId="259"/>
+        </pc:sldMkLst>
+        <pc:spChg chg="mod">
+          <ac:chgData name="Roy Liu" userId="755465ea-a681-4840-afaf-3106d4ded39d" providerId="ADAL" clId="{26A4DA2E-3B26-4A19-981B-FA4B6FD33F58}" dt="2023-09-26T09:50:11.128" v="264" actId="20577"/>
+          <ac:spMkLst>
+            <pc:docMk/>
+            <pc:sldMk cId="2063800821" sldId="259"/>
+            <ac:spMk id="2" creationId="{9DA16EE9-A1C6-5746-186A-A83C444481EE}"/>
+          </ac:spMkLst>
+        </pc:spChg>
+      </pc:sldChg>
+      <pc:sldChg chg="modSp new mod ord">
+        <pc:chgData name="Roy Liu" userId="755465ea-a681-4840-afaf-3106d4ded39d" providerId="ADAL" clId="{26A4DA2E-3B26-4A19-981B-FA4B6FD33F58}" dt="2023-09-26T09:57:06.572" v="289" actId="20577"/>
+        <pc:sldMkLst>
+          <pc:docMk/>
+          <pc:sldMk cId="1627402840" sldId="260"/>
+        </pc:sldMkLst>
+        <pc:spChg chg="mod">
+          <ac:chgData name="Roy Liu" userId="755465ea-a681-4840-afaf-3106d4ded39d" providerId="ADAL" clId="{26A4DA2E-3B26-4A19-981B-FA4B6FD33F58}" dt="2023-09-26T09:57:06.572" v="289" actId="20577"/>
+          <ac:spMkLst>
+            <pc:docMk/>
+            <pc:sldMk cId="1627402840" sldId="260"/>
+            <ac:spMk id="2" creationId="{FC60A86F-C9EB-93AE-9163-0F2723C7C1CE}"/>
+          </ac:spMkLst>
+        </pc:spChg>
+      </pc:sldChg>
+      <pc:sldChg chg="addSp delSp modSp new mod setBg">
+        <pc:chgData name="Roy Liu" userId="755465ea-a681-4840-afaf-3106d4ded39d" providerId="ADAL" clId="{26A4DA2E-3B26-4A19-981B-FA4B6FD33F58}" dt="2023-09-27T09:56:06.861" v="1454" actId="20577"/>
+        <pc:sldMkLst>
+          <pc:docMk/>
+          <pc:sldMk cId="833342778" sldId="261"/>
+        </pc:sldMkLst>
+        <pc:spChg chg="mod">
+          <ac:chgData name="Roy Liu" userId="755465ea-a681-4840-afaf-3106d4ded39d" providerId="ADAL" clId="{26A4DA2E-3B26-4A19-981B-FA4B6FD33F58}" dt="2023-09-27T09:56:06.861" v="1454" actId="20577"/>
+          <ac:spMkLst>
+            <pc:docMk/>
+            <pc:sldMk cId="833342778" sldId="261"/>
+            <ac:spMk id="2" creationId="{5FD84A74-3A6C-F4D8-BE30-E95E481604FC}"/>
+          </ac:spMkLst>
+        </pc:spChg>
+        <pc:spChg chg="del">
+          <ac:chgData name="Roy Liu" userId="755465ea-a681-4840-afaf-3106d4ded39d" providerId="ADAL" clId="{26A4DA2E-3B26-4A19-981B-FA4B6FD33F58}" dt="2023-09-26T10:13:52.571" v="653"/>
+          <ac:spMkLst>
+            <pc:docMk/>
+            <pc:sldMk cId="833342778" sldId="261"/>
+            <ac:spMk id="3" creationId="{9033DF0E-4884-3629-37B2-76BF7229470C}"/>
+          </ac:spMkLst>
+        </pc:spChg>
+        <pc:spChg chg="add del">
+          <ac:chgData name="Roy Liu" userId="755465ea-a681-4840-afaf-3106d4ded39d" providerId="ADAL" clId="{26A4DA2E-3B26-4A19-981B-FA4B6FD33F58}" dt="2023-09-26T10:14:13.489" v="656" actId="26606"/>
+          <ac:spMkLst>
+            <pc:docMk/>
+            <pc:sldMk cId="833342778" sldId="261"/>
+            <ac:spMk id="9" creationId="{52814DCF-62D4-3000-30DB-D3CAC0CB7C66}"/>
+          </ac:spMkLst>
+        </pc:spChg>
+        <pc:spChg chg="add del">
+          <ac:chgData name="Roy Liu" userId="755465ea-a681-4840-afaf-3106d4ded39d" providerId="ADAL" clId="{26A4DA2E-3B26-4A19-981B-FA4B6FD33F58}" dt="2023-09-26T10:14:13.489" v="656" actId="26606"/>
+          <ac:spMkLst>
+            <pc:docMk/>
+            <pc:sldMk cId="833342778" sldId="261"/>
+            <ac:spMk id="12" creationId="{8651CFA9-6065-4243-AC48-858E359780B1}"/>
+          </ac:spMkLst>
+        </pc:spChg>
+        <pc:spChg chg="add del">
+          <ac:chgData name="Roy Liu" userId="755465ea-a681-4840-afaf-3106d4ded39d" providerId="ADAL" clId="{26A4DA2E-3B26-4A19-981B-FA4B6FD33F58}" dt="2023-09-26T10:14:13.489" v="656" actId="26606"/>
+          <ac:spMkLst>
+            <pc:docMk/>
+            <pc:sldMk cId="833342778" sldId="261"/>
+            <ac:spMk id="14" creationId="{FBC8BBE5-981E-4B0B-9654-32B5668BFF31}"/>
+          </ac:spMkLst>
+        </pc:spChg>
+        <pc:spChg chg="add del">
+          <ac:chgData name="Roy Liu" userId="755465ea-a681-4840-afaf-3106d4ded39d" providerId="ADAL" clId="{26A4DA2E-3B26-4A19-981B-FA4B6FD33F58}" dt="2023-09-26T10:14:14.595" v="658" actId="26606"/>
+          <ac:spMkLst>
+            <pc:docMk/>
+            <pc:sldMk cId="833342778" sldId="261"/>
+            <ac:spMk id="20" creationId="{A3EF0E40-AEB8-4DF7-A67A-7317B3BF94CA}"/>
+          </ac:spMkLst>
+        </pc:spChg>
+        <pc:spChg chg="add del">
+          <ac:chgData name="Roy Liu" userId="755465ea-a681-4840-afaf-3106d4ded39d" providerId="ADAL" clId="{26A4DA2E-3B26-4A19-981B-FA4B6FD33F58}" dt="2023-09-26T10:14:14.595" v="658" actId="26606"/>
+          <ac:spMkLst>
+            <pc:docMk/>
+            <pc:sldMk cId="833342778" sldId="261"/>
+            <ac:spMk id="21" creationId="{8651CFA9-6065-4243-AC48-858E359780B1}"/>
+          </ac:spMkLst>
+        </pc:spChg>
+        <pc:spChg chg="add del">
+          <ac:chgData name="Roy Liu" userId="755465ea-a681-4840-afaf-3106d4ded39d" providerId="ADAL" clId="{26A4DA2E-3B26-4A19-981B-FA4B6FD33F58}" dt="2023-09-26T10:14:14.595" v="658" actId="26606"/>
+          <ac:spMkLst>
+            <pc:docMk/>
+            <pc:sldMk cId="833342778" sldId="261"/>
+            <ac:spMk id="22" creationId="{06B1FD15-9CBB-4259-931E-1EB6A87199E9}"/>
+          </ac:spMkLst>
+        </pc:spChg>
+        <pc:spChg chg="add del">
+          <ac:chgData name="Roy Liu" userId="755465ea-a681-4840-afaf-3106d4ded39d" providerId="ADAL" clId="{26A4DA2E-3B26-4A19-981B-FA4B6FD33F58}" dt="2023-09-26T10:14:14.595" v="658" actId="26606"/>
+          <ac:spMkLst>
+            <pc:docMk/>
+            <pc:sldMk cId="833342778" sldId="261"/>
+            <ac:spMk id="24" creationId="{F8C57F8C-07BA-E657-0190-A22217C53599}"/>
+          </ac:spMkLst>
+        </pc:spChg>
+        <pc:spChg chg="add del">
+          <ac:chgData name="Roy Liu" userId="755465ea-a681-4840-afaf-3106d4ded39d" providerId="ADAL" clId="{26A4DA2E-3B26-4A19-981B-FA4B6FD33F58}" dt="2023-09-26T10:14:19.660" v="660" actId="26606"/>
+          <ac:spMkLst>
+            <pc:docMk/>
+            <pc:sldMk cId="833342778" sldId="261"/>
+            <ac:spMk id="26" creationId="{A4FB2F27-3F7D-440E-A905-86607A926A29}"/>
+          </ac:spMkLst>
+        </pc:spChg>
+        <pc:spChg chg="add del">
+          <ac:chgData name="Roy Liu" userId="755465ea-a681-4840-afaf-3106d4ded39d" providerId="ADAL" clId="{26A4DA2E-3B26-4A19-981B-FA4B6FD33F58}" dt="2023-09-26T10:14:19.660" v="660" actId="26606"/>
+          <ac:spMkLst>
+            <pc:docMk/>
+            <pc:sldMk cId="833342778" sldId="261"/>
+            <ac:spMk id="27" creationId="{AF678C14-A033-4139-BCA9-8382B039648B}"/>
+          </ac:spMkLst>
+        </pc:spChg>
+        <pc:spChg chg="add del">
+          <ac:chgData name="Roy Liu" userId="755465ea-a681-4840-afaf-3106d4ded39d" providerId="ADAL" clId="{26A4DA2E-3B26-4A19-981B-FA4B6FD33F58}" dt="2023-09-26T10:14:19.660" v="660" actId="26606"/>
+          <ac:spMkLst>
+            <pc:docMk/>
+            <pc:sldMk cId="833342778" sldId="261"/>
+            <ac:spMk id="29" creationId="{90AA31C0-A74F-2F69-15E2-23D8EE580828}"/>
+          </ac:spMkLst>
+        </pc:spChg>
+        <pc:spChg chg="add del">
+          <ac:chgData name="Roy Liu" userId="755465ea-a681-4840-afaf-3106d4ded39d" providerId="ADAL" clId="{26A4DA2E-3B26-4A19-981B-FA4B6FD33F58}" dt="2023-09-26T10:14:22.504" v="662" actId="26606"/>
+          <ac:spMkLst>
+            <pc:docMk/>
+            <pc:sldMk cId="833342778" sldId="261"/>
+            <ac:spMk id="31" creationId="{A4FB2F27-3F7D-440E-A905-86607A926A29}"/>
+          </ac:spMkLst>
+        </pc:spChg>
+        <pc:spChg chg="add del">
+          <ac:chgData name="Roy Liu" userId="755465ea-a681-4840-afaf-3106d4ded39d" providerId="ADAL" clId="{26A4DA2E-3B26-4A19-981B-FA4B6FD33F58}" dt="2023-09-26T10:14:22.504" v="662" actId="26606"/>
+          <ac:spMkLst>
+            <pc:docMk/>
+            <pc:sldMk cId="833342778" sldId="261"/>
+            <ac:spMk id="32" creationId="{AF678C14-A033-4139-BCA9-8382B039648B}"/>
+          </ac:spMkLst>
+        </pc:spChg>
+        <pc:spChg chg="add del">
+          <ac:chgData name="Roy Liu" userId="755465ea-a681-4840-afaf-3106d4ded39d" providerId="ADAL" clId="{26A4DA2E-3B26-4A19-981B-FA4B6FD33F58}" dt="2023-09-26T10:14:22.504" v="662" actId="26606"/>
+          <ac:spMkLst>
+            <pc:docMk/>
+            <pc:sldMk cId="833342778" sldId="261"/>
+            <ac:spMk id="34" creationId="{9944F14A-33B5-02AA-5755-C19A9531AD01}"/>
+          </ac:spMkLst>
+        </pc:spChg>
+        <pc:spChg chg="add del">
+          <ac:chgData name="Roy Liu" userId="755465ea-a681-4840-afaf-3106d4ded39d" providerId="ADAL" clId="{26A4DA2E-3B26-4A19-981B-FA4B6FD33F58}" dt="2023-09-26T10:14:39.973" v="664" actId="26606"/>
+          <ac:spMkLst>
+            <pc:docMk/>
+            <pc:sldMk cId="833342778" sldId="261"/>
+            <ac:spMk id="36" creationId="{8651CFA9-6065-4243-AC48-858E359780B1}"/>
+          </ac:spMkLst>
+        </pc:spChg>
+        <pc:spChg chg="add del">
+          <ac:chgData name="Roy Liu" userId="755465ea-a681-4840-afaf-3106d4ded39d" providerId="ADAL" clId="{26A4DA2E-3B26-4A19-981B-FA4B6FD33F58}" dt="2023-09-26T10:14:39.973" v="664" actId="26606"/>
+          <ac:spMkLst>
+            <pc:docMk/>
+            <pc:sldMk cId="833342778" sldId="261"/>
+            <ac:spMk id="37" creationId="{FBC8BBE5-981E-4B0B-9654-32B5668BFF31}"/>
+          </ac:spMkLst>
+        </pc:spChg>
+        <pc:spChg chg="add del">
+          <ac:chgData name="Roy Liu" userId="755465ea-a681-4840-afaf-3106d4ded39d" providerId="ADAL" clId="{26A4DA2E-3B26-4A19-981B-FA4B6FD33F58}" dt="2023-09-26T10:14:39.973" v="664" actId="26606"/>
+          <ac:spMkLst>
+            <pc:docMk/>
+            <pc:sldMk cId="833342778" sldId="261"/>
+            <ac:spMk id="39" creationId="{52814DCF-62D4-3000-30DB-D3CAC0CB7C66}"/>
+          </ac:spMkLst>
+        </pc:spChg>
+        <pc:spChg chg="add del">
+          <ac:chgData name="Roy Liu" userId="755465ea-a681-4840-afaf-3106d4ded39d" providerId="ADAL" clId="{26A4DA2E-3B26-4A19-981B-FA4B6FD33F58}" dt="2023-09-26T10:14:41.077" v="666" actId="26606"/>
+          <ac:spMkLst>
+            <pc:docMk/>
+            <pc:sldMk cId="833342778" sldId="261"/>
+            <ac:spMk id="41" creationId="{8651CFA9-6065-4243-AC48-858E359780B1}"/>
+          </ac:spMkLst>
+        </pc:spChg>
+        <pc:spChg chg="add del">
+          <ac:chgData name="Roy Liu" userId="755465ea-a681-4840-afaf-3106d4ded39d" providerId="ADAL" clId="{26A4DA2E-3B26-4A19-981B-FA4B6FD33F58}" dt="2023-09-26T10:14:41.077" v="666" actId="26606"/>
+          <ac:spMkLst>
+            <pc:docMk/>
+            <pc:sldMk cId="833342778" sldId="261"/>
+            <ac:spMk id="42" creationId="{FBC8BBE5-981E-4B0B-9654-32B5668BFF31}"/>
+          </ac:spMkLst>
+        </pc:spChg>
+        <pc:spChg chg="add del">
+          <ac:chgData name="Roy Liu" userId="755465ea-a681-4840-afaf-3106d4ded39d" providerId="ADAL" clId="{26A4DA2E-3B26-4A19-981B-FA4B6FD33F58}" dt="2023-09-26T10:14:41.077" v="666" actId="26606"/>
+          <ac:spMkLst>
+            <pc:docMk/>
+            <pc:sldMk cId="833342778" sldId="261"/>
+            <ac:spMk id="44" creationId="{0DADC141-2CF4-4D22-BFEF-05FB358E4DFD}"/>
+          </ac:spMkLst>
+        </pc:spChg>
+        <pc:spChg chg="add del">
+          <ac:chgData name="Roy Liu" userId="755465ea-a681-4840-afaf-3106d4ded39d" providerId="ADAL" clId="{26A4DA2E-3B26-4A19-981B-FA4B6FD33F58}" dt="2023-09-26T10:14:41.077" v="666" actId="26606"/>
+          <ac:spMkLst>
+            <pc:docMk/>
+            <pc:sldMk cId="833342778" sldId="261"/>
+            <ac:spMk id="45" creationId="{F43A66C0-8F79-4D55-8A61-9E980D5FEE26}"/>
+          </ac:spMkLst>
+        </pc:spChg>
+        <pc:spChg chg="add del">
+          <ac:chgData name="Roy Liu" userId="755465ea-a681-4840-afaf-3106d4ded39d" providerId="ADAL" clId="{26A4DA2E-3B26-4A19-981B-FA4B6FD33F58}" dt="2023-09-26T10:14:41.077" v="666" actId="26606"/>
+          <ac:spMkLst>
+            <pc:docMk/>
+            <pc:sldMk cId="833342778" sldId="261"/>
+            <ac:spMk id="46" creationId="{05DEB5AD-912E-FADE-0E08-E5E5BAF3B460}"/>
+          </ac:spMkLst>
+        </pc:spChg>
+        <pc:spChg chg="add del">
+          <ac:chgData name="Roy Liu" userId="755465ea-a681-4840-afaf-3106d4ded39d" providerId="ADAL" clId="{26A4DA2E-3B26-4A19-981B-FA4B6FD33F58}" dt="2023-09-26T10:15:50.081" v="668" actId="26606"/>
+          <ac:spMkLst>
+            <pc:docMk/>
+            <pc:sldMk cId="833342778" sldId="261"/>
+            <ac:spMk id="48" creationId="{8651CFA9-6065-4243-AC48-858E359780B1}"/>
+          </ac:spMkLst>
+        </pc:spChg>
+        <pc:spChg chg="add del">
+          <ac:chgData name="Roy Liu" userId="755465ea-a681-4840-afaf-3106d4ded39d" providerId="ADAL" clId="{26A4DA2E-3B26-4A19-981B-FA4B6FD33F58}" dt="2023-09-26T10:15:50.081" v="668" actId="26606"/>
+          <ac:spMkLst>
+            <pc:docMk/>
+            <pc:sldMk cId="833342778" sldId="261"/>
+            <ac:spMk id="49" creationId="{FBC8BBE5-981E-4B0B-9654-32B5668BFF31}"/>
+          </ac:spMkLst>
+        </pc:spChg>
+        <pc:spChg chg="add del">
+          <ac:chgData name="Roy Liu" userId="755465ea-a681-4840-afaf-3106d4ded39d" providerId="ADAL" clId="{26A4DA2E-3B26-4A19-981B-FA4B6FD33F58}" dt="2023-09-26T10:15:50.081" v="668" actId="26606"/>
+          <ac:spMkLst>
+            <pc:docMk/>
+            <pc:sldMk cId="833342778" sldId="261"/>
+            <ac:spMk id="51" creationId="{0DADC141-2CF4-4D22-BFEF-05FB358E4DFD}"/>
+          </ac:spMkLst>
+        </pc:spChg>
+        <pc:spChg chg="add del">
+          <ac:chgData name="Roy Liu" userId="755465ea-a681-4840-afaf-3106d4ded39d" providerId="ADAL" clId="{26A4DA2E-3B26-4A19-981B-FA4B6FD33F58}" dt="2023-09-26T10:15:50.081" v="668" actId="26606"/>
+          <ac:spMkLst>
+            <pc:docMk/>
+            <pc:sldMk cId="833342778" sldId="261"/>
+            <ac:spMk id="52" creationId="{BFA7080D-E80E-D14C-12D8-498F7C6288E0}"/>
+          </ac:spMkLst>
+        </pc:spChg>
+        <pc:spChg chg="add del">
+          <ac:chgData name="Roy Liu" userId="755465ea-a681-4840-afaf-3106d4ded39d" providerId="ADAL" clId="{26A4DA2E-3B26-4A19-981B-FA4B6FD33F58}" dt="2023-09-26T11:21:44.938" v="747" actId="26606"/>
+          <ac:spMkLst>
+            <pc:docMk/>
+            <pc:sldMk cId="833342778" sldId="261"/>
+            <ac:spMk id="54" creationId="{A4FB2F27-3F7D-440E-A905-86607A926A29}"/>
+          </ac:spMkLst>
+        </pc:spChg>
+        <pc:spChg chg="add del">
+          <ac:chgData name="Roy Liu" userId="755465ea-a681-4840-afaf-3106d4ded39d" providerId="ADAL" clId="{26A4DA2E-3B26-4A19-981B-FA4B6FD33F58}" dt="2023-09-26T11:21:44.938" v="747" actId="26606"/>
+          <ac:spMkLst>
+            <pc:docMk/>
+            <pc:sldMk cId="833342778" sldId="261"/>
+            <ac:spMk id="55" creationId="{AF678C14-A033-4139-BCA9-8382B039648B}"/>
+          </ac:spMkLst>
+        </pc:spChg>
+        <pc:spChg chg="add mod">
+          <ac:chgData name="Roy Liu" userId="755465ea-a681-4840-afaf-3106d4ded39d" providerId="ADAL" clId="{26A4DA2E-3B26-4A19-981B-FA4B6FD33F58}" dt="2023-09-26T11:57:45.145" v="1110" actId="20577"/>
+          <ac:spMkLst>
+            <pc:docMk/>
+            <pc:sldMk cId="833342778" sldId="261"/>
+            <ac:spMk id="57" creationId="{90AA31C0-A74F-2F69-15E2-23D8EE580828}"/>
+          </ac:spMkLst>
+        </pc:spChg>
+        <pc:spChg chg="add del">
+          <ac:chgData name="Roy Liu" userId="755465ea-a681-4840-afaf-3106d4ded39d" providerId="ADAL" clId="{26A4DA2E-3B26-4A19-981B-FA4B6FD33F58}" dt="2023-09-26T11:21:41.812" v="742" actId="26606"/>
+          <ac:spMkLst>
+            <pc:docMk/>
+            <pc:sldMk cId="833342778" sldId="261"/>
+            <ac:spMk id="62" creationId="{8651CFA9-6065-4243-AC48-858E359780B1}"/>
+          </ac:spMkLst>
+        </pc:spChg>
+        <pc:spChg chg="add del">
+          <ac:chgData name="Roy Liu" userId="755465ea-a681-4840-afaf-3106d4ded39d" providerId="ADAL" clId="{26A4DA2E-3B26-4A19-981B-FA4B6FD33F58}" dt="2023-09-26T11:21:41.812" v="742" actId="26606"/>
+          <ac:spMkLst>
+            <pc:docMk/>
+            <pc:sldMk cId="833342778" sldId="261"/>
+            <ac:spMk id="64" creationId="{FBC8BBE5-981E-4B0B-9654-32B5668BFF31}"/>
+          </ac:spMkLst>
+        </pc:spChg>
+        <pc:spChg chg="add del">
+          <ac:chgData name="Roy Liu" userId="755465ea-a681-4840-afaf-3106d4ded39d" providerId="ADAL" clId="{26A4DA2E-3B26-4A19-981B-FA4B6FD33F58}" dt="2023-09-26T11:21:43.627" v="744" actId="26606"/>
+          <ac:spMkLst>
+            <pc:docMk/>
+            <pc:sldMk cId="833342778" sldId="261"/>
+            <ac:spMk id="70" creationId="{8651CFA9-6065-4243-AC48-858E359780B1}"/>
+          </ac:spMkLst>
+        </pc:spChg>
+        <pc:spChg chg="add del">
+          <ac:chgData name="Roy Liu" userId="755465ea-a681-4840-afaf-3106d4ded39d" providerId="ADAL" clId="{26A4DA2E-3B26-4A19-981B-FA4B6FD33F58}" dt="2023-09-26T11:21:43.627" v="744" actId="26606"/>
+          <ac:spMkLst>
+            <pc:docMk/>
+            <pc:sldMk cId="833342778" sldId="261"/>
+            <ac:spMk id="71" creationId="{5A8C81AE-8F0D-49F3-9FB4-334B0DCDF195}"/>
+          </ac:spMkLst>
+        </pc:spChg>
+        <pc:spChg chg="add del">
+          <ac:chgData name="Roy Liu" userId="755465ea-a681-4840-afaf-3106d4ded39d" providerId="ADAL" clId="{26A4DA2E-3B26-4A19-981B-FA4B6FD33F58}" dt="2023-09-26T11:21:44.923" v="746" actId="26606"/>
+          <ac:spMkLst>
+            <pc:docMk/>
+            <pc:sldMk cId="833342778" sldId="261"/>
+            <ac:spMk id="73" creationId="{4AB8125F-0FD8-48CD-9F43-73E5494EA774}"/>
+          </ac:spMkLst>
+        </pc:spChg>
+        <pc:spChg chg="add del">
+          <ac:chgData name="Roy Liu" userId="755465ea-a681-4840-afaf-3106d4ded39d" providerId="ADAL" clId="{26A4DA2E-3B26-4A19-981B-FA4B6FD33F58}" dt="2023-09-26T11:21:44.923" v="746" actId="26606"/>
+          <ac:spMkLst>
+            <pc:docMk/>
+            <pc:sldMk cId="833342778" sldId="261"/>
+            <ac:spMk id="74" creationId="{0019DD6C-5899-4C07-864B-EB0A7D104ACF}"/>
+          </ac:spMkLst>
+        </pc:spChg>
+        <pc:spChg chg="add del">
+          <ac:chgData name="Roy Liu" userId="755465ea-a681-4840-afaf-3106d4ded39d" providerId="ADAL" clId="{26A4DA2E-3B26-4A19-981B-FA4B6FD33F58}" dt="2023-09-26T11:36:42.340" v="831" actId="26606"/>
+          <ac:spMkLst>
+            <pc:docMk/>
+            <pc:sldMk cId="833342778" sldId="261"/>
+            <ac:spMk id="77" creationId="{8651CFA9-6065-4243-AC48-858E359780B1}"/>
+          </ac:spMkLst>
+        </pc:spChg>
+        <pc:spChg chg="add del">
+          <ac:chgData name="Roy Liu" userId="755465ea-a681-4840-afaf-3106d4ded39d" providerId="ADAL" clId="{26A4DA2E-3B26-4A19-981B-FA4B6FD33F58}" dt="2023-09-26T11:36:42.340" v="831" actId="26606"/>
+          <ac:spMkLst>
+            <pc:docMk/>
+            <pc:sldMk cId="833342778" sldId="261"/>
+            <ac:spMk id="78" creationId="{1B6E9D4E-1863-458E-8166-A6E64C865F07}"/>
+          </ac:spMkLst>
+        </pc:spChg>
+        <pc:spChg chg="add del">
+          <ac:chgData name="Roy Liu" userId="755465ea-a681-4840-afaf-3106d4ded39d" providerId="ADAL" clId="{26A4DA2E-3B26-4A19-981B-FA4B6FD33F58}" dt="2023-09-26T11:36:42.340" v="831" actId="26606"/>
+          <ac:spMkLst>
+            <pc:docMk/>
+            <pc:sldMk cId="833342778" sldId="261"/>
+            <ac:spMk id="80" creationId="{F6B9E73A-7DA5-4C84-B395-757FF1941041}"/>
+          </ac:spMkLst>
+        </pc:spChg>
+        <pc:spChg chg="add del">
+          <ac:chgData name="Roy Liu" userId="755465ea-a681-4840-afaf-3106d4ded39d" providerId="ADAL" clId="{26A4DA2E-3B26-4A19-981B-FA4B6FD33F58}" dt="2023-09-26T11:36:54.709" v="834" actId="26606"/>
+          <ac:spMkLst>
+            <pc:docMk/>
+            <pc:sldMk cId="833342778" sldId="261"/>
+            <ac:spMk id="85" creationId="{8651CFA9-6065-4243-AC48-858E359780B1}"/>
+          </ac:spMkLst>
+        </pc:spChg>
+        <pc:spChg chg="add del">
+          <ac:chgData name="Roy Liu" userId="755465ea-a681-4840-afaf-3106d4ded39d" providerId="ADAL" clId="{26A4DA2E-3B26-4A19-981B-FA4B6FD33F58}" dt="2023-09-26T11:36:54.709" v="834" actId="26606"/>
+          <ac:spMkLst>
+            <pc:docMk/>
+            <pc:sldMk cId="833342778" sldId="261"/>
+            <ac:spMk id="87" creationId="{5A8C81AE-8F0D-49F3-9FB4-334B0DCDF195}"/>
+          </ac:spMkLst>
+        </pc:spChg>
+        <pc:spChg chg="add del">
+          <ac:chgData name="Roy Liu" userId="755465ea-a681-4840-afaf-3106d4ded39d" providerId="ADAL" clId="{26A4DA2E-3B26-4A19-981B-FA4B6FD33F58}" dt="2023-09-26T11:36:54.691" v="833" actId="26606"/>
+          <ac:spMkLst>
+            <pc:docMk/>
+            <pc:sldMk cId="833342778" sldId="261"/>
+            <ac:spMk id="96" creationId="{4AB8125F-0FD8-48CD-9F43-73E5494EA774}"/>
+          </ac:spMkLst>
+        </pc:spChg>
+        <pc:spChg chg="add del">
+          <ac:chgData name="Roy Liu" userId="755465ea-a681-4840-afaf-3106d4ded39d" providerId="ADAL" clId="{26A4DA2E-3B26-4A19-981B-FA4B6FD33F58}" dt="2023-09-26T11:36:54.691" v="833" actId="26606"/>
+          <ac:spMkLst>
+            <pc:docMk/>
+            <pc:sldMk cId="833342778" sldId="261"/>
+            <ac:spMk id="98" creationId="{0019DD6C-5899-4C07-864B-EB0A7D104ACF}"/>
+          </ac:spMkLst>
+        </pc:spChg>
+        <pc:spChg chg="add">
+          <ac:chgData name="Roy Liu" userId="755465ea-a681-4840-afaf-3106d4ded39d" providerId="ADAL" clId="{26A4DA2E-3B26-4A19-981B-FA4B6FD33F58}" dt="2023-09-26T11:36:54.709" v="834" actId="26606"/>
+          <ac:spMkLst>
+            <pc:docMk/>
+            <pc:sldMk cId="833342778" sldId="261"/>
+            <ac:spMk id="104" creationId="{8651CFA9-6065-4243-AC48-858E359780B1}"/>
+          </ac:spMkLst>
+        </pc:spChg>
+        <pc:spChg chg="add">
+          <ac:chgData name="Roy Liu" userId="755465ea-a681-4840-afaf-3106d4ded39d" providerId="ADAL" clId="{26A4DA2E-3B26-4A19-981B-FA4B6FD33F58}" dt="2023-09-26T11:36:54.709" v="834" actId="26606"/>
+          <ac:spMkLst>
+            <pc:docMk/>
+            <pc:sldMk cId="833342778" sldId="261"/>
+            <ac:spMk id="105" creationId="{FBC8BBE5-981E-4B0B-9654-32B5668BFF31}"/>
+          </ac:spMkLst>
+        </pc:spChg>
+        <pc:grpChg chg="add del">
+          <ac:chgData name="Roy Liu" userId="755465ea-a681-4840-afaf-3106d4ded39d" providerId="ADAL" clId="{26A4DA2E-3B26-4A19-981B-FA4B6FD33F58}" dt="2023-09-26T10:14:13.489" v="656" actId="26606"/>
+          <ac:grpSpMkLst>
+            <pc:docMk/>
+            <pc:sldMk cId="833342778" sldId="261"/>
+            <ac:grpSpMk id="16" creationId="{8D6FD602-3113-4FC4-982F-15099614D2A6}"/>
+          </ac:grpSpMkLst>
+        </pc:grpChg>
+        <pc:grpChg chg="add del">
+          <ac:chgData name="Roy Liu" userId="755465ea-a681-4840-afaf-3106d4ded39d" providerId="ADAL" clId="{26A4DA2E-3B26-4A19-981B-FA4B6FD33F58}" dt="2023-09-26T10:14:14.595" v="658" actId="26606"/>
+          <ac:grpSpMkLst>
+            <pc:docMk/>
+            <pc:sldMk cId="833342778" sldId="261"/>
+            <ac:grpSpMk id="23" creationId="{9D739765-2266-4358-BC9F-0DC2A6B7CD17}"/>
+          </ac:grpSpMkLst>
+        </pc:grpChg>
+        <pc:grpChg chg="add del">
+          <ac:chgData name="Roy Liu" userId="755465ea-a681-4840-afaf-3106d4ded39d" providerId="ADAL" clId="{26A4DA2E-3B26-4A19-981B-FA4B6FD33F58}" dt="2023-09-26T10:14:19.660" v="660" actId="26606"/>
+          <ac:grpSpMkLst>
+            <pc:docMk/>
+            <pc:sldMk cId="833342778" sldId="261"/>
+            <ac:grpSpMk id="28" creationId="{14763DA8-CE3A-4B30-B2F5-0D128777F742}"/>
+          </ac:grpSpMkLst>
+        </pc:grpChg>
+        <pc:grpChg chg="add del">
+          <ac:chgData name="Roy Liu" userId="755465ea-a681-4840-afaf-3106d4ded39d" providerId="ADAL" clId="{26A4DA2E-3B26-4A19-981B-FA4B6FD33F58}" dt="2023-09-26T10:14:22.504" v="662" actId="26606"/>
+          <ac:grpSpMkLst>
+            <pc:docMk/>
+            <pc:sldMk cId="833342778" sldId="261"/>
+            <ac:grpSpMk id="33" creationId="{3489A2D2-B3AA-488C-B20E-15DBB97548C6}"/>
+          </ac:grpSpMkLst>
+        </pc:grpChg>
+        <pc:grpChg chg="add del">
+          <ac:chgData name="Roy Liu" userId="755465ea-a681-4840-afaf-3106d4ded39d" providerId="ADAL" clId="{26A4DA2E-3B26-4A19-981B-FA4B6FD33F58}" dt="2023-09-26T10:14:39.973" v="664" actId="26606"/>
+          <ac:grpSpMkLst>
+            <pc:docMk/>
+            <pc:sldMk cId="833342778" sldId="261"/>
+            <ac:grpSpMk id="38" creationId="{8D6FD602-3113-4FC4-982F-15099614D2A6}"/>
+          </ac:grpSpMkLst>
+        </pc:grpChg>
+        <pc:grpChg chg="add del">
+          <ac:chgData name="Roy Liu" userId="755465ea-a681-4840-afaf-3106d4ded39d" providerId="ADAL" clId="{26A4DA2E-3B26-4A19-981B-FA4B6FD33F58}" dt="2023-09-26T10:14:41.077" v="666" actId="26606"/>
+          <ac:grpSpMkLst>
+            <pc:docMk/>
+            <pc:sldMk cId="833342778" sldId="261"/>
+            <ac:grpSpMk id="43" creationId="{545001F7-3F8F-4035-8348-1B9798C77D29}"/>
+          </ac:grpSpMkLst>
+        </pc:grpChg>
+        <pc:grpChg chg="add del">
+          <ac:chgData name="Roy Liu" userId="755465ea-a681-4840-afaf-3106d4ded39d" providerId="ADAL" clId="{26A4DA2E-3B26-4A19-981B-FA4B6FD33F58}" dt="2023-09-26T10:15:50.081" v="668" actId="26606"/>
+          <ac:grpSpMkLst>
+            <pc:docMk/>
+            <pc:sldMk cId="833342778" sldId="261"/>
+            <ac:grpSpMk id="50" creationId="{8B308828-4749-4D6D-9CEA-433D2BD27EC0}"/>
+          </ac:grpSpMkLst>
+        </pc:grpChg>
+        <pc:grpChg chg="add del">
+          <ac:chgData name="Roy Liu" userId="755465ea-a681-4840-afaf-3106d4ded39d" providerId="ADAL" clId="{26A4DA2E-3B26-4A19-981B-FA4B6FD33F58}" dt="2023-09-26T11:21:44.938" v="747" actId="26606"/>
+          <ac:grpSpMkLst>
+            <pc:docMk/>
+            <pc:sldMk cId="833342778" sldId="261"/>
+            <ac:grpSpMk id="56" creationId="{14763DA8-CE3A-4B30-B2F5-0D128777F742}"/>
+          </ac:grpSpMkLst>
+        </pc:grpChg>
+        <pc:grpChg chg="add del">
+          <ac:chgData name="Roy Liu" userId="755465ea-a681-4840-afaf-3106d4ded39d" providerId="ADAL" clId="{26A4DA2E-3B26-4A19-981B-FA4B6FD33F58}" dt="2023-09-26T11:21:41.812" v="742" actId="26606"/>
+          <ac:grpSpMkLst>
+            <pc:docMk/>
+            <pc:sldMk cId="833342778" sldId="261"/>
+            <ac:grpSpMk id="66" creationId="{E54EDBA2-E203-497D-AB28-73A06B2DFDEE}"/>
+          </ac:grpSpMkLst>
+        </pc:grpChg>
+        <pc:grpChg chg="add del">
+          <ac:chgData name="Roy Liu" userId="755465ea-a681-4840-afaf-3106d4ded39d" providerId="ADAL" clId="{26A4DA2E-3B26-4A19-981B-FA4B6FD33F58}" dt="2023-09-26T11:21:44.923" v="746" actId="26606"/>
+          <ac:grpSpMkLst>
+            <pc:docMk/>
+            <pc:sldMk cId="833342778" sldId="261"/>
+            <ac:grpSpMk id="75" creationId="{EB40C5D5-6C8D-4E52-A87F-94BF781A0814}"/>
+          </ac:grpSpMkLst>
+        </pc:grpChg>
+        <pc:grpChg chg="add del">
+          <ac:chgData name="Roy Liu" userId="755465ea-a681-4840-afaf-3106d4ded39d" providerId="ADAL" clId="{26A4DA2E-3B26-4A19-981B-FA4B6FD33F58}" dt="2023-09-26T11:36:42.340" v="831" actId="26606"/>
+          <ac:grpSpMkLst>
+            <pc:docMk/>
+            <pc:sldMk cId="833342778" sldId="261"/>
+            <ac:grpSpMk id="79" creationId="{DDC08824-D5AF-47B4-A084-327F6A050FE5}"/>
+          </ac:grpSpMkLst>
+        </pc:grpChg>
+        <pc:grpChg chg="add del">
+          <ac:chgData name="Roy Liu" userId="755465ea-a681-4840-afaf-3106d4ded39d" providerId="ADAL" clId="{26A4DA2E-3B26-4A19-981B-FA4B6FD33F58}" dt="2023-09-26T11:36:54.709" v="834" actId="26606"/>
+          <ac:grpSpMkLst>
+            <pc:docMk/>
+            <pc:sldMk cId="833342778" sldId="261"/>
+            <ac:grpSpMk id="89" creationId="{A9EF8060-0D63-402B-8B09-4993D1FE8EFD}"/>
+          </ac:grpSpMkLst>
+        </pc:grpChg>
+        <pc:grpChg chg="add del">
+          <ac:chgData name="Roy Liu" userId="755465ea-a681-4840-afaf-3106d4ded39d" providerId="ADAL" clId="{26A4DA2E-3B26-4A19-981B-FA4B6FD33F58}" dt="2023-09-26T11:36:54.691" v="833" actId="26606"/>
+          <ac:grpSpMkLst>
+            <pc:docMk/>
+            <pc:sldMk cId="833342778" sldId="261"/>
+            <ac:grpSpMk id="100" creationId="{EB40C5D5-6C8D-4E52-A87F-94BF781A0814}"/>
+          </ac:grpSpMkLst>
+        </pc:grpChg>
+        <pc:grpChg chg="add">
+          <ac:chgData name="Roy Liu" userId="755465ea-a681-4840-afaf-3106d4ded39d" providerId="ADAL" clId="{26A4DA2E-3B26-4A19-981B-FA4B6FD33F58}" dt="2023-09-26T11:36:54.709" v="834" actId="26606"/>
+          <ac:grpSpMkLst>
+            <pc:docMk/>
+            <pc:sldMk cId="833342778" sldId="261"/>
+            <ac:grpSpMk id="106" creationId="{E54EDBA2-E203-497D-AB28-73A06B2DFDEE}"/>
+          </ac:grpSpMkLst>
+        </pc:grpChg>
+        <pc:picChg chg="add mod ord">
+          <ac:chgData name="Roy Liu" userId="755465ea-a681-4840-afaf-3106d4ded39d" providerId="ADAL" clId="{26A4DA2E-3B26-4A19-981B-FA4B6FD33F58}" dt="2023-09-26T11:37:16.616" v="839" actId="1076"/>
+          <ac:picMkLst>
+            <pc:docMk/>
+            <pc:sldMk cId="833342778" sldId="261"/>
+            <ac:picMk id="5" creationId="{FB218DE2-FC3D-8E76-7BFA-E86621CD02E0}"/>
+          </ac:picMkLst>
+        </pc:picChg>
+        <pc:picChg chg="add mod">
+          <ac:chgData name="Roy Liu" userId="755465ea-a681-4840-afaf-3106d4ded39d" providerId="ADAL" clId="{26A4DA2E-3B26-4A19-981B-FA4B6FD33F58}" dt="2023-09-26T11:38:54.265" v="841" actId="14826"/>
+          <ac:picMkLst>
+            <pc:docMk/>
+            <pc:sldMk cId="833342778" sldId="261"/>
+            <ac:picMk id="7" creationId="{EE3EA166-3E3C-09C5-0F51-348817C4A378}"/>
+          </ac:picMkLst>
+        </pc:picChg>
+      </pc:sldChg>
+      <pc:sldChg chg="modSp new mod">
+        <pc:chgData name="Roy Liu" userId="755465ea-a681-4840-afaf-3106d4ded39d" providerId="ADAL" clId="{26A4DA2E-3B26-4A19-981B-FA4B6FD33F58}" dt="2023-09-26T09:58:03.596" v="327" actId="20577"/>
+        <pc:sldMkLst>
+          <pc:docMk/>
+          <pc:sldMk cId="723807988" sldId="262"/>
+        </pc:sldMkLst>
+        <pc:spChg chg="mod">
+          <ac:chgData name="Roy Liu" userId="755465ea-a681-4840-afaf-3106d4ded39d" providerId="ADAL" clId="{26A4DA2E-3B26-4A19-981B-FA4B6FD33F58}" dt="2023-09-26T09:58:03.596" v="327" actId="20577"/>
+          <ac:spMkLst>
+            <pc:docMk/>
+            <pc:sldMk cId="723807988" sldId="262"/>
+            <ac:spMk id="2" creationId="{E9FCD3FF-F45B-8D90-0C9A-8B9444056B35}"/>
+          </ac:spMkLst>
+        </pc:spChg>
+      </pc:sldChg>
+      <pc:sldChg chg="new">
+        <pc:chgData name="Roy Liu" userId="755465ea-a681-4840-afaf-3106d4ded39d" providerId="ADAL" clId="{26A4DA2E-3B26-4A19-981B-FA4B6FD33F58}" dt="2023-09-26T09:58:07.628" v="328" actId="680"/>
+        <pc:sldMkLst>
+          <pc:docMk/>
+          <pc:sldMk cId="2129731390" sldId="263"/>
+        </pc:sldMkLst>
+      </pc:sldChg>
+      <pc:sldChg chg="addSp delSp modSp new mod setBg">
+        <pc:chgData name="Roy Liu" userId="755465ea-a681-4840-afaf-3106d4ded39d" providerId="ADAL" clId="{26A4DA2E-3B26-4A19-981B-FA4B6FD33F58}" dt="2023-09-27T10:06:48.402" v="1860" actId="20577"/>
+        <pc:sldMkLst>
+          <pc:docMk/>
+          <pc:sldMk cId="3854421792" sldId="264"/>
+        </pc:sldMkLst>
+        <pc:spChg chg="mod">
+          <ac:chgData name="Roy Liu" userId="755465ea-a681-4840-afaf-3106d4ded39d" providerId="ADAL" clId="{26A4DA2E-3B26-4A19-981B-FA4B6FD33F58}" dt="2023-09-27T09:56:02.713" v="1448" actId="20577"/>
+          <ac:spMkLst>
+            <pc:docMk/>
+            <pc:sldMk cId="3854421792" sldId="264"/>
+            <ac:spMk id="2" creationId="{30D33BD3-68A6-1A97-FA68-72D48555FE31}"/>
+          </ac:spMkLst>
+        </pc:spChg>
+        <pc:spChg chg="del">
+          <ac:chgData name="Roy Liu" userId="755465ea-a681-4840-afaf-3106d4ded39d" providerId="ADAL" clId="{26A4DA2E-3B26-4A19-981B-FA4B6FD33F58}" dt="2023-09-26T11:22:59.352" v="755" actId="26606"/>
+          <ac:spMkLst>
+            <pc:docMk/>
+            <pc:sldMk cId="3854421792" sldId="264"/>
+            <ac:spMk id="3" creationId="{9158AA1D-1B39-5503-1C8B-D93C5231A925}"/>
+          </ac:spMkLst>
+        </pc:spChg>
+        <pc:spChg chg="add del">
+          <ac:chgData name="Roy Liu" userId="755465ea-a681-4840-afaf-3106d4ded39d" providerId="ADAL" clId="{26A4DA2E-3B26-4A19-981B-FA4B6FD33F58}" dt="2023-09-26T11:23:20.471" v="757" actId="26606"/>
+          <ac:spMkLst>
+            <pc:docMk/>
+            <pc:sldMk cId="3854421792" sldId="264"/>
+            <ac:spMk id="10" creationId="{0BABF38A-8A0D-492E-BD20-6CF4D46B50BD}"/>
+          </ac:spMkLst>
+        </pc:spChg>
+        <pc:spChg chg="add del">
+          <ac:chgData name="Roy Liu" userId="755465ea-a681-4840-afaf-3106d4ded39d" providerId="ADAL" clId="{26A4DA2E-3B26-4A19-981B-FA4B6FD33F58}" dt="2023-09-26T11:23:20.471" v="757" actId="26606"/>
+          <ac:spMkLst>
+            <pc:docMk/>
+            <pc:sldMk cId="3854421792" sldId="264"/>
+            <ac:spMk id="14" creationId="{F1174801-1395-44C5-9B00-CCAC45C056E7}"/>
+          </ac:spMkLst>
+        </pc:spChg>
+        <pc:spChg chg="add del mod">
+          <ac:chgData name="Roy Liu" userId="755465ea-a681-4840-afaf-3106d4ded39d" providerId="ADAL" clId="{26A4DA2E-3B26-4A19-981B-FA4B6FD33F58}" dt="2023-09-26T11:33:38.416" v="807" actId="767"/>
+          <ac:spMkLst>
+            <pc:docMk/>
+            <pc:sldMk cId="3854421792" sldId="264"/>
+            <ac:spMk id="15" creationId="{612FC7FC-603D-33F5-0070-7BB01D7EC5D4}"/>
+          </ac:spMkLst>
+        </pc:spChg>
+        <pc:spChg chg="add del">
+          <ac:chgData name="Roy Liu" userId="755465ea-a681-4840-afaf-3106d4ded39d" providerId="ADAL" clId="{26A4DA2E-3B26-4A19-981B-FA4B6FD33F58}" dt="2023-09-26T11:23:20.471" v="757" actId="26606"/>
+          <ac:spMkLst>
+            <pc:docMk/>
+            <pc:sldMk cId="3854421792" sldId="264"/>
+            <ac:spMk id="16" creationId="{8BADB362-9771-4A3C-B9E5-6777F34C5041}"/>
+          </ac:spMkLst>
+        </pc:spChg>
+        <pc:spChg chg="add del mod">
+          <ac:chgData name="Roy Liu" userId="755465ea-a681-4840-afaf-3106d4ded39d" providerId="ADAL" clId="{26A4DA2E-3B26-4A19-981B-FA4B6FD33F58}" dt="2023-09-26T11:33:37.952" v="804" actId="767"/>
+          <ac:spMkLst>
+            <pc:docMk/>
+            <pc:sldMk cId="3854421792" sldId="264"/>
+            <ac:spMk id="17" creationId="{93479DC7-4C8A-F89F-3E4B-5881C91FD939}"/>
+          </ac:spMkLst>
+        </pc:spChg>
+        <pc:spChg chg="add del mod">
+          <ac:chgData name="Roy Liu" userId="755465ea-a681-4840-afaf-3106d4ded39d" providerId="ADAL" clId="{26A4DA2E-3B26-4A19-981B-FA4B6FD33F58}" dt="2023-09-27T10:06:48.402" v="1860" actId="20577"/>
+          <ac:spMkLst>
+            <pc:docMk/>
+            <pc:sldMk cId="3854421792" sldId="264"/>
+            <ac:spMk id="24" creationId="{FB105505-04CA-DC86-994C-17415E16A816}"/>
+          </ac:spMkLst>
+        </pc:spChg>
+        <pc:spChg chg="add">
+          <ac:chgData name="Roy Liu" userId="755465ea-a681-4840-afaf-3106d4ded39d" providerId="ADAL" clId="{26A4DA2E-3B26-4A19-981B-FA4B6FD33F58}" dt="2023-09-26T11:23:20.471" v="757" actId="26606"/>
+          <ac:spMkLst>
+            <pc:docMk/>
+            <pc:sldMk cId="3854421792" sldId="264"/>
+            <ac:spMk id="27" creationId="{8651CFA9-6065-4243-AC48-858E359780B1}"/>
+          </ac:spMkLst>
+        </pc:spChg>
+        <pc:spChg chg="add">
+          <ac:chgData name="Roy Liu" userId="755465ea-a681-4840-afaf-3106d4ded39d" providerId="ADAL" clId="{26A4DA2E-3B26-4A19-981B-FA4B6FD33F58}" dt="2023-09-26T11:23:20.471" v="757" actId="26606"/>
+          <ac:spMkLst>
+            <pc:docMk/>
+            <pc:sldMk cId="3854421792" sldId="264"/>
+            <ac:spMk id="29" creationId="{FBC8BBE5-981E-4B0B-9654-32B5668BFF31}"/>
+          </ac:spMkLst>
+        </pc:spChg>
+        <pc:grpChg chg="add del">
+          <ac:chgData name="Roy Liu" userId="755465ea-a681-4840-afaf-3106d4ded39d" providerId="ADAL" clId="{26A4DA2E-3B26-4A19-981B-FA4B6FD33F58}" dt="2023-09-26T11:23:20.471" v="757" actId="26606"/>
+          <ac:grpSpMkLst>
+            <pc:docMk/>
+            <pc:sldMk cId="3854421792" sldId="264"/>
+            <ac:grpSpMk id="18" creationId="{6C5D976F-50BF-4FEC-B797-AACEB2C35144}"/>
+          </ac:grpSpMkLst>
+        </pc:grpChg>
+        <pc:grpChg chg="add">
+          <ac:chgData name="Roy Liu" userId="755465ea-a681-4840-afaf-3106d4ded39d" providerId="ADAL" clId="{26A4DA2E-3B26-4A19-981B-FA4B6FD33F58}" dt="2023-09-26T11:23:20.471" v="757" actId="26606"/>
+          <ac:grpSpMkLst>
+            <pc:docMk/>
+            <pc:sldMk cId="3854421792" sldId="264"/>
+            <ac:grpSpMk id="31" creationId="{E54EDBA2-E203-497D-AB28-73A06B2DFDEE}"/>
+          </ac:grpSpMkLst>
+        </pc:grpChg>
+        <pc:picChg chg="add mod ord">
+          <ac:chgData name="Roy Liu" userId="755465ea-a681-4840-afaf-3106d4ded39d" providerId="ADAL" clId="{26A4DA2E-3B26-4A19-981B-FA4B6FD33F58}" dt="2023-09-26T11:29:05.643" v="773" actId="14100"/>
+          <ac:picMkLst>
+            <pc:docMk/>
+            <pc:sldMk cId="3854421792" sldId="264"/>
+            <ac:picMk id="5" creationId="{96936FE3-5CFA-7757-F1DE-FF4B00A109A8}"/>
+          </ac:picMkLst>
+        </pc:picChg>
+        <pc:picChg chg="add mod">
+          <ac:chgData name="Roy Liu" userId="755465ea-a681-4840-afaf-3106d4ded39d" providerId="ADAL" clId="{26A4DA2E-3B26-4A19-981B-FA4B6FD33F58}" dt="2023-09-26T11:28:28.063" v="770" actId="14826"/>
+          <ac:picMkLst>
+            <pc:docMk/>
+            <pc:sldMk cId="3854421792" sldId="264"/>
+            <ac:picMk id="7" creationId="{0FC2301A-6357-11A5-E913-C23B70C642F4}"/>
+          </ac:picMkLst>
+        </pc:picChg>
+        <pc:picChg chg="add del mod">
+          <ac:chgData name="Roy Liu" userId="755465ea-a681-4840-afaf-3106d4ded39d" providerId="ADAL" clId="{26A4DA2E-3B26-4A19-981B-FA4B6FD33F58}" dt="2023-09-26T11:32:24.825" v="783"/>
+          <ac:picMkLst>
+            <pc:docMk/>
+            <pc:sldMk cId="3854421792" sldId="264"/>
+            <ac:picMk id="9" creationId="{D50240B4-13E5-3BCA-F31F-13DA3D67DC41}"/>
+          </ac:picMkLst>
+        </pc:picChg>
+        <pc:picChg chg="add del">
+          <ac:chgData name="Roy Liu" userId="755465ea-a681-4840-afaf-3106d4ded39d" providerId="ADAL" clId="{26A4DA2E-3B26-4A19-981B-FA4B6FD33F58}" dt="2023-09-26T11:23:20.471" v="757" actId="26606"/>
+          <ac:picMkLst>
+            <pc:docMk/>
+            <pc:sldMk cId="3854421792" sldId="264"/>
+            <ac:picMk id="12" creationId="{BC526B7A-4801-4FD1-95C8-03AF22629E87}"/>
+          </ac:picMkLst>
+        </pc:picChg>
+        <pc:picChg chg="add del mod">
+          <ac:chgData name="Roy Liu" userId="755465ea-a681-4840-afaf-3106d4ded39d" providerId="ADAL" clId="{26A4DA2E-3B26-4A19-981B-FA4B6FD33F58}" dt="2023-09-26T11:33:39.635" v="809"/>
+          <ac:picMkLst>
+            <pc:docMk/>
+            <pc:sldMk cId="3854421792" sldId="264"/>
+            <ac:picMk id="13" creationId="{491E01A8-1008-15E9-3262-5AC90B860C51}"/>
+          </ac:picMkLst>
+        </pc:picChg>
+        <pc:picChg chg="add mod">
+          <ac:chgData name="Roy Liu" userId="755465ea-a681-4840-afaf-3106d4ded39d" providerId="ADAL" clId="{26A4DA2E-3B26-4A19-981B-FA4B6FD33F58}" dt="2023-09-26T11:33:54.593" v="821" actId="1076"/>
+          <ac:picMkLst>
+            <pc:docMk/>
+            <pc:sldMk cId="3854421792" sldId="264"/>
+            <ac:picMk id="22" creationId="{CF92AAA3-742D-F5AA-75F3-56814F81F59A}"/>
+          </ac:picMkLst>
+        </pc:picChg>
+      </pc:sldChg>
+      <pc:sldChg chg="modSp new mod">
+        <pc:chgData name="Roy Liu" userId="755465ea-a681-4840-afaf-3106d4ded39d" providerId="ADAL" clId="{26A4DA2E-3B26-4A19-981B-FA4B6FD33F58}" dt="2023-09-26T10:47:06.837" v="674" actId="20577"/>
+        <pc:sldMkLst>
+          <pc:docMk/>
+          <pc:sldMk cId="435654270" sldId="265"/>
+        </pc:sldMkLst>
+        <pc:spChg chg="mod">
+          <ac:chgData name="Roy Liu" userId="755465ea-a681-4840-afaf-3106d4ded39d" providerId="ADAL" clId="{26A4DA2E-3B26-4A19-981B-FA4B6FD33F58}" dt="2023-09-26T09:59:01.724" v="465" actId="20577"/>
+          <ac:spMkLst>
+            <pc:docMk/>
+            <pc:sldMk cId="435654270" sldId="265"/>
+            <ac:spMk id="2" creationId="{C467D37A-286A-5967-A2D3-A3CB3B01E5C0}"/>
+          </ac:spMkLst>
+        </pc:spChg>
+        <pc:spChg chg="mod">
+          <ac:chgData name="Roy Liu" userId="755465ea-a681-4840-afaf-3106d4ded39d" providerId="ADAL" clId="{26A4DA2E-3B26-4A19-981B-FA4B6FD33F58}" dt="2023-09-26T10:47:06.837" v="674" actId="20577"/>
+          <ac:spMkLst>
+            <pc:docMk/>
+            <pc:sldMk cId="435654270" sldId="265"/>
+            <ac:spMk id="3" creationId="{7F2E4967-6631-E036-3C10-AB476F921C5F}"/>
+          </ac:spMkLst>
+        </pc:spChg>
+      </pc:sldChg>
+      <pc:sldChg chg="modSp mod">
+        <pc:chgData name="Roy Liu" userId="755465ea-a681-4840-afaf-3106d4ded39d" providerId="ADAL" clId="{26A4DA2E-3B26-4A19-981B-FA4B6FD33F58}" dt="2023-09-26T11:30:56.916" v="775" actId="313"/>
+        <pc:sldMkLst>
+          <pc:docMk/>
+          <pc:sldMk cId="3257955536" sldId="268"/>
+        </pc:sldMkLst>
+        <pc:spChg chg="mod">
+          <ac:chgData name="Roy Liu" userId="755465ea-a681-4840-afaf-3106d4ded39d" providerId="ADAL" clId="{26A4DA2E-3B26-4A19-981B-FA4B6FD33F58}" dt="2023-09-26T11:30:56.916" v="775" actId="313"/>
+          <ac:spMkLst>
+            <pc:docMk/>
+            <pc:sldMk cId="3257955536" sldId="268"/>
+            <ac:spMk id="3" creationId="{40D137FA-18A4-4E72-3B1A-E45AE21D012B}"/>
+          </ac:spMkLst>
+        </pc:spChg>
+      </pc:sldChg>
+      <pc:sldChg chg="addSp delSp modSp new mod setBg">
+        <pc:chgData name="Roy Liu" userId="755465ea-a681-4840-afaf-3106d4ded39d" providerId="ADAL" clId="{26A4DA2E-3B26-4A19-981B-FA4B6FD33F58}" dt="2023-10-01T17:13:08.855" v="2130" actId="20577"/>
         <pc:sldMkLst>
           <pc:docMk/>
           <pc:sldMk cId="3751505815" sldId="269"/>
         </pc:sldMkLst>
         <pc:spChg chg="mod">
-          <ac:chgData name="Viktória Szabó" userId="S::viktoria22000@student.hamk.fi::55ff7ae3-70d3-4f82-942e-28ce8109f0e2" providerId="AD" clId="Web-{2FDE26DA-918B-C5FD-BEDC-B05DF466947D}" dt="2023-09-27T10:08:32.022" v="232" actId="20577"/>
+          <ac:chgData name="Roy Liu" userId="755465ea-a681-4840-afaf-3106d4ded39d" providerId="ADAL" clId="{26A4DA2E-3B26-4A19-981B-FA4B6FD33F58}" dt="2023-10-01T17:12:21.860" v="2129" actId="20577"/>
+          <ac:spMkLst>
+            <pc:docMk/>
+            <pc:sldMk cId="3751505815" sldId="269"/>
+            <ac:spMk id="2" creationId="{88013891-86EF-454E-0A39-BC7185B11C4F}"/>
+          </ac:spMkLst>
+        </pc:spChg>
+        <pc:spChg chg="del mod">
+          <ac:chgData name="Roy Liu" userId="755465ea-a681-4840-afaf-3106d4ded39d" providerId="ADAL" clId="{26A4DA2E-3B26-4A19-981B-FA4B6FD33F58}" dt="2023-10-01T17:04:07.263" v="1862"/>
           <ac:spMkLst>
             <pc:docMk/>
             <pc:sldMk cId="3751505815" sldId="269"/>
             <ac:spMk id="3" creationId="{284301AF-09D3-6BEB-2BC6-2BDF6F9CBC62}"/>
           </ac:spMkLst>
         </pc:spChg>
+        <pc:spChg chg="add mod ord">
+          <ac:chgData name="Roy Liu" userId="755465ea-a681-4840-afaf-3106d4ded39d" providerId="ADAL" clId="{26A4DA2E-3B26-4A19-981B-FA4B6FD33F58}" dt="2023-10-01T17:13:08.855" v="2130" actId="20577"/>
+          <ac:spMkLst>
+            <pc:docMk/>
+            <pc:sldMk cId="3751505815" sldId="269"/>
+            <ac:spMk id="9" creationId="{A751F638-9411-D00F-1726-CFD6AAA8845B}"/>
+          </ac:spMkLst>
+        </pc:spChg>
+        <pc:spChg chg="add del">
+          <ac:chgData name="Roy Liu" userId="755465ea-a681-4840-afaf-3106d4ded39d" providerId="ADAL" clId="{26A4DA2E-3B26-4A19-981B-FA4B6FD33F58}" dt="2023-10-01T17:05:11.649" v="1866" actId="26606"/>
+          <ac:spMkLst>
+            <pc:docMk/>
+            <pc:sldMk cId="3751505815" sldId="269"/>
+            <ac:spMk id="12" creationId="{A4FB2F27-3F7D-440E-A905-86607A926A29}"/>
+          </ac:spMkLst>
+        </pc:spChg>
+        <pc:spChg chg="add del">
+          <ac:chgData name="Roy Liu" userId="755465ea-a681-4840-afaf-3106d4ded39d" providerId="ADAL" clId="{26A4DA2E-3B26-4A19-981B-FA4B6FD33F58}" dt="2023-10-01T17:05:11.649" v="1866" actId="26606"/>
+          <ac:spMkLst>
+            <pc:docMk/>
+            <pc:sldMk cId="3751505815" sldId="269"/>
+            <ac:spMk id="14" creationId="{AF678C14-A033-4139-BCA9-8382B039648B}"/>
+          </ac:spMkLst>
+        </pc:spChg>
+        <pc:spChg chg="add">
+          <ac:chgData name="Roy Liu" userId="755465ea-a681-4840-afaf-3106d4ded39d" providerId="ADAL" clId="{26A4DA2E-3B26-4A19-981B-FA4B6FD33F58}" dt="2023-10-01T17:05:11.649" v="1866" actId="26606"/>
+          <ac:spMkLst>
+            <pc:docMk/>
+            <pc:sldMk cId="3751505815" sldId="269"/>
+            <ac:spMk id="23" creationId="{A4FB2F27-3F7D-440E-A905-86607A926A29}"/>
+          </ac:spMkLst>
+        </pc:spChg>
+        <pc:spChg chg="add">
+          <ac:chgData name="Roy Liu" userId="755465ea-a681-4840-afaf-3106d4ded39d" providerId="ADAL" clId="{26A4DA2E-3B26-4A19-981B-FA4B6FD33F58}" dt="2023-10-01T17:05:11.649" v="1866" actId="26606"/>
+          <ac:spMkLst>
+            <pc:docMk/>
+            <pc:sldMk cId="3751505815" sldId="269"/>
+            <ac:spMk id="25" creationId="{AF678C14-A033-4139-BCA9-8382B039648B}"/>
+          </ac:spMkLst>
+        </pc:spChg>
+        <pc:grpChg chg="add del">
+          <ac:chgData name="Roy Liu" userId="755465ea-a681-4840-afaf-3106d4ded39d" providerId="ADAL" clId="{26A4DA2E-3B26-4A19-981B-FA4B6FD33F58}" dt="2023-10-01T17:05:11.649" v="1866" actId="26606"/>
+          <ac:grpSpMkLst>
+            <pc:docMk/>
+            <pc:sldMk cId="3751505815" sldId="269"/>
+            <ac:grpSpMk id="16" creationId="{3489A2D2-B3AA-488C-B20E-15DBB97548C6}"/>
+          </ac:grpSpMkLst>
+        </pc:grpChg>
+        <pc:grpChg chg="add">
+          <ac:chgData name="Roy Liu" userId="755465ea-a681-4840-afaf-3106d4ded39d" providerId="ADAL" clId="{26A4DA2E-3B26-4A19-981B-FA4B6FD33F58}" dt="2023-10-01T17:05:11.649" v="1866" actId="26606"/>
+          <ac:grpSpMkLst>
+            <pc:docMk/>
+            <pc:sldMk cId="3751505815" sldId="269"/>
+            <ac:grpSpMk id="27" creationId="{F54E156B-C3CF-4290-AAE3-FA3BD6BE8456}"/>
+          </ac:grpSpMkLst>
+        </pc:grpChg>
+        <pc:picChg chg="add mod">
+          <ac:chgData name="Roy Liu" userId="755465ea-a681-4840-afaf-3106d4ded39d" providerId="ADAL" clId="{26A4DA2E-3B26-4A19-981B-FA4B6FD33F58}" dt="2023-10-01T17:05:56.550" v="1874" actId="14100"/>
+          <ac:picMkLst>
+            <pc:docMk/>
+            <pc:sldMk cId="3751505815" sldId="269"/>
+            <ac:picMk id="5" creationId="{4F149E62-64F5-8A18-7178-7C0266DA5581}"/>
+          </ac:picMkLst>
+        </pc:picChg>
+        <pc:picChg chg="add mod">
+          <ac:chgData name="Roy Liu" userId="755465ea-a681-4840-afaf-3106d4ded39d" providerId="ADAL" clId="{26A4DA2E-3B26-4A19-981B-FA4B6FD33F58}" dt="2023-10-01T17:07:15.262" v="1880" actId="1076"/>
+          <ac:picMkLst>
+            <pc:docMk/>
+            <pc:sldMk cId="3751505815" sldId="269"/>
+            <ac:picMk id="7" creationId="{C800F6F5-EBD3-B533-78F5-EAE29261AAE8}"/>
+          </ac:picMkLst>
+        </pc:picChg>
+        <pc:picChg chg="add mod">
+          <ac:chgData name="Roy Liu" userId="755465ea-a681-4840-afaf-3106d4ded39d" providerId="ADAL" clId="{26A4DA2E-3B26-4A19-981B-FA4B6FD33F58}" dt="2023-10-01T17:05:41.479" v="1868" actId="1076"/>
+          <ac:picMkLst>
+            <pc:docMk/>
+            <pc:sldMk cId="3751505815" sldId="269"/>
+            <ac:picMk id="10" creationId="{0BFC9D82-9049-A6E7-BFFC-45D0C0449163}"/>
+          </ac:picMkLst>
+        </pc:picChg>
+        <pc:picChg chg="add mod">
+          <ac:chgData name="Roy Liu" userId="755465ea-a681-4840-afaf-3106d4ded39d" providerId="ADAL" clId="{26A4DA2E-3B26-4A19-981B-FA4B6FD33F58}" dt="2023-10-01T17:07:12.364" v="1879" actId="1076"/>
+          <ac:picMkLst>
+            <pc:docMk/>
+            <pc:sldMk cId="3751505815" sldId="269"/>
+            <ac:picMk id="13" creationId="{DA80BC7E-9CCE-6BDE-B33F-3B42045F189C}"/>
+          </ac:picMkLst>
+        </pc:picChg>
       </pc:sldChg>
+      <pc:sldMasterChg chg="add del addSldLayout delSldLayout">
+        <pc:chgData name="Roy Liu" userId="755465ea-a681-4840-afaf-3106d4ded39d" providerId="ADAL" clId="{26A4DA2E-3B26-4A19-981B-FA4B6FD33F58}" dt="2023-09-20T11:39:52.354" v="148" actId="26606"/>
+        <pc:sldMasterMkLst>
+          <pc:docMk/>
+          <pc:sldMasterMk cId="789219319" sldId="2147483660"/>
+        </pc:sldMasterMkLst>
+        <pc:sldLayoutChg chg="add del">
+          <pc:chgData name="Roy Liu" userId="755465ea-a681-4840-afaf-3106d4ded39d" providerId="ADAL" clId="{26A4DA2E-3B26-4A19-981B-FA4B6FD33F58}" dt="2023-09-20T11:39:52.354" v="148" actId="26606"/>
+          <pc:sldLayoutMkLst>
+            <pc:docMk/>
+            <pc:sldMasterMk cId="789219319" sldId="2147483660"/>
+            <pc:sldLayoutMk cId="1809636922" sldId="2147483661"/>
+          </pc:sldLayoutMkLst>
+        </pc:sldLayoutChg>
+        <pc:sldLayoutChg chg="add del">
+          <pc:chgData name="Roy Liu" userId="755465ea-a681-4840-afaf-3106d4ded39d" providerId="ADAL" clId="{26A4DA2E-3B26-4A19-981B-FA4B6FD33F58}" dt="2023-09-20T11:39:52.354" v="148" actId="26606"/>
+          <pc:sldLayoutMkLst>
+            <pc:docMk/>
+            <pc:sldMasterMk cId="789219319" sldId="2147483660"/>
+            <pc:sldLayoutMk cId="2101453903" sldId="2147483662"/>
+          </pc:sldLayoutMkLst>
+        </pc:sldLayoutChg>
+        <pc:sldLayoutChg chg="add del">
+          <pc:chgData name="Roy Liu" userId="755465ea-a681-4840-afaf-3106d4ded39d" providerId="ADAL" clId="{26A4DA2E-3B26-4A19-981B-FA4B6FD33F58}" dt="2023-09-20T11:39:52.354" v="148" actId="26606"/>
+          <pc:sldLayoutMkLst>
+            <pc:docMk/>
+            <pc:sldMasterMk cId="789219319" sldId="2147483660"/>
+            <pc:sldLayoutMk cId="1251068635" sldId="2147483663"/>
+          </pc:sldLayoutMkLst>
+        </pc:sldLayoutChg>
+        <pc:sldLayoutChg chg="add del">
+          <pc:chgData name="Roy Liu" userId="755465ea-a681-4840-afaf-3106d4ded39d" providerId="ADAL" clId="{26A4DA2E-3B26-4A19-981B-FA4B6FD33F58}" dt="2023-09-20T11:39:52.354" v="148" actId="26606"/>
+          <pc:sldLayoutMkLst>
+            <pc:docMk/>
+            <pc:sldMasterMk cId="789219319" sldId="2147483660"/>
+            <pc:sldLayoutMk cId="2552483535" sldId="2147483664"/>
+          </pc:sldLayoutMkLst>
+        </pc:sldLayoutChg>
+        <pc:sldLayoutChg chg="add del">
+          <pc:chgData name="Roy Liu" userId="755465ea-a681-4840-afaf-3106d4ded39d" providerId="ADAL" clId="{26A4DA2E-3B26-4A19-981B-FA4B6FD33F58}" dt="2023-09-20T11:39:52.354" v="148" actId="26606"/>
+          <pc:sldLayoutMkLst>
+            <pc:docMk/>
+            <pc:sldMasterMk cId="789219319" sldId="2147483660"/>
+            <pc:sldLayoutMk cId="2033678604" sldId="2147483665"/>
+          </pc:sldLayoutMkLst>
+        </pc:sldLayoutChg>
+        <pc:sldLayoutChg chg="add del">
+          <pc:chgData name="Roy Liu" userId="755465ea-a681-4840-afaf-3106d4ded39d" providerId="ADAL" clId="{26A4DA2E-3B26-4A19-981B-FA4B6FD33F58}" dt="2023-09-20T11:39:52.354" v="148" actId="26606"/>
+          <pc:sldLayoutMkLst>
+            <pc:docMk/>
+            <pc:sldMasterMk cId="789219319" sldId="2147483660"/>
+            <pc:sldLayoutMk cId="1859807123" sldId="2147483666"/>
+          </pc:sldLayoutMkLst>
+        </pc:sldLayoutChg>
+        <pc:sldLayoutChg chg="add del">
+          <pc:chgData name="Roy Liu" userId="755465ea-a681-4840-afaf-3106d4ded39d" providerId="ADAL" clId="{26A4DA2E-3B26-4A19-981B-FA4B6FD33F58}" dt="2023-09-20T11:39:52.354" v="148" actId="26606"/>
+          <pc:sldLayoutMkLst>
+            <pc:docMk/>
+            <pc:sldMasterMk cId="789219319" sldId="2147483660"/>
+            <pc:sldLayoutMk cId="883036279" sldId="2147483667"/>
+          </pc:sldLayoutMkLst>
+        </pc:sldLayoutChg>
+        <pc:sldLayoutChg chg="add del">
+          <pc:chgData name="Roy Liu" userId="755465ea-a681-4840-afaf-3106d4ded39d" providerId="ADAL" clId="{26A4DA2E-3B26-4A19-981B-FA4B6FD33F58}" dt="2023-09-20T11:39:52.354" v="148" actId="26606"/>
+          <pc:sldLayoutMkLst>
+            <pc:docMk/>
+            <pc:sldMasterMk cId="789219319" sldId="2147483660"/>
+            <pc:sldLayoutMk cId="728350495" sldId="2147483668"/>
+          </pc:sldLayoutMkLst>
+        </pc:sldLayoutChg>
+        <pc:sldLayoutChg chg="add del">
+          <pc:chgData name="Roy Liu" userId="755465ea-a681-4840-afaf-3106d4ded39d" providerId="ADAL" clId="{26A4DA2E-3B26-4A19-981B-FA4B6FD33F58}" dt="2023-09-20T11:39:52.354" v="148" actId="26606"/>
+          <pc:sldLayoutMkLst>
+            <pc:docMk/>
+            <pc:sldMasterMk cId="789219319" sldId="2147483660"/>
+            <pc:sldLayoutMk cId="2132223704" sldId="2147483669"/>
+          </pc:sldLayoutMkLst>
+        </pc:sldLayoutChg>
+        <pc:sldLayoutChg chg="add del">
+          <pc:chgData name="Roy Liu" userId="755465ea-a681-4840-afaf-3106d4ded39d" providerId="ADAL" clId="{26A4DA2E-3B26-4A19-981B-FA4B6FD33F58}" dt="2023-09-20T11:39:52.354" v="148" actId="26606"/>
+          <pc:sldLayoutMkLst>
+            <pc:docMk/>
+            <pc:sldMasterMk cId="789219319" sldId="2147483660"/>
+            <pc:sldLayoutMk cId="173961049" sldId="2147483670"/>
+          </pc:sldLayoutMkLst>
+        </pc:sldLayoutChg>
+        <pc:sldLayoutChg chg="add del">
+          <pc:chgData name="Roy Liu" userId="755465ea-a681-4840-afaf-3106d4ded39d" providerId="ADAL" clId="{26A4DA2E-3B26-4A19-981B-FA4B6FD33F58}" dt="2023-09-20T11:39:52.354" v="148" actId="26606"/>
+          <pc:sldLayoutMkLst>
+            <pc:docMk/>
+            <pc:sldMasterMk cId="789219319" sldId="2147483660"/>
+            <pc:sldLayoutMk cId="2950409454" sldId="2147483671"/>
+          </pc:sldLayoutMkLst>
+        </pc:sldLayoutChg>
+      </pc:sldMasterChg>
+      <pc:sldMasterChg chg="add del replId addSldLayout delSldLayout">
+        <pc:chgData name="Roy Liu" userId="755465ea-a681-4840-afaf-3106d4ded39d" providerId="ADAL" clId="{26A4DA2E-3B26-4A19-981B-FA4B6FD33F58}" dt="2023-09-20T11:39:10.769" v="139" actId="26606"/>
+        <pc:sldMasterMkLst>
+          <pc:docMk/>
+          <pc:sldMasterMk cId="4127245905" sldId="2147483672"/>
+        </pc:sldMasterMkLst>
+        <pc:sldLayoutChg chg="add del">
+          <pc:chgData name="Roy Liu" userId="755465ea-a681-4840-afaf-3106d4ded39d" providerId="ADAL" clId="{26A4DA2E-3B26-4A19-981B-FA4B6FD33F58}" dt="2023-09-20T11:39:10.769" v="139" actId="26606"/>
+          <pc:sldLayoutMkLst>
+            <pc:docMk/>
+            <pc:sldMasterMk cId="4127245905" sldId="2147483672"/>
+            <pc:sldLayoutMk cId="1429118868" sldId="2147483673"/>
+          </pc:sldLayoutMkLst>
+        </pc:sldLayoutChg>
+        <pc:sldLayoutChg chg="add del replId">
+          <pc:chgData name="Roy Liu" userId="755465ea-a681-4840-afaf-3106d4ded39d" providerId="ADAL" clId="{26A4DA2E-3B26-4A19-981B-FA4B6FD33F58}" dt="2023-09-20T11:39:10.769" v="139" actId="26606"/>
+          <pc:sldLayoutMkLst>
+            <pc:docMk/>
+            <pc:sldMasterMk cId="4127245905" sldId="2147483672"/>
+            <pc:sldLayoutMk cId="1612413609" sldId="2147483674"/>
+          </pc:sldLayoutMkLst>
+        </pc:sldLayoutChg>
+        <pc:sldLayoutChg chg="add del replId">
+          <pc:chgData name="Roy Liu" userId="755465ea-a681-4840-afaf-3106d4ded39d" providerId="ADAL" clId="{26A4DA2E-3B26-4A19-981B-FA4B6FD33F58}" dt="2023-09-20T11:39:10.769" v="139" actId="26606"/>
+          <pc:sldLayoutMkLst>
+            <pc:docMk/>
+            <pc:sldMasterMk cId="4127245905" sldId="2147483672"/>
+            <pc:sldLayoutMk cId="838334733" sldId="2147483675"/>
+          </pc:sldLayoutMkLst>
+        </pc:sldLayoutChg>
+        <pc:sldLayoutChg chg="add del replId">
+          <pc:chgData name="Roy Liu" userId="755465ea-a681-4840-afaf-3106d4ded39d" providerId="ADAL" clId="{26A4DA2E-3B26-4A19-981B-FA4B6FD33F58}" dt="2023-09-20T11:39:10.769" v="139" actId="26606"/>
+          <pc:sldLayoutMkLst>
+            <pc:docMk/>
+            <pc:sldMasterMk cId="4127245905" sldId="2147483672"/>
+            <pc:sldLayoutMk cId="3846711166" sldId="2147483676"/>
+          </pc:sldLayoutMkLst>
+        </pc:sldLayoutChg>
+        <pc:sldLayoutChg chg="add del replId">
+          <pc:chgData name="Roy Liu" userId="755465ea-a681-4840-afaf-3106d4ded39d" providerId="ADAL" clId="{26A4DA2E-3B26-4A19-981B-FA4B6FD33F58}" dt="2023-09-20T11:39:10.769" v="139" actId="26606"/>
+          <pc:sldLayoutMkLst>
+            <pc:docMk/>
+            <pc:sldMasterMk cId="4127245905" sldId="2147483672"/>
+            <pc:sldLayoutMk cId="2652795275" sldId="2147483677"/>
+          </pc:sldLayoutMkLst>
+        </pc:sldLayoutChg>
+        <pc:sldLayoutChg chg="add del replId">
+          <pc:chgData name="Roy Liu" userId="755465ea-a681-4840-afaf-3106d4ded39d" providerId="ADAL" clId="{26A4DA2E-3B26-4A19-981B-FA4B6FD33F58}" dt="2023-09-20T11:39:10.769" v="139" actId="26606"/>
+          <pc:sldLayoutMkLst>
+            <pc:docMk/>
+            <pc:sldMasterMk cId="4127245905" sldId="2147483672"/>
+            <pc:sldLayoutMk cId="4201483436" sldId="2147483678"/>
+          </pc:sldLayoutMkLst>
+        </pc:sldLayoutChg>
+        <pc:sldLayoutChg chg="add del replId">
+          <pc:chgData name="Roy Liu" userId="755465ea-a681-4840-afaf-3106d4ded39d" providerId="ADAL" clId="{26A4DA2E-3B26-4A19-981B-FA4B6FD33F58}" dt="2023-09-20T11:39:10.769" v="139" actId="26606"/>
+          <pc:sldLayoutMkLst>
+            <pc:docMk/>
+            <pc:sldMasterMk cId="4127245905" sldId="2147483672"/>
+            <pc:sldLayoutMk cId="3069532564" sldId="2147483679"/>
+          </pc:sldLayoutMkLst>
+        </pc:sldLayoutChg>
+        <pc:sldLayoutChg chg="add del replId">
+          <pc:chgData name="Roy Liu" userId="755465ea-a681-4840-afaf-3106d4ded39d" providerId="ADAL" clId="{26A4DA2E-3B26-4A19-981B-FA4B6FD33F58}" dt="2023-09-20T11:39:10.769" v="139" actId="26606"/>
+          <pc:sldLayoutMkLst>
+            <pc:docMk/>
+            <pc:sldMasterMk cId="4127245905" sldId="2147483672"/>
+            <pc:sldLayoutMk cId="1984730009" sldId="2147483680"/>
+          </pc:sldLayoutMkLst>
+        </pc:sldLayoutChg>
+        <pc:sldLayoutChg chg="add del replId">
+          <pc:chgData name="Roy Liu" userId="755465ea-a681-4840-afaf-3106d4ded39d" providerId="ADAL" clId="{26A4DA2E-3B26-4A19-981B-FA4B6FD33F58}" dt="2023-09-20T11:39:10.769" v="139" actId="26606"/>
+          <pc:sldLayoutMkLst>
+            <pc:docMk/>
+            <pc:sldMasterMk cId="4127245905" sldId="2147483672"/>
+            <pc:sldLayoutMk cId="1973024183" sldId="2147483681"/>
+          </pc:sldLayoutMkLst>
+        </pc:sldLayoutChg>
+        <pc:sldLayoutChg chg="add del replId">
+          <pc:chgData name="Roy Liu" userId="755465ea-a681-4840-afaf-3106d4ded39d" providerId="ADAL" clId="{26A4DA2E-3B26-4A19-981B-FA4B6FD33F58}" dt="2023-09-20T11:39:10.769" v="139" actId="26606"/>
+          <pc:sldLayoutMkLst>
+            <pc:docMk/>
+            <pc:sldMasterMk cId="4127245905" sldId="2147483672"/>
+            <pc:sldLayoutMk cId="3356146414" sldId="2147483682"/>
+          </pc:sldLayoutMkLst>
+        </pc:sldLayoutChg>
+        <pc:sldLayoutChg chg="add del replId">
+          <pc:chgData name="Roy Liu" userId="755465ea-a681-4840-afaf-3106d4ded39d" providerId="ADAL" clId="{26A4DA2E-3B26-4A19-981B-FA4B6FD33F58}" dt="2023-09-20T11:39:10.769" v="139" actId="26606"/>
+          <pc:sldLayoutMkLst>
+            <pc:docMk/>
+            <pc:sldMasterMk cId="4127245905" sldId="2147483672"/>
+            <pc:sldLayoutMk cId="4135450878" sldId="2147483683"/>
+          </pc:sldLayoutMkLst>
+        </pc:sldLayoutChg>
+      </pc:sldMasterChg>
+      <pc:sldMasterChg chg="add del addSldLayout delSldLayout">
+        <pc:chgData name="Roy Liu" userId="755465ea-a681-4840-afaf-3106d4ded39d" providerId="ADAL" clId="{26A4DA2E-3B26-4A19-981B-FA4B6FD33F58}" dt="2023-09-20T11:39:52.354" v="148" actId="26606"/>
+        <pc:sldMasterMkLst>
+          <pc:docMk/>
+          <pc:sldMasterMk cId="3139187229" sldId="2147483698"/>
+        </pc:sldMasterMkLst>
+        <pc:sldLayoutChg chg="add del">
+          <pc:chgData name="Roy Liu" userId="755465ea-a681-4840-afaf-3106d4ded39d" providerId="ADAL" clId="{26A4DA2E-3B26-4A19-981B-FA4B6FD33F58}" dt="2023-09-20T11:39:52.354" v="148" actId="26606"/>
+          <pc:sldLayoutMkLst>
+            <pc:docMk/>
+            <pc:sldMasterMk cId="3139187229" sldId="2147483698"/>
+            <pc:sldLayoutMk cId="356345958" sldId="2147483687"/>
+          </pc:sldLayoutMkLst>
+        </pc:sldLayoutChg>
+        <pc:sldLayoutChg chg="add del">
+          <pc:chgData name="Roy Liu" userId="755465ea-a681-4840-afaf-3106d4ded39d" providerId="ADAL" clId="{26A4DA2E-3B26-4A19-981B-FA4B6FD33F58}" dt="2023-09-20T11:39:52.354" v="148" actId="26606"/>
+          <pc:sldLayoutMkLst>
+            <pc:docMk/>
+            <pc:sldMasterMk cId="3139187229" sldId="2147483698"/>
+            <pc:sldLayoutMk cId="2704023781" sldId="2147483688"/>
+          </pc:sldLayoutMkLst>
+        </pc:sldLayoutChg>
+        <pc:sldLayoutChg chg="add del">
+          <pc:chgData name="Roy Liu" userId="755465ea-a681-4840-afaf-3106d4ded39d" providerId="ADAL" clId="{26A4DA2E-3B26-4A19-981B-FA4B6FD33F58}" dt="2023-09-20T11:39:52.354" v="148" actId="26606"/>
+          <pc:sldLayoutMkLst>
+            <pc:docMk/>
+            <pc:sldMasterMk cId="3139187229" sldId="2147483698"/>
+            <pc:sldLayoutMk cId="395939718" sldId="2147483689"/>
+          </pc:sldLayoutMkLst>
+        </pc:sldLayoutChg>
+        <pc:sldLayoutChg chg="add del">
+          <pc:chgData name="Roy Liu" userId="755465ea-a681-4840-afaf-3106d4ded39d" providerId="ADAL" clId="{26A4DA2E-3B26-4A19-981B-FA4B6FD33F58}" dt="2023-09-20T11:39:52.354" v="148" actId="26606"/>
+          <pc:sldLayoutMkLst>
+            <pc:docMk/>
+            <pc:sldMasterMk cId="3139187229" sldId="2147483698"/>
+            <pc:sldLayoutMk cId="2278752544" sldId="2147483690"/>
+          </pc:sldLayoutMkLst>
+        </pc:sldLayoutChg>
+        <pc:sldLayoutChg chg="add del">
+          <pc:chgData name="Roy Liu" userId="755465ea-a681-4840-afaf-3106d4ded39d" providerId="ADAL" clId="{26A4DA2E-3B26-4A19-981B-FA4B6FD33F58}" dt="2023-09-20T11:39:52.354" v="148" actId="26606"/>
+          <pc:sldLayoutMkLst>
+            <pc:docMk/>
+            <pc:sldMasterMk cId="3139187229" sldId="2147483698"/>
+            <pc:sldLayoutMk cId="1225069123" sldId="2147483691"/>
+          </pc:sldLayoutMkLst>
+        </pc:sldLayoutChg>
+        <pc:sldLayoutChg chg="add del">
+          <pc:chgData name="Roy Liu" userId="755465ea-a681-4840-afaf-3106d4ded39d" providerId="ADAL" clId="{26A4DA2E-3B26-4A19-981B-FA4B6FD33F58}" dt="2023-09-20T11:39:52.354" v="148" actId="26606"/>
+          <pc:sldLayoutMkLst>
+            <pc:docMk/>
+            <pc:sldMasterMk cId="3139187229" sldId="2147483698"/>
+            <pc:sldLayoutMk cId="1946154289" sldId="2147483692"/>
+          </pc:sldLayoutMkLst>
+        </pc:sldLayoutChg>
+        <pc:sldLayoutChg chg="add del">
+          <pc:chgData name="Roy Liu" userId="755465ea-a681-4840-afaf-3106d4ded39d" providerId="ADAL" clId="{26A4DA2E-3B26-4A19-981B-FA4B6FD33F58}" dt="2023-09-20T11:39:52.354" v="148" actId="26606"/>
+          <pc:sldLayoutMkLst>
+            <pc:docMk/>
+            <pc:sldMasterMk cId="3139187229" sldId="2147483698"/>
+            <pc:sldLayoutMk cId="84961155" sldId="2147483693"/>
+          </pc:sldLayoutMkLst>
+        </pc:sldLayoutChg>
+        <pc:sldLayoutChg chg="add del">
+          <pc:chgData name="Roy Liu" userId="755465ea-a681-4840-afaf-3106d4ded39d" providerId="ADAL" clId="{26A4DA2E-3B26-4A19-981B-FA4B6FD33F58}" dt="2023-09-20T11:39:52.354" v="148" actId="26606"/>
+          <pc:sldLayoutMkLst>
+            <pc:docMk/>
+            <pc:sldMasterMk cId="3139187229" sldId="2147483698"/>
+            <pc:sldLayoutMk cId="2385091365" sldId="2147483694"/>
+          </pc:sldLayoutMkLst>
+        </pc:sldLayoutChg>
+        <pc:sldLayoutChg chg="add del">
+          <pc:chgData name="Roy Liu" userId="755465ea-a681-4840-afaf-3106d4ded39d" providerId="ADAL" clId="{26A4DA2E-3B26-4A19-981B-FA4B6FD33F58}" dt="2023-09-20T11:39:52.354" v="148" actId="26606"/>
+          <pc:sldLayoutMkLst>
+            <pc:docMk/>
+            <pc:sldMasterMk cId="3139187229" sldId="2147483698"/>
+            <pc:sldLayoutMk cId="1982246214" sldId="2147483695"/>
+          </pc:sldLayoutMkLst>
+        </pc:sldLayoutChg>
+        <pc:sldLayoutChg chg="add del">
+          <pc:chgData name="Roy Liu" userId="755465ea-a681-4840-afaf-3106d4ded39d" providerId="ADAL" clId="{26A4DA2E-3B26-4A19-981B-FA4B6FD33F58}" dt="2023-09-20T11:39:52.354" v="148" actId="26606"/>
+          <pc:sldLayoutMkLst>
+            <pc:docMk/>
+            <pc:sldMasterMk cId="3139187229" sldId="2147483698"/>
+            <pc:sldLayoutMk cId="2416492150" sldId="2147483696"/>
+          </pc:sldLayoutMkLst>
+        </pc:sldLayoutChg>
+        <pc:sldLayoutChg chg="add del">
+          <pc:chgData name="Roy Liu" userId="755465ea-a681-4840-afaf-3106d4ded39d" providerId="ADAL" clId="{26A4DA2E-3B26-4A19-981B-FA4B6FD33F58}" dt="2023-09-20T11:39:52.354" v="148" actId="26606"/>
+          <pc:sldLayoutMkLst>
+            <pc:docMk/>
+            <pc:sldMasterMk cId="3139187229" sldId="2147483698"/>
+            <pc:sldLayoutMk cId="378628906" sldId="2147483697"/>
+          </pc:sldLayoutMkLst>
+        </pc:sldLayoutChg>
+      </pc:sldMasterChg>
+      <pc:sldMasterChg chg="add del addSldLayout delSldLayout">
+        <pc:chgData name="Roy Liu" userId="755465ea-a681-4840-afaf-3106d4ded39d" providerId="ADAL" clId="{26A4DA2E-3B26-4A19-981B-FA4B6FD33F58}" dt="2023-09-20T11:39:49.982" v="145" actId="26606"/>
+        <pc:sldMasterMkLst>
+          <pc:docMk/>
+          <pc:sldMasterMk cId="4137531801" sldId="2147483750"/>
+        </pc:sldMasterMkLst>
+        <pc:sldLayoutChg chg="add del">
+          <pc:chgData name="Roy Liu" userId="755465ea-a681-4840-afaf-3106d4ded39d" providerId="ADAL" clId="{26A4DA2E-3B26-4A19-981B-FA4B6FD33F58}" dt="2023-09-20T11:39:49.982" v="145" actId="26606"/>
+          <pc:sldLayoutMkLst>
+            <pc:docMk/>
+            <pc:sldMasterMk cId="4137531801" sldId="2147483750"/>
+            <pc:sldLayoutMk cId="132888358" sldId="2147483739"/>
+          </pc:sldLayoutMkLst>
+        </pc:sldLayoutChg>
+        <pc:sldLayoutChg chg="add del">
+          <pc:chgData name="Roy Liu" userId="755465ea-a681-4840-afaf-3106d4ded39d" providerId="ADAL" clId="{26A4DA2E-3B26-4A19-981B-FA4B6FD33F58}" dt="2023-09-20T11:39:49.982" v="145" actId="26606"/>
+          <pc:sldLayoutMkLst>
+            <pc:docMk/>
+            <pc:sldMasterMk cId="4137531801" sldId="2147483750"/>
+            <pc:sldLayoutMk cId="3453804309" sldId="2147483740"/>
+          </pc:sldLayoutMkLst>
+        </pc:sldLayoutChg>
+        <pc:sldLayoutChg chg="add del">
+          <pc:chgData name="Roy Liu" userId="755465ea-a681-4840-afaf-3106d4ded39d" providerId="ADAL" clId="{26A4DA2E-3B26-4A19-981B-FA4B6FD33F58}" dt="2023-09-20T11:39:49.982" v="145" actId="26606"/>
+          <pc:sldLayoutMkLst>
+            <pc:docMk/>
+            <pc:sldMasterMk cId="4137531801" sldId="2147483750"/>
+            <pc:sldLayoutMk cId="76274929" sldId="2147483741"/>
+          </pc:sldLayoutMkLst>
+        </pc:sldLayoutChg>
+        <pc:sldLayoutChg chg="add del">
+          <pc:chgData name="Roy Liu" userId="755465ea-a681-4840-afaf-3106d4ded39d" providerId="ADAL" clId="{26A4DA2E-3B26-4A19-981B-FA4B6FD33F58}" dt="2023-09-20T11:39:49.982" v="145" actId="26606"/>
+          <pc:sldLayoutMkLst>
+            <pc:docMk/>
+            <pc:sldMasterMk cId="4137531801" sldId="2147483750"/>
+            <pc:sldLayoutMk cId="3044339433" sldId="2147483742"/>
+          </pc:sldLayoutMkLst>
+        </pc:sldLayoutChg>
+        <pc:sldLayoutChg chg="add del">
+          <pc:chgData name="Roy Liu" userId="755465ea-a681-4840-afaf-3106d4ded39d" providerId="ADAL" clId="{26A4DA2E-3B26-4A19-981B-FA4B6FD33F58}" dt="2023-09-20T11:39:49.982" v="145" actId="26606"/>
+          <pc:sldLayoutMkLst>
+            <pc:docMk/>
+            <pc:sldMasterMk cId="4137531801" sldId="2147483750"/>
+            <pc:sldLayoutMk cId="1908676235" sldId="2147483743"/>
+          </pc:sldLayoutMkLst>
+        </pc:sldLayoutChg>
+        <pc:sldLayoutChg chg="add del">
+          <pc:chgData name="Roy Liu" userId="755465ea-a681-4840-afaf-3106d4ded39d" providerId="ADAL" clId="{26A4DA2E-3B26-4A19-981B-FA4B6FD33F58}" dt="2023-09-20T11:39:49.982" v="145" actId="26606"/>
+          <pc:sldLayoutMkLst>
+            <pc:docMk/>
+            <pc:sldMasterMk cId="4137531801" sldId="2147483750"/>
+            <pc:sldLayoutMk cId="314010309" sldId="2147483744"/>
+          </pc:sldLayoutMkLst>
+        </pc:sldLayoutChg>
+        <pc:sldLayoutChg chg="add del">
+          <pc:chgData name="Roy Liu" userId="755465ea-a681-4840-afaf-3106d4ded39d" providerId="ADAL" clId="{26A4DA2E-3B26-4A19-981B-FA4B6FD33F58}" dt="2023-09-20T11:39:49.982" v="145" actId="26606"/>
+          <pc:sldLayoutMkLst>
+            <pc:docMk/>
+            <pc:sldMasterMk cId="4137531801" sldId="2147483750"/>
+            <pc:sldLayoutMk cId="4185690392" sldId="2147483745"/>
+          </pc:sldLayoutMkLst>
+        </pc:sldLayoutChg>
+        <pc:sldLayoutChg chg="add del">
+          <pc:chgData name="Roy Liu" userId="755465ea-a681-4840-afaf-3106d4ded39d" providerId="ADAL" clId="{26A4DA2E-3B26-4A19-981B-FA4B6FD33F58}" dt="2023-09-20T11:39:49.982" v="145" actId="26606"/>
+          <pc:sldLayoutMkLst>
+            <pc:docMk/>
+            <pc:sldMasterMk cId="4137531801" sldId="2147483750"/>
+            <pc:sldLayoutMk cId="280367108" sldId="2147483746"/>
+          </pc:sldLayoutMkLst>
+        </pc:sldLayoutChg>
+        <pc:sldLayoutChg chg="add del">
+          <pc:chgData name="Roy Liu" userId="755465ea-a681-4840-afaf-3106d4ded39d" providerId="ADAL" clId="{26A4DA2E-3B26-4A19-981B-FA4B6FD33F58}" dt="2023-09-20T11:39:49.982" v="145" actId="26606"/>
+          <pc:sldLayoutMkLst>
+            <pc:docMk/>
+            <pc:sldMasterMk cId="4137531801" sldId="2147483750"/>
+            <pc:sldLayoutMk cId="4260407630" sldId="2147483747"/>
+          </pc:sldLayoutMkLst>
+        </pc:sldLayoutChg>
+        <pc:sldLayoutChg chg="add del">
+          <pc:chgData name="Roy Liu" userId="755465ea-a681-4840-afaf-3106d4ded39d" providerId="ADAL" clId="{26A4DA2E-3B26-4A19-981B-FA4B6FD33F58}" dt="2023-09-20T11:39:49.982" v="145" actId="26606"/>
+          <pc:sldLayoutMkLst>
+            <pc:docMk/>
+            <pc:sldMasterMk cId="4137531801" sldId="2147483750"/>
+            <pc:sldLayoutMk cId="3749109380" sldId="2147483748"/>
+          </pc:sldLayoutMkLst>
+        </pc:sldLayoutChg>
+        <pc:sldLayoutChg chg="add del">
+          <pc:chgData name="Roy Liu" userId="755465ea-a681-4840-afaf-3106d4ded39d" providerId="ADAL" clId="{26A4DA2E-3B26-4A19-981B-FA4B6FD33F58}" dt="2023-09-20T11:39:49.982" v="145" actId="26606"/>
+          <pc:sldLayoutMkLst>
+            <pc:docMk/>
+            <pc:sldMasterMk cId="4137531801" sldId="2147483750"/>
+            <pc:sldLayoutMk cId="3923863840" sldId="2147483749"/>
+          </pc:sldLayoutMkLst>
+        </pc:sldLayoutChg>
+      </pc:sldMasterChg>
+      <pc:sldMasterChg chg="add del addSldLayout delSldLayout">
+        <pc:chgData name="Roy Liu" userId="755465ea-a681-4840-afaf-3106d4ded39d" providerId="ADAL" clId="{26A4DA2E-3B26-4A19-981B-FA4B6FD33F58}" dt="2023-09-20T11:39:52.314" v="147" actId="26606"/>
+        <pc:sldMasterMkLst>
+          <pc:docMk/>
+          <pc:sldMasterMk cId="2396023725" sldId="2147483763"/>
+        </pc:sldMasterMkLst>
+        <pc:sldLayoutChg chg="add del">
+          <pc:chgData name="Roy Liu" userId="755465ea-a681-4840-afaf-3106d4ded39d" providerId="ADAL" clId="{26A4DA2E-3B26-4A19-981B-FA4B6FD33F58}" dt="2023-09-20T11:39:52.314" v="147" actId="26606"/>
+          <pc:sldLayoutMkLst>
+            <pc:docMk/>
+            <pc:sldMasterMk cId="2396023725" sldId="2147483763"/>
+            <pc:sldLayoutMk cId="958344890" sldId="2147483752"/>
+          </pc:sldLayoutMkLst>
+        </pc:sldLayoutChg>
+        <pc:sldLayoutChg chg="add del">
+          <pc:chgData name="Roy Liu" userId="755465ea-a681-4840-afaf-3106d4ded39d" providerId="ADAL" clId="{26A4DA2E-3B26-4A19-981B-FA4B6FD33F58}" dt="2023-09-20T11:39:52.314" v="147" actId="26606"/>
+          <pc:sldLayoutMkLst>
+            <pc:docMk/>
+            <pc:sldMasterMk cId="2396023725" sldId="2147483763"/>
+            <pc:sldLayoutMk cId="4270449318" sldId="2147483753"/>
+          </pc:sldLayoutMkLst>
+        </pc:sldLayoutChg>
+        <pc:sldLayoutChg chg="add del">
+          <pc:chgData name="Roy Liu" userId="755465ea-a681-4840-afaf-3106d4ded39d" providerId="ADAL" clId="{26A4DA2E-3B26-4A19-981B-FA4B6FD33F58}" dt="2023-09-20T11:39:52.314" v="147" actId="26606"/>
+          <pc:sldLayoutMkLst>
+            <pc:docMk/>
+            <pc:sldMasterMk cId="2396023725" sldId="2147483763"/>
+            <pc:sldLayoutMk cId="2399139964" sldId="2147483754"/>
+          </pc:sldLayoutMkLst>
+        </pc:sldLayoutChg>
+        <pc:sldLayoutChg chg="add del">
+          <pc:chgData name="Roy Liu" userId="755465ea-a681-4840-afaf-3106d4ded39d" providerId="ADAL" clId="{26A4DA2E-3B26-4A19-981B-FA4B6FD33F58}" dt="2023-09-20T11:39:52.314" v="147" actId="26606"/>
+          <pc:sldLayoutMkLst>
+            <pc:docMk/>
+            <pc:sldMasterMk cId="2396023725" sldId="2147483763"/>
+            <pc:sldLayoutMk cId="1693984252" sldId="2147483755"/>
+          </pc:sldLayoutMkLst>
+        </pc:sldLayoutChg>
+        <pc:sldLayoutChg chg="add del">
+          <pc:chgData name="Roy Liu" userId="755465ea-a681-4840-afaf-3106d4ded39d" providerId="ADAL" clId="{26A4DA2E-3B26-4A19-981B-FA4B6FD33F58}" dt="2023-09-20T11:39:52.314" v="147" actId="26606"/>
+          <pc:sldLayoutMkLst>
+            <pc:docMk/>
+            <pc:sldMasterMk cId="2396023725" sldId="2147483763"/>
+            <pc:sldLayoutMk cId="4543520" sldId="2147483756"/>
+          </pc:sldLayoutMkLst>
+        </pc:sldLayoutChg>
+        <pc:sldLayoutChg chg="add del">
+          <pc:chgData name="Roy Liu" userId="755465ea-a681-4840-afaf-3106d4ded39d" providerId="ADAL" clId="{26A4DA2E-3B26-4A19-981B-FA4B6FD33F58}" dt="2023-09-20T11:39:52.314" v="147" actId="26606"/>
+          <pc:sldLayoutMkLst>
+            <pc:docMk/>
+            <pc:sldMasterMk cId="2396023725" sldId="2147483763"/>
+            <pc:sldLayoutMk cId="3396188322" sldId="2147483757"/>
+          </pc:sldLayoutMkLst>
+        </pc:sldLayoutChg>
+        <pc:sldLayoutChg chg="add del">
+          <pc:chgData name="Roy Liu" userId="755465ea-a681-4840-afaf-3106d4ded39d" providerId="ADAL" clId="{26A4DA2E-3B26-4A19-981B-FA4B6FD33F58}" dt="2023-09-20T11:39:52.314" v="147" actId="26606"/>
+          <pc:sldLayoutMkLst>
+            <pc:docMk/>
+            <pc:sldMasterMk cId="2396023725" sldId="2147483763"/>
+            <pc:sldLayoutMk cId="2637560780" sldId="2147483758"/>
+          </pc:sldLayoutMkLst>
+        </pc:sldLayoutChg>
+        <pc:sldLayoutChg chg="add del">
+          <pc:chgData name="Roy Liu" userId="755465ea-a681-4840-afaf-3106d4ded39d" providerId="ADAL" clId="{26A4DA2E-3B26-4A19-981B-FA4B6FD33F58}" dt="2023-09-20T11:39:52.314" v="147" actId="26606"/>
+          <pc:sldLayoutMkLst>
+            <pc:docMk/>
+            <pc:sldMasterMk cId="2396023725" sldId="2147483763"/>
+            <pc:sldLayoutMk cId="2863320743" sldId="2147483759"/>
+          </pc:sldLayoutMkLst>
+        </pc:sldLayoutChg>
+        <pc:sldLayoutChg chg="add del">
+          <pc:chgData name="Roy Liu" userId="755465ea-a681-4840-afaf-3106d4ded39d" providerId="ADAL" clId="{26A4DA2E-3B26-4A19-981B-FA4B6FD33F58}" dt="2023-09-20T11:39:52.314" v="147" actId="26606"/>
+          <pc:sldLayoutMkLst>
+            <pc:docMk/>
+            <pc:sldMasterMk cId="2396023725" sldId="2147483763"/>
+            <pc:sldLayoutMk cId="2427292896" sldId="2147483760"/>
+          </pc:sldLayoutMkLst>
+        </pc:sldLayoutChg>
+        <pc:sldLayoutChg chg="add del">
+          <pc:chgData name="Roy Liu" userId="755465ea-a681-4840-afaf-3106d4ded39d" providerId="ADAL" clId="{26A4DA2E-3B26-4A19-981B-FA4B6FD33F58}" dt="2023-09-20T11:39:52.314" v="147" actId="26606"/>
+          <pc:sldLayoutMkLst>
+            <pc:docMk/>
+            <pc:sldMasterMk cId="2396023725" sldId="2147483763"/>
+            <pc:sldLayoutMk cId="1431543505" sldId="2147483761"/>
+          </pc:sldLayoutMkLst>
+        </pc:sldLayoutChg>
+        <pc:sldLayoutChg chg="add del">
+          <pc:chgData name="Roy Liu" userId="755465ea-a681-4840-afaf-3106d4ded39d" providerId="ADAL" clId="{26A4DA2E-3B26-4A19-981B-FA4B6FD33F58}" dt="2023-09-20T11:39:52.314" v="147" actId="26606"/>
+          <pc:sldLayoutMkLst>
+            <pc:docMk/>
+            <pc:sldMasterMk cId="2396023725" sldId="2147483763"/>
+            <pc:sldLayoutMk cId="2371968821" sldId="2147483762"/>
+          </pc:sldLayoutMkLst>
+        </pc:sldLayoutChg>
+      </pc:sldMasterChg>
     </pc:docChg>
   </pc:docChgLst>
   <pc:docChgLst>
-    <pc:chgData name="Viktória Szabó" userId="S::viktoria22000@student.hamk.fi::55ff7ae3-70d3-4f82-942e-28ce8109f0e2" providerId="AD" clId="Web-{C4D42948-8866-3437-1BA9-3871038CE292}"/>
+    <pc:chgData name="Viktória Szabó" userId="S::viktoria22000@student.hamk.fi::55ff7ae3-70d3-4f82-942e-28ce8109f0e2" providerId="AD" clId="Web-{99DD3772-D7DA-ACAF-C41D-2125D048CA4C}"/>
     <pc:docChg chg="addSld modSld">
-      <pc:chgData name="Viktória Szabó" userId="S::viktoria22000@student.hamk.fi::55ff7ae3-70d3-4f82-942e-28ce8109f0e2" providerId="AD" clId="Web-{C4D42948-8866-3437-1BA9-3871038CE292}" dt="2023-09-27T10:25:38.896" v="53" actId="20577"/>
+      <pc:chgData name="Viktória Szabó" userId="S::viktoria22000@student.hamk.fi::55ff7ae3-70d3-4f82-942e-28ce8109f0e2" providerId="AD" clId="Web-{99DD3772-D7DA-ACAF-C41D-2125D048CA4C}" dt="2023-09-26T10:46:12.597" v="684" actId="20577"/>
       <pc:docMkLst>
         <pc:docMk/>
       </pc:docMkLst>
       <pc:sldChg chg="modSp">
-        <pc:chgData name="Viktória Szabó" userId="S::viktoria22000@student.hamk.fi::55ff7ae3-70d3-4f82-942e-28ce8109f0e2" providerId="AD" clId="Web-{C4D42948-8866-3437-1BA9-3871038CE292}" dt="2023-09-27T10:25:04.770" v="5" actId="20577"/>
+        <pc:chgData name="Viktória Szabó" userId="S::viktoria22000@student.hamk.fi::55ff7ae3-70d3-4f82-942e-28ce8109f0e2" providerId="AD" clId="Web-{99DD3772-D7DA-ACAF-C41D-2125D048CA4C}" dt="2023-09-26T10:41:09.971" v="450" actId="1076"/>
+        <pc:sldMkLst>
+          <pc:docMk/>
+          <pc:sldMk cId="4059361716" sldId="256"/>
+        </pc:sldMkLst>
+        <pc:spChg chg="mod">
+          <ac:chgData name="Viktória Szabó" userId="S::viktoria22000@student.hamk.fi::55ff7ae3-70d3-4f82-942e-28ce8109f0e2" providerId="AD" clId="Web-{99DD3772-D7DA-ACAF-C41D-2125D048CA4C}" dt="2023-09-26T10:40:47.721" v="446" actId="20577"/>
+          <ac:spMkLst>
+            <pc:docMk/>
+            <pc:sldMk cId="4059361716" sldId="256"/>
+            <ac:spMk id="2" creationId="{FB1621ED-E470-38C9-3C00-E64A512B7968}"/>
+          </ac:spMkLst>
+        </pc:spChg>
+        <pc:spChg chg="mod">
+          <ac:chgData name="Viktória Szabó" userId="S::viktoria22000@student.hamk.fi::55ff7ae3-70d3-4f82-942e-28ce8109f0e2" providerId="AD" clId="Web-{99DD3772-D7DA-ACAF-C41D-2125D048CA4C}" dt="2023-09-26T10:41:09.971" v="450" actId="1076"/>
+          <ac:spMkLst>
+            <pc:docMk/>
+            <pc:sldMk cId="4059361716" sldId="256"/>
+            <ac:spMk id="3" creationId="{A1373B98-8ED3-37B9-5EB5-687324157D0A}"/>
+          </ac:spMkLst>
+        </pc:spChg>
+      </pc:sldChg>
+      <pc:sldChg chg="addSp modSp mod setBg">
+        <pc:chgData name="Viktória Szabó" userId="S::viktoria22000@student.hamk.fi::55ff7ae3-70d3-4f82-942e-28ce8109f0e2" providerId="AD" clId="Web-{99DD3772-D7DA-ACAF-C41D-2125D048CA4C}" dt="2023-09-26T10:46:12.597" v="684" actId="20577"/>
+        <pc:sldMkLst>
+          <pc:docMk/>
+          <pc:sldMk cId="1499829321" sldId="257"/>
+        </pc:sldMkLst>
+        <pc:spChg chg="mod">
+          <ac:chgData name="Viktória Szabó" userId="S::viktoria22000@student.hamk.fi::55ff7ae3-70d3-4f82-942e-28ce8109f0e2" providerId="AD" clId="Web-{99DD3772-D7DA-ACAF-C41D-2125D048CA4C}" dt="2023-09-26T10:44:18.987" v="658"/>
+          <ac:spMkLst>
+            <pc:docMk/>
+            <pc:sldMk cId="1499829321" sldId="257"/>
+            <ac:spMk id="2" creationId="{6E7FAB23-3BBF-1A08-4ADC-40F67AE0A9F3}"/>
+          </ac:spMkLst>
+        </pc:spChg>
+        <pc:spChg chg="mod">
+          <ac:chgData name="Viktória Szabó" userId="S::viktoria22000@student.hamk.fi::55ff7ae3-70d3-4f82-942e-28ce8109f0e2" providerId="AD" clId="Web-{99DD3772-D7DA-ACAF-C41D-2125D048CA4C}" dt="2023-09-26T10:46:12.597" v="684" actId="20577"/>
+          <ac:spMkLst>
+            <pc:docMk/>
+            <pc:sldMk cId="1499829321" sldId="257"/>
+            <ac:spMk id="3" creationId="{27880FD4-D46A-B9D5-23AC-6C0D8D9629D2}"/>
+          </ac:spMkLst>
+        </pc:spChg>
+        <pc:spChg chg="add">
+          <ac:chgData name="Viktória Szabó" userId="S::viktoria22000@student.hamk.fi::55ff7ae3-70d3-4f82-942e-28ce8109f0e2" providerId="AD" clId="Web-{99DD3772-D7DA-ACAF-C41D-2125D048CA4C}" dt="2023-09-26T10:44:18.987" v="658"/>
+          <ac:spMkLst>
+            <pc:docMk/>
+            <pc:sldMk cId="1499829321" sldId="257"/>
+            <ac:spMk id="8" creationId="{8651CFA9-6065-4243-AC48-858E359780B1}"/>
+          </ac:spMkLst>
+        </pc:spChg>
+        <pc:spChg chg="add">
+          <ac:chgData name="Viktória Szabó" userId="S::viktoria22000@student.hamk.fi::55ff7ae3-70d3-4f82-942e-28ce8109f0e2" providerId="AD" clId="Web-{99DD3772-D7DA-ACAF-C41D-2125D048CA4C}" dt="2023-09-26T10:44:18.987" v="658"/>
+          <ac:spMkLst>
+            <pc:docMk/>
+            <pc:sldMk cId="1499829321" sldId="257"/>
+            <ac:spMk id="10" creationId="{7462BFBC-0E19-4E6F-B0C7-CD5C519BC311}"/>
+          </ac:spMkLst>
+        </pc:spChg>
+        <pc:spChg chg="add">
+          <ac:chgData name="Viktória Szabó" userId="S::viktoria22000@student.hamk.fi::55ff7ae3-70d3-4f82-942e-28ce8109f0e2" providerId="AD" clId="Web-{99DD3772-D7DA-ACAF-C41D-2125D048CA4C}" dt="2023-09-26T10:44:18.987" v="658"/>
+          <ac:spMkLst>
+            <pc:docMk/>
+            <pc:sldMk cId="1499829321" sldId="257"/>
+            <ac:spMk id="16" creationId="{D813CD98-5EBE-426D-A4AC-FA5518B099DE}"/>
+          </ac:spMkLst>
+        </pc:spChg>
+        <pc:spChg chg="add">
+          <ac:chgData name="Viktória Szabó" userId="S::viktoria22000@student.hamk.fi::55ff7ae3-70d3-4f82-942e-28ce8109f0e2" providerId="AD" clId="Web-{99DD3772-D7DA-ACAF-C41D-2125D048CA4C}" dt="2023-09-26T10:44:18.987" v="658"/>
+          <ac:spMkLst>
+            <pc:docMk/>
+            <pc:sldMk cId="1499829321" sldId="257"/>
+            <ac:spMk id="18" creationId="{B453545A-B2D3-41EE-A91C-DBF43402DD43}"/>
+          </ac:spMkLst>
+        </pc:spChg>
+        <pc:grpChg chg="add">
+          <ac:chgData name="Viktória Szabó" userId="S::viktoria22000@student.hamk.fi::55ff7ae3-70d3-4f82-942e-28ce8109f0e2" providerId="AD" clId="Web-{99DD3772-D7DA-ACAF-C41D-2125D048CA4C}" dt="2023-09-26T10:44:18.987" v="658"/>
+          <ac:grpSpMkLst>
+            <pc:docMk/>
+            <pc:sldMk cId="1499829321" sldId="257"/>
+            <ac:grpSpMk id="12" creationId="{F2C2A007-4AE9-49C4-B364-5FDF34596224}"/>
+          </ac:grpSpMkLst>
+        </pc:grpChg>
+      </pc:sldChg>
+      <pc:sldChg chg="addSp modSp">
+        <pc:chgData name="Viktória Szabó" userId="S::viktoria22000@student.hamk.fi::55ff7ae3-70d3-4f82-942e-28ce8109f0e2" providerId="AD" clId="Web-{99DD3772-D7DA-ACAF-C41D-2125D048CA4C}" dt="2023-09-26T10:46:04.019" v="682" actId="20577"/>
         <pc:sldMkLst>
           <pc:docMk/>
           <pc:sldMk cId="723807988" sldId="262"/>
         </pc:sldMkLst>
         <pc:spChg chg="mod">
-          <ac:chgData name="Viktória Szabó" userId="S::viktoria22000@student.hamk.fi::55ff7ae3-70d3-4f82-942e-28ce8109f0e2" providerId="AD" clId="Web-{C4D42948-8866-3437-1BA9-3871038CE292}" dt="2023-09-27T10:25:04.770" v="5" actId="20577"/>
+          <ac:chgData name="Viktória Szabó" userId="S::viktoria22000@student.hamk.fi::55ff7ae3-70d3-4f82-942e-28ce8109f0e2" providerId="AD" clId="Web-{99DD3772-D7DA-ACAF-C41D-2125D048CA4C}" dt="2023-09-26T10:46:04.019" v="682" actId="20577"/>
           <ac:spMkLst>
             <pc:docMk/>
             <pc:sldMk cId="723807988" sldId="262"/>
             <ac:spMk id="2" creationId="{E9FCD3FF-F45B-8D90-0C9A-8B9444056B35}"/>
           </ac:spMkLst>
         </pc:spChg>
+        <pc:spChg chg="mod">
+          <ac:chgData name="Viktória Szabó" userId="S::viktoria22000@student.hamk.fi::55ff7ae3-70d3-4f82-942e-28ce8109f0e2" providerId="AD" clId="Web-{99DD3772-D7DA-ACAF-C41D-2125D048CA4C}" dt="2023-09-26T10:45:39.847" v="675" actId="20577"/>
+          <ac:spMkLst>
+            <pc:docMk/>
+            <pc:sldMk cId="723807988" sldId="262"/>
+            <ac:spMk id="3" creationId="{F7903209-7B69-F2CF-7AFD-F8DAB8DE1B72}"/>
+          </ac:spMkLst>
+        </pc:spChg>
+        <pc:picChg chg="add mod">
+          <ac:chgData name="Viktória Szabó" userId="S::viktoria22000@student.hamk.fi::55ff7ae3-70d3-4f82-942e-28ce8109f0e2" providerId="AD" clId="Web-{99DD3772-D7DA-ACAF-C41D-2125D048CA4C}" dt="2023-09-26T10:30:49.923" v="42" actId="1076"/>
+          <ac:picMkLst>
+            <pc:docMk/>
+            <pc:sldMk cId="723807988" sldId="262"/>
+            <ac:picMk id="4" creationId="{93560767-ED00-007D-38F6-FA4111FC431C}"/>
+          </ac:picMkLst>
+        </pc:picChg>
+        <pc:picChg chg="add mod">
+          <ac:chgData name="Viktória Szabó" userId="S::viktoria22000@student.hamk.fi::55ff7ae3-70d3-4f82-942e-28ce8109f0e2" providerId="AD" clId="Web-{99DD3772-D7DA-ACAF-C41D-2125D048CA4C}" dt="2023-09-26T10:30:47.330" v="39" actId="1076"/>
+          <ac:picMkLst>
+            <pc:docMk/>
+            <pc:sldMk cId="723807988" sldId="262"/>
+            <ac:picMk id="5" creationId="{6147C8E2-A9FF-BF4C-8D74-AB061E226477}"/>
+          </ac:picMkLst>
+        </pc:picChg>
       </pc:sldChg>
-      <pc:sldChg chg="modSp">
-        <pc:chgData name="Viktória Szabó" userId="S::viktoria22000@student.hamk.fi::55ff7ae3-70d3-4f82-942e-28ce8109f0e2" providerId="AD" clId="Web-{C4D42948-8866-3437-1BA9-3871038CE292}" dt="2023-09-27T10:25:11.723" v="8" actId="20577"/>
+      <pc:sldChg chg="addSp delSp modSp mod setBg modClrScheme addAnim delAnim chgLayout">
+        <pc:chgData name="Viktória Szabó" userId="S::viktoria22000@student.hamk.fi::55ff7ae3-70d3-4f82-942e-28ce8109f0e2" providerId="AD" clId="Web-{99DD3772-D7DA-ACAF-C41D-2125D048CA4C}" dt="2023-09-26T10:40:38.549" v="440" actId="20577"/>
+        <pc:sldMkLst>
+          <pc:docMk/>
+          <pc:sldMk cId="2129731390" sldId="263"/>
+        </pc:sldMkLst>
+        <pc:spChg chg="mod ord">
+          <ac:chgData name="Viktória Szabó" userId="S::viktoria22000@student.hamk.fi::55ff7ae3-70d3-4f82-942e-28ce8109f0e2" providerId="AD" clId="Web-{99DD3772-D7DA-ACAF-C41D-2125D048CA4C}" dt="2023-09-26T10:40:38.549" v="440" actId="20577"/>
+          <ac:spMkLst>
+            <pc:docMk/>
+            <pc:sldMk cId="2129731390" sldId="263"/>
+            <ac:spMk id="2" creationId="{D35C279A-F607-F2FC-CE91-DEE49601EC63}"/>
+          </ac:spMkLst>
+        </pc:spChg>
+        <pc:spChg chg="mod ord">
+          <ac:chgData name="Viktória Szabó" userId="S::viktoria22000@student.hamk.fi::55ff7ae3-70d3-4f82-942e-28ce8109f0e2" providerId="AD" clId="Web-{99DD3772-D7DA-ACAF-C41D-2125D048CA4C}" dt="2023-09-26T10:40:35.331" v="437"/>
+          <ac:spMkLst>
+            <pc:docMk/>
+            <pc:sldMk cId="2129731390" sldId="263"/>
+            <ac:spMk id="3" creationId="{1FBB4542-7416-E7B0-5988-8C7D2AFB8EA8}"/>
+          </ac:spMkLst>
+        </pc:spChg>
+        <pc:spChg chg="add del">
+          <ac:chgData name="Viktória Szabó" userId="S::viktoria22000@student.hamk.fi::55ff7ae3-70d3-4f82-942e-28ce8109f0e2" providerId="AD" clId="Web-{99DD3772-D7DA-ACAF-C41D-2125D048CA4C}" dt="2023-09-26T10:40:35.331" v="437"/>
+          <ac:spMkLst>
+            <pc:docMk/>
+            <pc:sldMk cId="2129731390" sldId="263"/>
+            <ac:spMk id="8" creationId="{DE61FBD7-E37C-4B38-BE44-A6D4978D7486}"/>
+          </ac:spMkLst>
+        </pc:spChg>
+        <pc:spChg chg="add del">
+          <ac:chgData name="Viktória Szabó" userId="S::viktoria22000@student.hamk.fi::55ff7ae3-70d3-4f82-942e-28ce8109f0e2" providerId="AD" clId="Web-{99DD3772-D7DA-ACAF-C41D-2125D048CA4C}" dt="2023-09-26T10:40:35.331" v="437"/>
+          <ac:spMkLst>
+            <pc:docMk/>
+            <pc:sldMk cId="2129731390" sldId="263"/>
+            <ac:spMk id="10" creationId="{823772C2-0911-45A0-B7B6-D811380C75AC}"/>
+          </ac:spMkLst>
+        </pc:spChg>
+        <pc:grpChg chg="add del">
+          <ac:chgData name="Viktória Szabó" userId="S::viktoria22000@student.hamk.fi::55ff7ae3-70d3-4f82-942e-28ce8109f0e2" providerId="AD" clId="Web-{99DD3772-D7DA-ACAF-C41D-2125D048CA4C}" dt="2023-09-26T10:40:35.331" v="437"/>
+          <ac:grpSpMkLst>
+            <pc:docMk/>
+            <pc:sldMk cId="2129731390" sldId="263"/>
+            <ac:grpSpMk id="12" creationId="{53A6A32E-D196-4536-A9E8-56D5BB884FCA}"/>
+          </ac:grpSpMkLst>
+        </pc:grpChg>
+      </pc:sldChg>
+      <pc:sldChg chg="addSp delSp modSp">
+        <pc:chgData name="Viktória Szabó" userId="S::viktoria22000@student.hamk.fi::55ff7ae3-70d3-4f82-942e-28ce8109f0e2" providerId="AD" clId="Web-{99DD3772-D7DA-ACAF-C41D-2125D048CA4C}" dt="2023-09-26T10:45:55.987" v="679" actId="20577"/>
         <pc:sldMkLst>
           <pc:docMk/>
           <pc:sldMk cId="435654270" sldId="265"/>
         </pc:sldMkLst>
         <pc:spChg chg="mod">
-          <ac:chgData name="Viktória Szabó" userId="S::viktoria22000@student.hamk.fi::55ff7ae3-70d3-4f82-942e-28ce8109f0e2" providerId="AD" clId="Web-{C4D42948-8866-3437-1BA9-3871038CE292}" dt="2023-09-27T10:25:11.723" v="8" actId="20577"/>
+          <ac:chgData name="Viktória Szabó" userId="S::viktoria22000@student.hamk.fi::55ff7ae3-70d3-4f82-942e-28ce8109f0e2" providerId="AD" clId="Web-{99DD3772-D7DA-ACAF-C41D-2125D048CA4C}" dt="2023-09-26T10:45:55.987" v="679" actId="20577"/>
           <ac:spMkLst>
             <pc:docMk/>
             <pc:sldMk cId="435654270" sldId="265"/>
             <ac:spMk id="2" creationId="{C467D37A-286A-5967-A2D3-A3CB3B01E5C0}"/>
           </ac:spMkLst>
         </pc:spChg>
+        <pc:spChg chg="mod">
+          <ac:chgData name="Viktória Szabó" userId="S::viktoria22000@student.hamk.fi::55ff7ae3-70d3-4f82-942e-28ce8109f0e2" providerId="AD" clId="Web-{99DD3772-D7DA-ACAF-C41D-2125D048CA4C}" dt="2023-09-26T10:45:44.784" v="677" actId="20577"/>
+          <ac:spMkLst>
+            <pc:docMk/>
+            <pc:sldMk cId="435654270" sldId="265"/>
+            <ac:spMk id="3" creationId="{7F2E4967-6631-E036-3C10-AB476F921C5F}"/>
+          </ac:spMkLst>
+        </pc:spChg>
+        <pc:picChg chg="add del mod">
+          <ac:chgData name="Viktória Szabó" userId="S::viktoria22000@student.hamk.fi::55ff7ae3-70d3-4f82-942e-28ce8109f0e2" providerId="AD" clId="Web-{99DD3772-D7DA-ACAF-C41D-2125D048CA4C}" dt="2023-09-26T10:29:48.470" v="14"/>
+          <ac:picMkLst>
+            <pc:docMk/>
+            <pc:sldMk cId="435654270" sldId="265"/>
+            <ac:picMk id="4" creationId="{8BE72F5C-83A2-3231-A9E6-18AE4085838E}"/>
+          </ac:picMkLst>
+        </pc:picChg>
+        <pc:picChg chg="add mod">
+          <ac:chgData name="Viktória Szabó" userId="S::viktoria22000@student.hamk.fi::55ff7ae3-70d3-4f82-942e-28ce8109f0e2" providerId="AD" clId="Web-{99DD3772-D7DA-ACAF-C41D-2125D048CA4C}" dt="2023-09-26T10:30:08.236" v="24" actId="1076"/>
+          <ac:picMkLst>
+            <pc:docMk/>
+            <pc:sldMk cId="435654270" sldId="265"/>
+            <ac:picMk id="5" creationId="{3746FFB8-CB00-DA0E-CC83-3F8B80704B55}"/>
+          </ac:picMkLst>
+        </pc:picChg>
+        <pc:picChg chg="add mod">
+          <ac:chgData name="Viktória Szabó" userId="S::viktoria22000@student.hamk.fi::55ff7ae3-70d3-4f82-942e-28ce8109f0e2" providerId="AD" clId="Web-{99DD3772-D7DA-ACAF-C41D-2125D048CA4C}" dt="2023-09-26T10:30:08.986" v="25" actId="1076"/>
+          <ac:picMkLst>
+            <pc:docMk/>
+            <pc:sldMk cId="435654270" sldId="265"/>
+            <ac:picMk id="6" creationId="{F2B7F44B-D5B4-17C7-5D2E-B87E3E17631B}"/>
+          </ac:picMkLst>
+        </pc:picChg>
       </pc:sldChg>
-      <pc:sldChg chg="modSp new">
-        <pc:chgData name="Viktória Szabó" userId="S::viktoria22000@student.hamk.fi::55ff7ae3-70d3-4f82-942e-28ce8109f0e2" providerId="AD" clId="Web-{C4D42948-8866-3437-1BA9-3871038CE292}" dt="2023-09-27T10:25:38.896" v="53" actId="20577"/>
+      <pc:sldChg chg="addSp delSp modSp new mod setBg">
+        <pc:chgData name="Viktória Szabó" userId="S::viktoria22000@student.hamk.fi::55ff7ae3-70d3-4f82-942e-28ce8109f0e2" providerId="AD" clId="Web-{99DD3772-D7DA-ACAF-C41D-2125D048CA4C}" dt="2023-09-26T10:38:53.596" v="342" actId="20577"/>
         <pc:sldMkLst>
           <pc:docMk/>
-          <pc:sldMk cId="2351471326" sldId="270"/>
+          <pc:sldMk cId="3124489379" sldId="266"/>
         </pc:sldMkLst>
         <pc:spChg chg="mod">
-          <ac:chgData name="Viktória Szabó" userId="S::viktoria22000@student.hamk.fi::55ff7ae3-70d3-4f82-942e-28ce8109f0e2" providerId="AD" clId="Web-{C4D42948-8866-3437-1BA9-3871038CE292}" dt="2023-09-27T10:25:38.896" v="53" actId="20577"/>
-          <ac:spMkLst>
-            <pc:docMk/>
-            <pc:sldMk cId="2351471326" sldId="270"/>
-            <ac:spMk id="2" creationId="{25EBB419-52F1-F773-5B78-04CD3918F1CA}"/>
-          </ac:spMkLst>
-        </pc:spChg>
+          <ac:chgData name="Viktória Szabó" userId="S::viktoria22000@student.hamk.fi::55ff7ae3-70d3-4f82-942e-28ce8109f0e2" providerId="AD" clId="Web-{99DD3772-D7DA-ACAF-C41D-2125D048CA4C}" dt="2023-09-26T10:38:27.143" v="331" actId="14100"/>
+          <ac:spMkLst>
+            <pc:docMk/>
+            <pc:sldMk cId="3124489379" sldId="266"/>
+            <ac:spMk id="2" creationId="{5A78A3DA-970E-9077-A1C4-CA9DCFC7D8B1}"/>
+          </ac:spMkLst>
+        </pc:spChg>
+        <pc:spChg chg="del mod">
+          <ac:chgData name="Viktória Szabó" userId="S::viktoria22000@student.hamk.fi::55ff7ae3-70d3-4f82-942e-28ce8109f0e2" providerId="AD" clId="Web-{99DD3772-D7DA-ACAF-C41D-2125D048CA4C}" dt="2023-09-26T10:33:59.189" v="157"/>
+          <ac:spMkLst>
+            <pc:docMk/>
+            <pc:sldMk cId="3124489379" sldId="266"/>
+            <ac:spMk id="3" creationId="{4281A879-1BFE-2B9D-DCF9-C30DD0B20DA9}"/>
+          </ac:spMkLst>
+        </pc:spChg>
+        <pc:spChg chg="add del mod">
+          <ac:chgData name="Viktória Szabó" userId="S::viktoria22000@student.hamk.fi::55ff7ae3-70d3-4f82-942e-28ce8109f0e2" providerId="AD" clId="Web-{99DD3772-D7DA-ACAF-C41D-2125D048CA4C}" dt="2023-09-26T10:34:25.580" v="164"/>
+          <ac:spMkLst>
+            <pc:docMk/>
+            <pc:sldMk cId="3124489379" sldId="266"/>
+            <ac:spMk id="6" creationId="{D1BA41D9-85B3-2BCE-7BAD-563E9B67B612}"/>
+          </ac:spMkLst>
+        </pc:spChg>
+        <pc:spChg chg="add mod">
+          <ac:chgData name="Viktória Szabó" userId="S::viktoria22000@student.hamk.fi::55ff7ae3-70d3-4f82-942e-28ce8109f0e2" providerId="AD" clId="Web-{99DD3772-D7DA-ACAF-C41D-2125D048CA4C}" dt="2023-09-26T10:38:53.596" v="342" actId="20577"/>
+          <ac:spMkLst>
+            <pc:docMk/>
+            <pc:sldMk cId="3124489379" sldId="266"/>
+            <ac:spMk id="8" creationId="{8A5A1EB3-A69E-9C30-F146-0A35F818E211}"/>
+          </ac:spMkLst>
+        </pc:spChg>
+        <pc:spChg chg="add del mod">
+          <ac:chgData name="Viktória Szabó" userId="S::viktoria22000@student.hamk.fi::55ff7ae3-70d3-4f82-942e-28ce8109f0e2" providerId="AD" clId="Web-{99DD3772-D7DA-ACAF-C41D-2125D048CA4C}" dt="2023-09-26T10:36:06.049" v="197"/>
+          <ac:spMkLst>
+            <pc:docMk/>
+            <pc:sldMk cId="3124489379" sldId="266"/>
+            <ac:spMk id="10" creationId="{4B3DFF6C-0CD4-14E2-1AF2-08FBD165385D}"/>
+          </ac:spMkLst>
+        </pc:spChg>
+        <pc:spChg chg="add del mod">
+          <ac:chgData name="Viktória Szabó" userId="S::viktoria22000@student.hamk.fi::55ff7ae3-70d3-4f82-942e-28ce8109f0e2" providerId="AD" clId="Web-{99DD3772-D7DA-ACAF-C41D-2125D048CA4C}" dt="2023-09-26T10:37:03.987" v="251"/>
+          <ac:spMkLst>
+            <pc:docMk/>
+            <pc:sldMk cId="3124489379" sldId="266"/>
+            <ac:spMk id="13" creationId="{1612404F-C7EC-5F64-DBD7-1B4C037A66D6}"/>
+          </ac:spMkLst>
+        </pc:spChg>
+        <pc:spChg chg="add del">
+          <ac:chgData name="Viktória Szabó" userId="S::viktoria22000@student.hamk.fi::55ff7ae3-70d3-4f82-942e-28ce8109f0e2" providerId="AD" clId="Web-{99DD3772-D7DA-ACAF-C41D-2125D048CA4C}" dt="2023-09-26T10:37:07.955" v="252"/>
+          <ac:spMkLst>
+            <pc:docMk/>
+            <pc:sldMk cId="3124489379" sldId="266"/>
+            <ac:spMk id="16" creationId="{A4FB2F27-3F7D-440E-A905-86607A926A29}"/>
+          </ac:spMkLst>
+        </pc:spChg>
+        <pc:spChg chg="add del">
+          <ac:chgData name="Viktória Szabó" userId="S::viktoria22000@student.hamk.fi::55ff7ae3-70d3-4f82-942e-28ce8109f0e2" providerId="AD" clId="Web-{99DD3772-D7DA-ACAF-C41D-2125D048CA4C}" dt="2023-09-26T10:37:07.955" v="252"/>
+          <ac:spMkLst>
+            <pc:docMk/>
+            <pc:sldMk cId="3124489379" sldId="266"/>
+            <ac:spMk id="18" creationId="{AF678C14-A033-4139-BCA9-8382B039648B}"/>
+          </ac:spMkLst>
+        </pc:spChg>
+        <pc:spChg chg="add">
+          <ac:chgData name="Viktória Szabó" userId="S::viktoria22000@student.hamk.fi::55ff7ae3-70d3-4f82-942e-28ce8109f0e2" providerId="AD" clId="Web-{99DD3772-D7DA-ACAF-C41D-2125D048CA4C}" dt="2023-09-26T10:37:07.955" v="252"/>
+          <ac:spMkLst>
+            <pc:docMk/>
+            <pc:sldMk cId="3124489379" sldId="266"/>
+            <ac:spMk id="27" creationId="{A4FB2F27-3F7D-440E-A905-86607A926A29}"/>
+          </ac:spMkLst>
+        </pc:spChg>
+        <pc:spChg chg="add">
+          <ac:chgData name="Viktória Szabó" userId="S::viktoria22000@student.hamk.fi::55ff7ae3-70d3-4f82-942e-28ce8109f0e2" providerId="AD" clId="Web-{99DD3772-D7DA-ACAF-C41D-2125D048CA4C}" dt="2023-09-26T10:37:07.955" v="252"/>
+          <ac:spMkLst>
+            <pc:docMk/>
+            <pc:sldMk cId="3124489379" sldId="266"/>
+            <ac:spMk id="29" creationId="{AF678C14-A033-4139-BCA9-8382B039648B}"/>
+          </ac:spMkLst>
+        </pc:spChg>
+        <pc:grpChg chg="add del">
+          <ac:chgData name="Viktória Szabó" userId="S::viktoria22000@student.hamk.fi::55ff7ae3-70d3-4f82-942e-28ce8109f0e2" providerId="AD" clId="Web-{99DD3772-D7DA-ACAF-C41D-2125D048CA4C}" dt="2023-09-26T10:37:07.955" v="252"/>
+          <ac:grpSpMkLst>
+            <pc:docMk/>
+            <pc:sldMk cId="3124489379" sldId="266"/>
+            <ac:grpSpMk id="20" creationId="{14763DA8-CE3A-4B30-B2F5-0D128777F742}"/>
+          </ac:grpSpMkLst>
+        </pc:grpChg>
+        <pc:grpChg chg="add">
+          <ac:chgData name="Viktória Szabó" userId="S::viktoria22000@student.hamk.fi::55ff7ae3-70d3-4f82-942e-28ce8109f0e2" providerId="AD" clId="Web-{99DD3772-D7DA-ACAF-C41D-2125D048CA4C}" dt="2023-09-26T10:37:07.955" v="252"/>
+          <ac:grpSpMkLst>
+            <pc:docMk/>
+            <pc:sldMk cId="3124489379" sldId="266"/>
+            <ac:grpSpMk id="31" creationId="{14763DA8-CE3A-4B30-B2F5-0D128777F742}"/>
+          </ac:grpSpMkLst>
+        </pc:grpChg>
+        <pc:picChg chg="add del mod ord">
+          <ac:chgData name="Viktória Szabó" userId="S::viktoria22000@student.hamk.fi::55ff7ae3-70d3-4f82-942e-28ce8109f0e2" providerId="AD" clId="Web-{99DD3772-D7DA-ACAF-C41D-2125D048CA4C}" dt="2023-09-26T10:34:08.814" v="163"/>
+          <ac:picMkLst>
+            <pc:docMk/>
+            <pc:sldMk cId="3124489379" sldId="266"/>
+            <ac:picMk id="4" creationId="{B593B090-7674-1DB8-1F95-BAD21059DCD5}"/>
+          </ac:picMkLst>
+        </pc:picChg>
+        <pc:picChg chg="add del mod ord">
+          <ac:chgData name="Viktória Szabó" userId="S::viktoria22000@student.hamk.fi::55ff7ae3-70d3-4f82-942e-28ce8109f0e2" providerId="AD" clId="Web-{99DD3772-D7DA-ACAF-C41D-2125D048CA4C}" dt="2023-09-26T10:35:57.752" v="196"/>
+          <ac:picMkLst>
+            <pc:docMk/>
+            <pc:sldMk cId="3124489379" sldId="266"/>
+            <ac:picMk id="7" creationId="{8433EB4E-D398-DB6F-DA21-84FBD156D770}"/>
+          </ac:picMkLst>
+        </pc:picChg>
+        <pc:picChg chg="add del mod ord">
+          <ac:chgData name="Viktória Szabó" userId="S::viktoria22000@student.hamk.fi::55ff7ae3-70d3-4f82-942e-28ce8109f0e2" providerId="AD" clId="Web-{99DD3772-D7DA-ACAF-C41D-2125D048CA4C}" dt="2023-09-26T10:36:58.737" v="250"/>
+          <ac:picMkLst>
+            <pc:docMk/>
+            <pc:sldMk cId="3124489379" sldId="266"/>
+            <ac:picMk id="11" creationId="{AFDD4BE1-2151-DB20-AAD9-711A905EE7CF}"/>
+          </ac:picMkLst>
+        </pc:picChg>
+        <pc:picChg chg="add mod ord">
+          <ac:chgData name="Viktória Szabó" userId="S::viktoria22000@student.hamk.fi::55ff7ae3-70d3-4f82-942e-28ce8109f0e2" providerId="AD" clId="Web-{99DD3772-D7DA-ACAF-C41D-2125D048CA4C}" dt="2023-09-26T10:38:34.143" v="335" actId="1076"/>
+          <ac:picMkLst>
+            <pc:docMk/>
+            <pc:sldMk cId="3124489379" sldId="266"/>
+            <ac:picMk id="14" creationId="{A1D47B57-A6BA-7DE0-5AB6-9C7DD840B542}"/>
+          </ac:picMkLst>
+        </pc:picChg>
+      </pc:sldChg>
+      <pc:sldChg chg="addSp modSp new mod setBg modClrScheme chgLayout">
+        <pc:chgData name="Viktória Szabó" userId="S::viktoria22000@student.hamk.fi::55ff7ae3-70d3-4f82-942e-28ce8109f0e2" providerId="AD" clId="Web-{99DD3772-D7DA-ACAF-C41D-2125D048CA4C}" dt="2023-09-26T10:40:43.440" v="442" actId="20577"/>
+        <pc:sldMkLst>
+          <pc:docMk/>
+          <pc:sldMk cId="1072539886" sldId="267"/>
+        </pc:sldMkLst>
+        <pc:spChg chg="mod ord">
+          <ac:chgData name="Viktória Szabó" userId="S::viktoria22000@student.hamk.fi::55ff7ae3-70d3-4f82-942e-28ce8109f0e2" providerId="AD" clId="Web-{99DD3772-D7DA-ACAF-C41D-2125D048CA4C}" dt="2023-09-26T10:40:43.440" v="442" actId="20577"/>
+          <ac:spMkLst>
+            <pc:docMk/>
+            <pc:sldMk cId="1072539886" sldId="267"/>
+            <ac:spMk id="2" creationId="{A378FD55-E9A7-E9D0-7B36-80A46C94A82A}"/>
+          </ac:spMkLst>
+        </pc:spChg>
+        <pc:spChg chg="mod ord">
+          <ac:chgData name="Viktória Szabó" userId="S::viktoria22000@student.hamk.fi::55ff7ae3-70d3-4f82-942e-28ce8109f0e2" providerId="AD" clId="Web-{99DD3772-D7DA-ACAF-C41D-2125D048CA4C}" dt="2023-09-26T10:39:26.221" v="376"/>
+          <ac:spMkLst>
+            <pc:docMk/>
+            <pc:sldMk cId="1072539886" sldId="267"/>
+            <ac:spMk id="3" creationId="{C167499C-17E5-A7E0-2485-CF328CAC9FE9}"/>
+          </ac:spMkLst>
+        </pc:spChg>
+        <pc:spChg chg="add">
+          <ac:chgData name="Viktória Szabó" userId="S::viktoria22000@student.hamk.fi::55ff7ae3-70d3-4f82-942e-28ce8109f0e2" providerId="AD" clId="Web-{99DD3772-D7DA-ACAF-C41D-2125D048CA4C}" dt="2023-09-26T10:39:26.221" v="376"/>
+          <ac:spMkLst>
+            <pc:docMk/>
+            <pc:sldMk cId="1072539886" sldId="267"/>
+            <ac:spMk id="8" creationId="{DE61FBD7-E37C-4B38-BE44-A6D4978D7486}"/>
+          </ac:spMkLst>
+        </pc:spChg>
+        <pc:spChg chg="add">
+          <ac:chgData name="Viktória Szabó" userId="S::viktoria22000@student.hamk.fi::55ff7ae3-70d3-4f82-942e-28ce8109f0e2" providerId="AD" clId="Web-{99DD3772-D7DA-ACAF-C41D-2125D048CA4C}" dt="2023-09-26T10:39:26.221" v="376"/>
+          <ac:spMkLst>
+            <pc:docMk/>
+            <pc:sldMk cId="1072539886" sldId="267"/>
+            <ac:spMk id="10" creationId="{823772C2-0911-45A0-B7B6-D811380C75AC}"/>
+          </ac:spMkLst>
+        </pc:spChg>
+        <pc:grpChg chg="add">
+          <ac:chgData name="Viktória Szabó" userId="S::viktoria22000@student.hamk.fi::55ff7ae3-70d3-4f82-942e-28ce8109f0e2" providerId="AD" clId="Web-{99DD3772-D7DA-ACAF-C41D-2125D048CA4C}" dt="2023-09-26T10:39:26.221" v="376"/>
+          <ac:grpSpMkLst>
+            <pc:docMk/>
+            <pc:sldMk cId="1072539886" sldId="267"/>
+            <ac:grpSpMk id="12" creationId="{53A6A32E-D196-4536-A9E8-56D5BB884FCA}"/>
+          </ac:grpSpMkLst>
+        </pc:grpChg>
+      </pc:sldChg>
+      <pc:sldChg chg="addSp modSp new mod setBg">
+        <pc:chgData name="Viktória Szabó" userId="S::viktoria22000@student.hamk.fi::55ff7ae3-70d3-4f82-942e-28ce8109f0e2" providerId="AD" clId="Web-{99DD3772-D7DA-ACAF-C41D-2125D048CA4C}" dt="2023-09-26T10:44:11.831" v="657"/>
+        <pc:sldMkLst>
+          <pc:docMk/>
+          <pc:sldMk cId="3257955536" sldId="268"/>
+        </pc:sldMkLst>
+        <pc:spChg chg="mod">
+          <ac:chgData name="Viktória Szabó" userId="S::viktoria22000@student.hamk.fi::55ff7ae3-70d3-4f82-942e-28ce8109f0e2" providerId="AD" clId="Web-{99DD3772-D7DA-ACAF-C41D-2125D048CA4C}" dt="2023-09-26T10:44:11.831" v="657"/>
+          <ac:spMkLst>
+            <pc:docMk/>
+            <pc:sldMk cId="3257955536" sldId="268"/>
+            <ac:spMk id="2" creationId="{280DD61B-22A7-3D58-A0ED-2C2AFB5E9234}"/>
+          </ac:spMkLst>
+        </pc:spChg>
+        <pc:spChg chg="mod">
+          <ac:chgData name="Viktória Szabó" userId="S::viktoria22000@student.hamk.fi::55ff7ae3-70d3-4f82-942e-28ce8109f0e2" providerId="AD" clId="Web-{99DD3772-D7DA-ACAF-C41D-2125D048CA4C}" dt="2023-09-26T10:44:11.831" v="657"/>
+          <ac:spMkLst>
+            <pc:docMk/>
+            <pc:sldMk cId="3257955536" sldId="268"/>
+            <ac:spMk id="3" creationId="{40D137FA-18A4-4E72-3B1A-E45AE21D012B}"/>
+          </ac:spMkLst>
+        </pc:spChg>
+        <pc:spChg chg="add">
+          <ac:chgData name="Viktória Szabó" userId="S::viktoria22000@student.hamk.fi::55ff7ae3-70d3-4f82-942e-28ce8109f0e2" providerId="AD" clId="Web-{99DD3772-D7DA-ACAF-C41D-2125D048CA4C}" dt="2023-09-26T10:44:11.831" v="657"/>
+          <ac:spMkLst>
+            <pc:docMk/>
+            <pc:sldMk cId="3257955536" sldId="268"/>
+            <ac:spMk id="8" creationId="{8651CFA9-6065-4243-AC48-858E359780B1}"/>
+          </ac:spMkLst>
+        </pc:spChg>
+        <pc:spChg chg="add">
+          <ac:chgData name="Viktória Szabó" userId="S::viktoria22000@student.hamk.fi::55ff7ae3-70d3-4f82-942e-28ce8109f0e2" providerId="AD" clId="Web-{99DD3772-D7DA-ACAF-C41D-2125D048CA4C}" dt="2023-09-26T10:44:11.831" v="657"/>
+          <ac:spMkLst>
+            <pc:docMk/>
+            <pc:sldMk cId="3257955536" sldId="268"/>
+            <ac:spMk id="10" creationId="{7462BFBC-0E19-4E6F-B0C7-CD5C519BC311}"/>
+          </ac:spMkLst>
+        </pc:spChg>
+        <pc:spChg chg="add">
+          <ac:chgData name="Viktória Szabó" userId="S::viktoria22000@student.hamk.fi::55ff7ae3-70d3-4f82-942e-28ce8109f0e2" providerId="AD" clId="Web-{99DD3772-D7DA-ACAF-C41D-2125D048CA4C}" dt="2023-09-26T10:44:11.831" v="657"/>
+          <ac:spMkLst>
+            <pc:docMk/>
+            <pc:sldMk cId="3257955536" sldId="268"/>
+            <ac:spMk id="16" creationId="{D813CD98-5EBE-426D-A4AC-FA5518B099DE}"/>
+          </ac:spMkLst>
+        </pc:spChg>
+        <pc:spChg chg="add">
+          <ac:chgData name="Viktória Szabó" userId="S::viktoria22000@student.hamk.fi::55ff7ae3-70d3-4f82-942e-28ce8109f0e2" providerId="AD" clId="Web-{99DD3772-D7DA-ACAF-C41D-2125D048CA4C}" dt="2023-09-26T10:44:11.831" v="657"/>
+          <ac:spMkLst>
+            <pc:docMk/>
+            <pc:sldMk cId="3257955536" sldId="268"/>
+            <ac:spMk id="18" creationId="{B453545A-B2D3-41EE-A91C-DBF43402DD43}"/>
+          </ac:spMkLst>
+        </pc:spChg>
+        <pc:grpChg chg="add">
+          <ac:chgData name="Viktória Szabó" userId="S::viktoria22000@student.hamk.fi::55ff7ae3-70d3-4f82-942e-28ce8109f0e2" providerId="AD" clId="Web-{99DD3772-D7DA-ACAF-C41D-2125D048CA4C}" dt="2023-09-26T10:44:11.831" v="657"/>
+          <ac:grpSpMkLst>
+            <pc:docMk/>
+            <pc:sldMk cId="3257955536" sldId="268"/>
+            <ac:grpSpMk id="12" creationId="{F2C2A007-4AE9-49C4-B364-5FDF34596224}"/>
+          </ac:grpSpMkLst>
+        </pc:grpChg>
       </pc:sldChg>
     </pc:docChg>
   </pc:docChgLst>
@@ -244,1470 +2193,6 @@
     </pc:docChg>
   </pc:docChgLst>
   <pc:docChgLst>
-    <pc:chgData name="Roy Liu" userId="755465ea-a681-4840-afaf-3106d4ded39d" providerId="ADAL" clId="{26A4DA2E-3B26-4A19-981B-FA4B6FD33F58}"/>
-    <pc:docChg chg="undo custSel addSld delSld modSld sldOrd addMainMaster delMainMaster">
-      <pc:chgData name="Roy Liu" userId="755465ea-a681-4840-afaf-3106d4ded39d" providerId="ADAL" clId="{26A4DA2E-3B26-4A19-981B-FA4B6FD33F58}" dt="2023-09-27T10:06:48.402" v="1860" actId="20577"/>
-      <pc:docMkLst>
-        <pc:docMk/>
-      </pc:docMkLst>
-      <pc:sldChg chg="addSp delSp modSp new mod modTransition modMedia setBg modClrScheme addAnim delAnim modAnim chgLayout">
-        <pc:chgData name="Roy Liu" userId="755465ea-a681-4840-afaf-3106d4ded39d" providerId="ADAL" clId="{26A4DA2E-3B26-4A19-981B-FA4B6FD33F58}" dt="2023-09-26T09:44:02.538" v="257" actId="20577"/>
-        <pc:sldMkLst>
-          <pc:docMk/>
-          <pc:sldMk cId="4059361716" sldId="256"/>
-        </pc:sldMkLst>
-        <pc:spChg chg="mod">
-          <ac:chgData name="Roy Liu" userId="755465ea-a681-4840-afaf-3106d4ded39d" providerId="ADAL" clId="{26A4DA2E-3B26-4A19-981B-FA4B6FD33F58}" dt="2023-09-20T11:44:14.964" v="163"/>
-          <ac:spMkLst>
-            <pc:docMk/>
-            <pc:sldMk cId="4059361716" sldId="256"/>
-            <ac:spMk id="2" creationId="{FB1621ED-E470-38C9-3C00-E64A512B7968}"/>
-          </ac:spMkLst>
-        </pc:spChg>
-        <pc:spChg chg="mod">
-          <ac:chgData name="Roy Liu" userId="755465ea-a681-4840-afaf-3106d4ded39d" providerId="ADAL" clId="{26A4DA2E-3B26-4A19-981B-FA4B6FD33F58}" dt="2023-09-26T09:44:02.538" v="257" actId="20577"/>
-          <ac:spMkLst>
-            <pc:docMk/>
-            <pc:sldMk cId="4059361716" sldId="256"/>
-            <ac:spMk id="3" creationId="{A1373B98-8ED3-37B9-5EB5-687324157D0A}"/>
-          </ac:spMkLst>
-        </pc:spChg>
-        <pc:spChg chg="add del">
-          <ac:chgData name="Roy Liu" userId="755465ea-a681-4840-afaf-3106d4ded39d" providerId="ADAL" clId="{26A4DA2E-3B26-4A19-981B-FA4B6FD33F58}" dt="2023-09-20T11:39:00.334" v="135" actId="26606"/>
-          <ac:spMkLst>
-            <pc:docMk/>
-            <pc:sldMk cId="4059361716" sldId="256"/>
-            <ac:spMk id="9" creationId="{1E644DE9-8D09-43E2-BA69-F57482CFC93A}"/>
-          </ac:spMkLst>
-        </pc:spChg>
-        <pc:spChg chg="add del">
-          <ac:chgData name="Roy Liu" userId="755465ea-a681-4840-afaf-3106d4ded39d" providerId="ADAL" clId="{26A4DA2E-3B26-4A19-981B-FA4B6FD33F58}" dt="2023-09-20T11:39:00.334" v="135" actId="26606"/>
-          <ac:spMkLst>
-            <pc:docMk/>
-            <pc:sldMk cId="4059361716" sldId="256"/>
-            <ac:spMk id="11" creationId="{6C23C919-B32E-40FF-B3D8-631316E84E3E}"/>
-          </ac:spMkLst>
-        </pc:spChg>
-        <pc:spChg chg="add del">
-          <ac:chgData name="Roy Liu" userId="755465ea-a681-4840-afaf-3106d4ded39d" providerId="ADAL" clId="{26A4DA2E-3B26-4A19-981B-FA4B6FD33F58}" dt="2023-09-20T11:39:10.769" v="139" actId="26606"/>
-          <ac:spMkLst>
-            <pc:docMk/>
-            <pc:sldMk cId="4059361716" sldId="256"/>
-            <ac:spMk id="13" creationId="{3768F94E-2BF1-56A5-87AC-0C427079334B}"/>
-          </ac:spMkLst>
-        </pc:spChg>
-        <pc:spChg chg="add del">
-          <ac:chgData name="Roy Liu" userId="755465ea-a681-4840-afaf-3106d4ded39d" providerId="ADAL" clId="{26A4DA2E-3B26-4A19-981B-FA4B6FD33F58}" dt="2023-09-20T11:39:10.769" v="139" actId="26606"/>
-          <ac:spMkLst>
-            <pc:docMk/>
-            <pc:sldMk cId="4059361716" sldId="256"/>
-            <ac:spMk id="15" creationId="{393D8CD4-7FBE-9118-0CEB-9C1A2FA6AE5A}"/>
-          </ac:spMkLst>
-        </pc:spChg>
-        <pc:spChg chg="add del">
-          <ac:chgData name="Roy Liu" userId="755465ea-a681-4840-afaf-3106d4ded39d" providerId="ADAL" clId="{26A4DA2E-3B26-4A19-981B-FA4B6FD33F58}" dt="2023-09-20T11:39:47.178" v="143" actId="26606"/>
-          <ac:spMkLst>
-            <pc:docMk/>
-            <pc:sldMk cId="4059361716" sldId="256"/>
-            <ac:spMk id="17" creationId="{1E644DE9-8D09-43E2-BA69-F57482CFC93A}"/>
-          </ac:spMkLst>
-        </pc:spChg>
-        <pc:spChg chg="add del">
-          <ac:chgData name="Roy Liu" userId="755465ea-a681-4840-afaf-3106d4ded39d" providerId="ADAL" clId="{26A4DA2E-3B26-4A19-981B-FA4B6FD33F58}" dt="2023-09-20T11:39:47.178" v="143" actId="26606"/>
-          <ac:spMkLst>
-            <pc:docMk/>
-            <pc:sldMk cId="4059361716" sldId="256"/>
-            <ac:spMk id="18" creationId="{6C23C919-B32E-40FF-B3D8-631316E84E3E}"/>
-          </ac:spMkLst>
-        </pc:spChg>
-        <pc:spChg chg="add del">
-          <ac:chgData name="Roy Liu" userId="755465ea-a681-4840-afaf-3106d4ded39d" providerId="ADAL" clId="{26A4DA2E-3B26-4A19-981B-FA4B6FD33F58}" dt="2023-09-20T11:39:49.982" v="145" actId="26606"/>
-          <ac:spMkLst>
-            <pc:docMk/>
-            <pc:sldMk cId="4059361716" sldId="256"/>
-            <ac:spMk id="21" creationId="{0623FB3B-24E7-5304-70D8-3CA402902220}"/>
-          </ac:spMkLst>
-        </pc:spChg>
-        <pc:spChg chg="add del">
-          <ac:chgData name="Roy Liu" userId="755465ea-a681-4840-afaf-3106d4ded39d" providerId="ADAL" clId="{26A4DA2E-3B26-4A19-981B-FA4B6FD33F58}" dt="2023-09-20T11:39:49.982" v="145" actId="26606"/>
-          <ac:spMkLst>
-            <pc:docMk/>
-            <pc:sldMk cId="4059361716" sldId="256"/>
-            <ac:spMk id="22" creationId="{97081EE3-B6BE-9584-F5AF-E5F6484DA7A1}"/>
-          </ac:spMkLst>
-        </pc:spChg>
-        <pc:spChg chg="add del">
-          <ac:chgData name="Roy Liu" userId="755465ea-a681-4840-afaf-3106d4ded39d" providerId="ADAL" clId="{26A4DA2E-3B26-4A19-981B-FA4B6FD33F58}" dt="2023-09-20T11:39:49.982" v="145" actId="26606"/>
-          <ac:spMkLst>
-            <pc:docMk/>
-            <pc:sldMk cId="4059361716" sldId="256"/>
-            <ac:spMk id="24" creationId="{4711BF64-C99B-2F90-ADA1-0C08F9BE8392}"/>
-          </ac:spMkLst>
-        </pc:spChg>
-        <pc:spChg chg="add del">
-          <ac:chgData name="Roy Liu" userId="755465ea-a681-4840-afaf-3106d4ded39d" providerId="ADAL" clId="{26A4DA2E-3B26-4A19-981B-FA4B6FD33F58}" dt="2023-09-20T11:39:52.314" v="147" actId="26606"/>
-          <ac:spMkLst>
-            <pc:docMk/>
-            <pc:sldMk cId="4059361716" sldId="256"/>
-            <ac:spMk id="26" creationId="{733E0473-C315-42D8-A82A-A2FE49DC67DA}"/>
-          </ac:spMkLst>
-        </pc:spChg>
-        <pc:spChg chg="add del">
-          <ac:chgData name="Roy Liu" userId="755465ea-a681-4840-afaf-3106d4ded39d" providerId="ADAL" clId="{26A4DA2E-3B26-4A19-981B-FA4B6FD33F58}" dt="2023-09-20T11:39:52.314" v="147" actId="26606"/>
-          <ac:spMkLst>
-            <pc:docMk/>
-            <pc:sldMk cId="4059361716" sldId="256"/>
-            <ac:spMk id="27" creationId="{AD23A251-68F2-43E5-812B-4BBAE1AF535E}"/>
-          </ac:spMkLst>
-        </pc:spChg>
-        <pc:spChg chg="add">
-          <ac:chgData name="Roy Liu" userId="755465ea-a681-4840-afaf-3106d4ded39d" providerId="ADAL" clId="{26A4DA2E-3B26-4A19-981B-FA4B6FD33F58}" dt="2023-09-20T11:39:52.354" v="148" actId="26606"/>
-          <ac:spMkLst>
-            <pc:docMk/>
-            <pc:sldMk cId="4059361716" sldId="256"/>
-            <ac:spMk id="37" creationId="{1E644DE9-8D09-43E2-BA69-F57482CFC93A}"/>
-          </ac:spMkLst>
-        </pc:spChg>
-        <pc:spChg chg="add">
-          <ac:chgData name="Roy Liu" userId="755465ea-a681-4840-afaf-3106d4ded39d" providerId="ADAL" clId="{26A4DA2E-3B26-4A19-981B-FA4B6FD33F58}" dt="2023-09-20T11:39:52.354" v="148" actId="26606"/>
-          <ac:spMkLst>
-            <pc:docMk/>
-            <pc:sldMk cId="4059361716" sldId="256"/>
-            <ac:spMk id="38" creationId="{6C23C919-B32E-40FF-B3D8-631316E84E3E}"/>
-          </ac:spMkLst>
-        </pc:spChg>
-        <pc:grpChg chg="add del">
-          <ac:chgData name="Roy Liu" userId="755465ea-a681-4840-afaf-3106d4ded39d" providerId="ADAL" clId="{26A4DA2E-3B26-4A19-981B-FA4B6FD33F58}" dt="2023-09-20T11:39:52.314" v="147" actId="26606"/>
-          <ac:grpSpMkLst>
-            <pc:docMk/>
-            <pc:sldMk cId="4059361716" sldId="256"/>
-            <ac:grpSpMk id="29" creationId="{0350AF23-2606-421F-AB7B-23D9B48F3E9B}"/>
-          </ac:grpSpMkLst>
-        </pc:grpChg>
-        <pc:picChg chg="add del">
-          <ac:chgData name="Roy Liu" userId="755465ea-a681-4840-afaf-3106d4ded39d" providerId="ADAL" clId="{26A4DA2E-3B26-4A19-981B-FA4B6FD33F58}" dt="2023-09-20T11:39:00.334" v="135" actId="26606"/>
-          <ac:picMkLst>
-            <pc:docMk/>
-            <pc:sldMk cId="4059361716" sldId="256"/>
-            <ac:picMk id="4" creationId="{B80152C7-DADA-79AF-671F-ED9DFFAEEDA7}"/>
-          </ac:picMkLst>
-        </pc:picChg>
-        <pc:picChg chg="add del mod">
-          <ac:chgData name="Roy Liu" userId="755465ea-a681-4840-afaf-3106d4ded39d" providerId="ADAL" clId="{26A4DA2E-3B26-4A19-981B-FA4B6FD33F58}" dt="2023-09-20T11:39:10.769" v="139" actId="26606"/>
-          <ac:picMkLst>
-            <pc:docMk/>
-            <pc:sldMk cId="4059361716" sldId="256"/>
-            <ac:picMk id="14" creationId="{896F5DF2-BCFC-2FB4-5329-B94F5C89D821}"/>
-          </ac:picMkLst>
-        </pc:picChg>
-        <pc:picChg chg="add del">
-          <ac:chgData name="Roy Liu" userId="755465ea-a681-4840-afaf-3106d4ded39d" providerId="ADAL" clId="{26A4DA2E-3B26-4A19-981B-FA4B6FD33F58}" dt="2023-09-20T11:39:47.178" v="143" actId="26606"/>
-          <ac:picMkLst>
-            <pc:docMk/>
-            <pc:sldMk cId="4059361716" sldId="256"/>
-            <ac:picMk id="19" creationId="{B80152C7-DADA-79AF-671F-ED9DFFAEEDA7}"/>
-          </ac:picMkLst>
-        </pc:picChg>
-        <pc:picChg chg="add del">
-          <ac:chgData name="Roy Liu" userId="755465ea-a681-4840-afaf-3106d4ded39d" providerId="ADAL" clId="{26A4DA2E-3B26-4A19-981B-FA4B6FD33F58}" dt="2023-09-20T11:39:49.982" v="145" actId="26606"/>
-          <ac:picMkLst>
-            <pc:docMk/>
-            <pc:sldMk cId="4059361716" sldId="256"/>
-            <ac:picMk id="23" creationId="{063B0685-32E7-D1F1-01AE-972466F1B3F9}"/>
-          </ac:picMkLst>
-        </pc:picChg>
-        <pc:picChg chg="add del">
-          <ac:chgData name="Roy Liu" userId="755465ea-a681-4840-afaf-3106d4ded39d" providerId="ADAL" clId="{26A4DA2E-3B26-4A19-981B-FA4B6FD33F58}" dt="2023-09-20T11:39:52.314" v="147" actId="26606"/>
-          <ac:picMkLst>
-            <pc:docMk/>
-            <pc:sldMk cId="4059361716" sldId="256"/>
-            <ac:picMk id="28" creationId="{B3EE9219-1F6E-EC8E-1308-4E7893ED0E74}"/>
-          </ac:picMkLst>
-        </pc:picChg>
-        <pc:picChg chg="add">
-          <ac:chgData name="Roy Liu" userId="755465ea-a681-4840-afaf-3106d4ded39d" providerId="ADAL" clId="{26A4DA2E-3B26-4A19-981B-FA4B6FD33F58}" dt="2023-09-20T11:39:52.354" v="148" actId="26606"/>
-          <ac:picMkLst>
-            <pc:docMk/>
-            <pc:sldMk cId="4059361716" sldId="256"/>
-            <ac:picMk id="39" creationId="{B80152C7-DADA-79AF-671F-ED9DFFAEEDA7}"/>
-          </ac:picMkLst>
-        </pc:picChg>
-      </pc:sldChg>
-      <pc:sldChg chg="modSp new mod">
-        <pc:chgData name="Roy Liu" userId="755465ea-a681-4840-afaf-3106d4ded39d" providerId="ADAL" clId="{26A4DA2E-3B26-4A19-981B-FA4B6FD33F58}" dt="2023-09-26T10:08:46.662" v="652" actId="20577"/>
-        <pc:sldMkLst>
-          <pc:docMk/>
-          <pc:sldMk cId="1499829321" sldId="257"/>
-        </pc:sldMkLst>
-        <pc:spChg chg="mod">
-          <ac:chgData name="Roy Liu" userId="755465ea-a681-4840-afaf-3106d4ded39d" providerId="ADAL" clId="{26A4DA2E-3B26-4A19-981B-FA4B6FD33F58}" dt="2023-09-26T09:49:19.300" v="258" actId="790"/>
-          <ac:spMkLst>
-            <pc:docMk/>
-            <pc:sldMk cId="1499829321" sldId="257"/>
-            <ac:spMk id="2" creationId="{6E7FAB23-3BBF-1A08-4ADC-40F67AE0A9F3}"/>
-          </ac:spMkLst>
-        </pc:spChg>
-        <pc:spChg chg="mod">
-          <ac:chgData name="Roy Liu" userId="755465ea-a681-4840-afaf-3106d4ded39d" providerId="ADAL" clId="{26A4DA2E-3B26-4A19-981B-FA4B6FD33F58}" dt="2023-09-26T10:08:46.662" v="652" actId="20577"/>
-          <ac:spMkLst>
-            <pc:docMk/>
-            <pc:sldMk cId="1499829321" sldId="257"/>
-            <ac:spMk id="3" creationId="{27880FD4-D46A-B9D5-23AC-6C0D8D9629D2}"/>
-          </ac:spMkLst>
-        </pc:spChg>
-      </pc:sldChg>
-      <pc:sldChg chg="modSp new mod">
-        <pc:chgData name="Roy Liu" userId="755465ea-a681-4840-afaf-3106d4ded39d" providerId="ADAL" clId="{26A4DA2E-3B26-4A19-981B-FA4B6FD33F58}" dt="2023-09-27T09:57:53.830" v="1536" actId="20577"/>
-        <pc:sldMkLst>
-          <pc:docMk/>
-          <pc:sldMk cId="3596416156" sldId="258"/>
-        </pc:sldMkLst>
-        <pc:spChg chg="mod">
-          <ac:chgData name="Roy Liu" userId="755465ea-a681-4840-afaf-3106d4ded39d" providerId="ADAL" clId="{26A4DA2E-3B26-4A19-981B-FA4B6FD33F58}" dt="2023-09-26T09:58:33.208" v="368" actId="20577"/>
-          <ac:spMkLst>
-            <pc:docMk/>
-            <pc:sldMk cId="3596416156" sldId="258"/>
-            <ac:spMk id="2" creationId="{027F2EE5-1AEC-892A-0F33-1DAF05804E15}"/>
-          </ac:spMkLst>
-        </pc:spChg>
-        <pc:spChg chg="mod">
-          <ac:chgData name="Roy Liu" userId="755465ea-a681-4840-afaf-3106d4ded39d" providerId="ADAL" clId="{26A4DA2E-3B26-4A19-981B-FA4B6FD33F58}" dt="2023-09-27T09:57:53.830" v="1536" actId="20577"/>
-          <ac:spMkLst>
-            <pc:docMk/>
-            <pc:sldMk cId="3596416156" sldId="258"/>
-            <ac:spMk id="3" creationId="{C5FBD0D9-1F3E-B448-0B80-6863AE3ECA96}"/>
-          </ac:spMkLst>
-        </pc:spChg>
-      </pc:sldChg>
-      <pc:sldChg chg="modSp new del mod">
-        <pc:chgData name="Roy Liu" userId="755465ea-a681-4840-afaf-3106d4ded39d" providerId="ADAL" clId="{26A4DA2E-3B26-4A19-981B-FA4B6FD33F58}" dt="2023-09-26T09:59:07.693" v="466" actId="2696"/>
-        <pc:sldMkLst>
-          <pc:docMk/>
-          <pc:sldMk cId="2063800821" sldId="259"/>
-        </pc:sldMkLst>
-        <pc:spChg chg="mod">
-          <ac:chgData name="Roy Liu" userId="755465ea-a681-4840-afaf-3106d4ded39d" providerId="ADAL" clId="{26A4DA2E-3B26-4A19-981B-FA4B6FD33F58}" dt="2023-09-26T09:50:11.128" v="264" actId="20577"/>
-          <ac:spMkLst>
-            <pc:docMk/>
-            <pc:sldMk cId="2063800821" sldId="259"/>
-            <ac:spMk id="2" creationId="{9DA16EE9-A1C6-5746-186A-A83C444481EE}"/>
-          </ac:spMkLst>
-        </pc:spChg>
-      </pc:sldChg>
-      <pc:sldChg chg="modSp new mod ord">
-        <pc:chgData name="Roy Liu" userId="755465ea-a681-4840-afaf-3106d4ded39d" providerId="ADAL" clId="{26A4DA2E-3B26-4A19-981B-FA4B6FD33F58}" dt="2023-09-26T09:57:06.572" v="289" actId="20577"/>
-        <pc:sldMkLst>
-          <pc:docMk/>
-          <pc:sldMk cId="1627402840" sldId="260"/>
-        </pc:sldMkLst>
-        <pc:spChg chg="mod">
-          <ac:chgData name="Roy Liu" userId="755465ea-a681-4840-afaf-3106d4ded39d" providerId="ADAL" clId="{26A4DA2E-3B26-4A19-981B-FA4B6FD33F58}" dt="2023-09-26T09:57:06.572" v="289" actId="20577"/>
-          <ac:spMkLst>
-            <pc:docMk/>
-            <pc:sldMk cId="1627402840" sldId="260"/>
-            <ac:spMk id="2" creationId="{FC60A86F-C9EB-93AE-9163-0F2723C7C1CE}"/>
-          </ac:spMkLst>
-        </pc:spChg>
-      </pc:sldChg>
-      <pc:sldChg chg="addSp delSp modSp new mod setBg">
-        <pc:chgData name="Roy Liu" userId="755465ea-a681-4840-afaf-3106d4ded39d" providerId="ADAL" clId="{26A4DA2E-3B26-4A19-981B-FA4B6FD33F58}" dt="2023-09-27T09:56:06.861" v="1454" actId="20577"/>
-        <pc:sldMkLst>
-          <pc:docMk/>
-          <pc:sldMk cId="833342778" sldId="261"/>
-        </pc:sldMkLst>
-        <pc:spChg chg="mod">
-          <ac:chgData name="Roy Liu" userId="755465ea-a681-4840-afaf-3106d4ded39d" providerId="ADAL" clId="{26A4DA2E-3B26-4A19-981B-FA4B6FD33F58}" dt="2023-09-27T09:56:06.861" v="1454" actId="20577"/>
-          <ac:spMkLst>
-            <pc:docMk/>
-            <pc:sldMk cId="833342778" sldId="261"/>
-            <ac:spMk id="2" creationId="{5FD84A74-3A6C-F4D8-BE30-E95E481604FC}"/>
-          </ac:spMkLst>
-        </pc:spChg>
-        <pc:spChg chg="del">
-          <ac:chgData name="Roy Liu" userId="755465ea-a681-4840-afaf-3106d4ded39d" providerId="ADAL" clId="{26A4DA2E-3B26-4A19-981B-FA4B6FD33F58}" dt="2023-09-26T10:13:52.571" v="653"/>
-          <ac:spMkLst>
-            <pc:docMk/>
-            <pc:sldMk cId="833342778" sldId="261"/>
-            <ac:spMk id="3" creationId="{9033DF0E-4884-3629-37B2-76BF7229470C}"/>
-          </ac:spMkLst>
-        </pc:spChg>
-        <pc:spChg chg="add del">
-          <ac:chgData name="Roy Liu" userId="755465ea-a681-4840-afaf-3106d4ded39d" providerId="ADAL" clId="{26A4DA2E-3B26-4A19-981B-FA4B6FD33F58}" dt="2023-09-26T10:14:13.489" v="656" actId="26606"/>
-          <ac:spMkLst>
-            <pc:docMk/>
-            <pc:sldMk cId="833342778" sldId="261"/>
-            <ac:spMk id="9" creationId="{52814DCF-62D4-3000-30DB-D3CAC0CB7C66}"/>
-          </ac:spMkLst>
-        </pc:spChg>
-        <pc:spChg chg="add del">
-          <ac:chgData name="Roy Liu" userId="755465ea-a681-4840-afaf-3106d4ded39d" providerId="ADAL" clId="{26A4DA2E-3B26-4A19-981B-FA4B6FD33F58}" dt="2023-09-26T10:14:13.489" v="656" actId="26606"/>
-          <ac:spMkLst>
-            <pc:docMk/>
-            <pc:sldMk cId="833342778" sldId="261"/>
-            <ac:spMk id="12" creationId="{8651CFA9-6065-4243-AC48-858E359780B1}"/>
-          </ac:spMkLst>
-        </pc:spChg>
-        <pc:spChg chg="add del">
-          <ac:chgData name="Roy Liu" userId="755465ea-a681-4840-afaf-3106d4ded39d" providerId="ADAL" clId="{26A4DA2E-3B26-4A19-981B-FA4B6FD33F58}" dt="2023-09-26T10:14:13.489" v="656" actId="26606"/>
-          <ac:spMkLst>
-            <pc:docMk/>
-            <pc:sldMk cId="833342778" sldId="261"/>
-            <ac:spMk id="14" creationId="{FBC8BBE5-981E-4B0B-9654-32B5668BFF31}"/>
-          </ac:spMkLst>
-        </pc:spChg>
-        <pc:spChg chg="add del">
-          <ac:chgData name="Roy Liu" userId="755465ea-a681-4840-afaf-3106d4ded39d" providerId="ADAL" clId="{26A4DA2E-3B26-4A19-981B-FA4B6FD33F58}" dt="2023-09-26T10:14:14.595" v="658" actId="26606"/>
-          <ac:spMkLst>
-            <pc:docMk/>
-            <pc:sldMk cId="833342778" sldId="261"/>
-            <ac:spMk id="20" creationId="{A3EF0E40-AEB8-4DF7-A67A-7317B3BF94CA}"/>
-          </ac:spMkLst>
-        </pc:spChg>
-        <pc:spChg chg="add del">
-          <ac:chgData name="Roy Liu" userId="755465ea-a681-4840-afaf-3106d4ded39d" providerId="ADAL" clId="{26A4DA2E-3B26-4A19-981B-FA4B6FD33F58}" dt="2023-09-26T10:14:14.595" v="658" actId="26606"/>
-          <ac:spMkLst>
-            <pc:docMk/>
-            <pc:sldMk cId="833342778" sldId="261"/>
-            <ac:spMk id="21" creationId="{8651CFA9-6065-4243-AC48-858E359780B1}"/>
-          </ac:spMkLst>
-        </pc:spChg>
-        <pc:spChg chg="add del">
-          <ac:chgData name="Roy Liu" userId="755465ea-a681-4840-afaf-3106d4ded39d" providerId="ADAL" clId="{26A4DA2E-3B26-4A19-981B-FA4B6FD33F58}" dt="2023-09-26T10:14:14.595" v="658" actId="26606"/>
-          <ac:spMkLst>
-            <pc:docMk/>
-            <pc:sldMk cId="833342778" sldId="261"/>
-            <ac:spMk id="22" creationId="{06B1FD15-9CBB-4259-931E-1EB6A87199E9}"/>
-          </ac:spMkLst>
-        </pc:spChg>
-        <pc:spChg chg="add del">
-          <ac:chgData name="Roy Liu" userId="755465ea-a681-4840-afaf-3106d4ded39d" providerId="ADAL" clId="{26A4DA2E-3B26-4A19-981B-FA4B6FD33F58}" dt="2023-09-26T10:14:14.595" v="658" actId="26606"/>
-          <ac:spMkLst>
-            <pc:docMk/>
-            <pc:sldMk cId="833342778" sldId="261"/>
-            <ac:spMk id="24" creationId="{F8C57F8C-07BA-E657-0190-A22217C53599}"/>
-          </ac:spMkLst>
-        </pc:spChg>
-        <pc:spChg chg="add del">
-          <ac:chgData name="Roy Liu" userId="755465ea-a681-4840-afaf-3106d4ded39d" providerId="ADAL" clId="{26A4DA2E-3B26-4A19-981B-FA4B6FD33F58}" dt="2023-09-26T10:14:19.660" v="660" actId="26606"/>
-          <ac:spMkLst>
-            <pc:docMk/>
-            <pc:sldMk cId="833342778" sldId="261"/>
-            <ac:spMk id="26" creationId="{A4FB2F27-3F7D-440E-A905-86607A926A29}"/>
-          </ac:spMkLst>
-        </pc:spChg>
-        <pc:spChg chg="add del">
-          <ac:chgData name="Roy Liu" userId="755465ea-a681-4840-afaf-3106d4ded39d" providerId="ADAL" clId="{26A4DA2E-3B26-4A19-981B-FA4B6FD33F58}" dt="2023-09-26T10:14:19.660" v="660" actId="26606"/>
-          <ac:spMkLst>
-            <pc:docMk/>
-            <pc:sldMk cId="833342778" sldId="261"/>
-            <ac:spMk id="27" creationId="{AF678C14-A033-4139-BCA9-8382B039648B}"/>
-          </ac:spMkLst>
-        </pc:spChg>
-        <pc:spChg chg="add del">
-          <ac:chgData name="Roy Liu" userId="755465ea-a681-4840-afaf-3106d4ded39d" providerId="ADAL" clId="{26A4DA2E-3B26-4A19-981B-FA4B6FD33F58}" dt="2023-09-26T10:14:19.660" v="660" actId="26606"/>
-          <ac:spMkLst>
-            <pc:docMk/>
-            <pc:sldMk cId="833342778" sldId="261"/>
-            <ac:spMk id="29" creationId="{90AA31C0-A74F-2F69-15E2-23D8EE580828}"/>
-          </ac:spMkLst>
-        </pc:spChg>
-        <pc:spChg chg="add del">
-          <ac:chgData name="Roy Liu" userId="755465ea-a681-4840-afaf-3106d4ded39d" providerId="ADAL" clId="{26A4DA2E-3B26-4A19-981B-FA4B6FD33F58}" dt="2023-09-26T10:14:22.504" v="662" actId="26606"/>
-          <ac:spMkLst>
-            <pc:docMk/>
-            <pc:sldMk cId="833342778" sldId="261"/>
-            <ac:spMk id="31" creationId="{A4FB2F27-3F7D-440E-A905-86607A926A29}"/>
-          </ac:spMkLst>
-        </pc:spChg>
-        <pc:spChg chg="add del">
-          <ac:chgData name="Roy Liu" userId="755465ea-a681-4840-afaf-3106d4ded39d" providerId="ADAL" clId="{26A4DA2E-3B26-4A19-981B-FA4B6FD33F58}" dt="2023-09-26T10:14:22.504" v="662" actId="26606"/>
-          <ac:spMkLst>
-            <pc:docMk/>
-            <pc:sldMk cId="833342778" sldId="261"/>
-            <ac:spMk id="32" creationId="{AF678C14-A033-4139-BCA9-8382B039648B}"/>
-          </ac:spMkLst>
-        </pc:spChg>
-        <pc:spChg chg="add del">
-          <ac:chgData name="Roy Liu" userId="755465ea-a681-4840-afaf-3106d4ded39d" providerId="ADAL" clId="{26A4DA2E-3B26-4A19-981B-FA4B6FD33F58}" dt="2023-09-26T10:14:22.504" v="662" actId="26606"/>
-          <ac:spMkLst>
-            <pc:docMk/>
-            <pc:sldMk cId="833342778" sldId="261"/>
-            <ac:spMk id="34" creationId="{9944F14A-33B5-02AA-5755-C19A9531AD01}"/>
-          </ac:spMkLst>
-        </pc:spChg>
-        <pc:spChg chg="add del">
-          <ac:chgData name="Roy Liu" userId="755465ea-a681-4840-afaf-3106d4ded39d" providerId="ADAL" clId="{26A4DA2E-3B26-4A19-981B-FA4B6FD33F58}" dt="2023-09-26T10:14:39.973" v="664" actId="26606"/>
-          <ac:spMkLst>
-            <pc:docMk/>
-            <pc:sldMk cId="833342778" sldId="261"/>
-            <ac:spMk id="36" creationId="{8651CFA9-6065-4243-AC48-858E359780B1}"/>
-          </ac:spMkLst>
-        </pc:spChg>
-        <pc:spChg chg="add del">
-          <ac:chgData name="Roy Liu" userId="755465ea-a681-4840-afaf-3106d4ded39d" providerId="ADAL" clId="{26A4DA2E-3B26-4A19-981B-FA4B6FD33F58}" dt="2023-09-26T10:14:39.973" v="664" actId="26606"/>
-          <ac:spMkLst>
-            <pc:docMk/>
-            <pc:sldMk cId="833342778" sldId="261"/>
-            <ac:spMk id="37" creationId="{FBC8BBE5-981E-4B0B-9654-32B5668BFF31}"/>
-          </ac:spMkLst>
-        </pc:spChg>
-        <pc:spChg chg="add del">
-          <ac:chgData name="Roy Liu" userId="755465ea-a681-4840-afaf-3106d4ded39d" providerId="ADAL" clId="{26A4DA2E-3B26-4A19-981B-FA4B6FD33F58}" dt="2023-09-26T10:14:39.973" v="664" actId="26606"/>
-          <ac:spMkLst>
-            <pc:docMk/>
-            <pc:sldMk cId="833342778" sldId="261"/>
-            <ac:spMk id="39" creationId="{52814DCF-62D4-3000-30DB-D3CAC0CB7C66}"/>
-          </ac:spMkLst>
-        </pc:spChg>
-        <pc:spChg chg="add del">
-          <ac:chgData name="Roy Liu" userId="755465ea-a681-4840-afaf-3106d4ded39d" providerId="ADAL" clId="{26A4DA2E-3B26-4A19-981B-FA4B6FD33F58}" dt="2023-09-26T10:14:41.077" v="666" actId="26606"/>
-          <ac:spMkLst>
-            <pc:docMk/>
-            <pc:sldMk cId="833342778" sldId="261"/>
-            <ac:spMk id="41" creationId="{8651CFA9-6065-4243-AC48-858E359780B1}"/>
-          </ac:spMkLst>
-        </pc:spChg>
-        <pc:spChg chg="add del">
-          <ac:chgData name="Roy Liu" userId="755465ea-a681-4840-afaf-3106d4ded39d" providerId="ADAL" clId="{26A4DA2E-3B26-4A19-981B-FA4B6FD33F58}" dt="2023-09-26T10:14:41.077" v="666" actId="26606"/>
-          <ac:spMkLst>
-            <pc:docMk/>
-            <pc:sldMk cId="833342778" sldId="261"/>
-            <ac:spMk id="42" creationId="{FBC8BBE5-981E-4B0B-9654-32B5668BFF31}"/>
-          </ac:spMkLst>
-        </pc:spChg>
-        <pc:spChg chg="add del">
-          <ac:chgData name="Roy Liu" userId="755465ea-a681-4840-afaf-3106d4ded39d" providerId="ADAL" clId="{26A4DA2E-3B26-4A19-981B-FA4B6FD33F58}" dt="2023-09-26T10:14:41.077" v="666" actId="26606"/>
-          <ac:spMkLst>
-            <pc:docMk/>
-            <pc:sldMk cId="833342778" sldId="261"/>
-            <ac:spMk id="44" creationId="{0DADC141-2CF4-4D22-BFEF-05FB358E4DFD}"/>
-          </ac:spMkLst>
-        </pc:spChg>
-        <pc:spChg chg="add del">
-          <ac:chgData name="Roy Liu" userId="755465ea-a681-4840-afaf-3106d4ded39d" providerId="ADAL" clId="{26A4DA2E-3B26-4A19-981B-FA4B6FD33F58}" dt="2023-09-26T10:14:41.077" v="666" actId="26606"/>
-          <ac:spMkLst>
-            <pc:docMk/>
-            <pc:sldMk cId="833342778" sldId="261"/>
-            <ac:spMk id="45" creationId="{F43A66C0-8F79-4D55-8A61-9E980D5FEE26}"/>
-          </ac:spMkLst>
-        </pc:spChg>
-        <pc:spChg chg="add del">
-          <ac:chgData name="Roy Liu" userId="755465ea-a681-4840-afaf-3106d4ded39d" providerId="ADAL" clId="{26A4DA2E-3B26-4A19-981B-FA4B6FD33F58}" dt="2023-09-26T10:14:41.077" v="666" actId="26606"/>
-          <ac:spMkLst>
-            <pc:docMk/>
-            <pc:sldMk cId="833342778" sldId="261"/>
-            <ac:spMk id="46" creationId="{05DEB5AD-912E-FADE-0E08-E5E5BAF3B460}"/>
-          </ac:spMkLst>
-        </pc:spChg>
-        <pc:spChg chg="add del">
-          <ac:chgData name="Roy Liu" userId="755465ea-a681-4840-afaf-3106d4ded39d" providerId="ADAL" clId="{26A4DA2E-3B26-4A19-981B-FA4B6FD33F58}" dt="2023-09-26T10:15:50.081" v="668" actId="26606"/>
-          <ac:spMkLst>
-            <pc:docMk/>
-            <pc:sldMk cId="833342778" sldId="261"/>
-            <ac:spMk id="48" creationId="{8651CFA9-6065-4243-AC48-858E359780B1}"/>
-          </ac:spMkLst>
-        </pc:spChg>
-        <pc:spChg chg="add del">
-          <ac:chgData name="Roy Liu" userId="755465ea-a681-4840-afaf-3106d4ded39d" providerId="ADAL" clId="{26A4DA2E-3B26-4A19-981B-FA4B6FD33F58}" dt="2023-09-26T10:15:50.081" v="668" actId="26606"/>
-          <ac:spMkLst>
-            <pc:docMk/>
-            <pc:sldMk cId="833342778" sldId="261"/>
-            <ac:spMk id="49" creationId="{FBC8BBE5-981E-4B0B-9654-32B5668BFF31}"/>
-          </ac:spMkLst>
-        </pc:spChg>
-        <pc:spChg chg="add del">
-          <ac:chgData name="Roy Liu" userId="755465ea-a681-4840-afaf-3106d4ded39d" providerId="ADAL" clId="{26A4DA2E-3B26-4A19-981B-FA4B6FD33F58}" dt="2023-09-26T10:15:50.081" v="668" actId="26606"/>
-          <ac:spMkLst>
-            <pc:docMk/>
-            <pc:sldMk cId="833342778" sldId="261"/>
-            <ac:spMk id="51" creationId="{0DADC141-2CF4-4D22-BFEF-05FB358E4DFD}"/>
-          </ac:spMkLst>
-        </pc:spChg>
-        <pc:spChg chg="add del">
-          <ac:chgData name="Roy Liu" userId="755465ea-a681-4840-afaf-3106d4ded39d" providerId="ADAL" clId="{26A4DA2E-3B26-4A19-981B-FA4B6FD33F58}" dt="2023-09-26T10:15:50.081" v="668" actId="26606"/>
-          <ac:spMkLst>
-            <pc:docMk/>
-            <pc:sldMk cId="833342778" sldId="261"/>
-            <ac:spMk id="52" creationId="{BFA7080D-E80E-D14C-12D8-498F7C6288E0}"/>
-          </ac:spMkLst>
-        </pc:spChg>
-        <pc:spChg chg="add del">
-          <ac:chgData name="Roy Liu" userId="755465ea-a681-4840-afaf-3106d4ded39d" providerId="ADAL" clId="{26A4DA2E-3B26-4A19-981B-FA4B6FD33F58}" dt="2023-09-26T11:21:44.938" v="747" actId="26606"/>
-          <ac:spMkLst>
-            <pc:docMk/>
-            <pc:sldMk cId="833342778" sldId="261"/>
-            <ac:spMk id="54" creationId="{A4FB2F27-3F7D-440E-A905-86607A926A29}"/>
-          </ac:spMkLst>
-        </pc:spChg>
-        <pc:spChg chg="add del">
-          <ac:chgData name="Roy Liu" userId="755465ea-a681-4840-afaf-3106d4ded39d" providerId="ADAL" clId="{26A4DA2E-3B26-4A19-981B-FA4B6FD33F58}" dt="2023-09-26T11:21:44.938" v="747" actId="26606"/>
-          <ac:spMkLst>
-            <pc:docMk/>
-            <pc:sldMk cId="833342778" sldId="261"/>
-            <ac:spMk id="55" creationId="{AF678C14-A033-4139-BCA9-8382B039648B}"/>
-          </ac:spMkLst>
-        </pc:spChg>
-        <pc:spChg chg="add mod">
-          <ac:chgData name="Roy Liu" userId="755465ea-a681-4840-afaf-3106d4ded39d" providerId="ADAL" clId="{26A4DA2E-3B26-4A19-981B-FA4B6FD33F58}" dt="2023-09-26T11:57:45.145" v="1110" actId="20577"/>
-          <ac:spMkLst>
-            <pc:docMk/>
-            <pc:sldMk cId="833342778" sldId="261"/>
-            <ac:spMk id="57" creationId="{90AA31C0-A74F-2F69-15E2-23D8EE580828}"/>
-          </ac:spMkLst>
-        </pc:spChg>
-        <pc:spChg chg="add del">
-          <ac:chgData name="Roy Liu" userId="755465ea-a681-4840-afaf-3106d4ded39d" providerId="ADAL" clId="{26A4DA2E-3B26-4A19-981B-FA4B6FD33F58}" dt="2023-09-26T11:21:41.812" v="742" actId="26606"/>
-          <ac:spMkLst>
-            <pc:docMk/>
-            <pc:sldMk cId="833342778" sldId="261"/>
-            <ac:spMk id="62" creationId="{8651CFA9-6065-4243-AC48-858E359780B1}"/>
-          </ac:spMkLst>
-        </pc:spChg>
-        <pc:spChg chg="add del">
-          <ac:chgData name="Roy Liu" userId="755465ea-a681-4840-afaf-3106d4ded39d" providerId="ADAL" clId="{26A4DA2E-3B26-4A19-981B-FA4B6FD33F58}" dt="2023-09-26T11:21:41.812" v="742" actId="26606"/>
-          <ac:spMkLst>
-            <pc:docMk/>
-            <pc:sldMk cId="833342778" sldId="261"/>
-            <ac:spMk id="64" creationId="{FBC8BBE5-981E-4B0B-9654-32B5668BFF31}"/>
-          </ac:spMkLst>
-        </pc:spChg>
-        <pc:spChg chg="add del">
-          <ac:chgData name="Roy Liu" userId="755465ea-a681-4840-afaf-3106d4ded39d" providerId="ADAL" clId="{26A4DA2E-3B26-4A19-981B-FA4B6FD33F58}" dt="2023-09-26T11:21:43.627" v="744" actId="26606"/>
-          <ac:spMkLst>
-            <pc:docMk/>
-            <pc:sldMk cId="833342778" sldId="261"/>
-            <ac:spMk id="70" creationId="{8651CFA9-6065-4243-AC48-858E359780B1}"/>
-          </ac:spMkLst>
-        </pc:spChg>
-        <pc:spChg chg="add del">
-          <ac:chgData name="Roy Liu" userId="755465ea-a681-4840-afaf-3106d4ded39d" providerId="ADAL" clId="{26A4DA2E-3B26-4A19-981B-FA4B6FD33F58}" dt="2023-09-26T11:21:43.627" v="744" actId="26606"/>
-          <ac:spMkLst>
-            <pc:docMk/>
-            <pc:sldMk cId="833342778" sldId="261"/>
-            <ac:spMk id="71" creationId="{5A8C81AE-8F0D-49F3-9FB4-334B0DCDF195}"/>
-          </ac:spMkLst>
-        </pc:spChg>
-        <pc:spChg chg="add del">
-          <ac:chgData name="Roy Liu" userId="755465ea-a681-4840-afaf-3106d4ded39d" providerId="ADAL" clId="{26A4DA2E-3B26-4A19-981B-FA4B6FD33F58}" dt="2023-09-26T11:21:44.923" v="746" actId="26606"/>
-          <ac:spMkLst>
-            <pc:docMk/>
-            <pc:sldMk cId="833342778" sldId="261"/>
-            <ac:spMk id="73" creationId="{4AB8125F-0FD8-48CD-9F43-73E5494EA774}"/>
-          </ac:spMkLst>
-        </pc:spChg>
-        <pc:spChg chg="add del">
-          <ac:chgData name="Roy Liu" userId="755465ea-a681-4840-afaf-3106d4ded39d" providerId="ADAL" clId="{26A4DA2E-3B26-4A19-981B-FA4B6FD33F58}" dt="2023-09-26T11:21:44.923" v="746" actId="26606"/>
-          <ac:spMkLst>
-            <pc:docMk/>
-            <pc:sldMk cId="833342778" sldId="261"/>
-            <ac:spMk id="74" creationId="{0019DD6C-5899-4C07-864B-EB0A7D104ACF}"/>
-          </ac:spMkLst>
-        </pc:spChg>
-        <pc:spChg chg="add del">
-          <ac:chgData name="Roy Liu" userId="755465ea-a681-4840-afaf-3106d4ded39d" providerId="ADAL" clId="{26A4DA2E-3B26-4A19-981B-FA4B6FD33F58}" dt="2023-09-26T11:36:42.340" v="831" actId="26606"/>
-          <ac:spMkLst>
-            <pc:docMk/>
-            <pc:sldMk cId="833342778" sldId="261"/>
-            <ac:spMk id="77" creationId="{8651CFA9-6065-4243-AC48-858E359780B1}"/>
-          </ac:spMkLst>
-        </pc:spChg>
-        <pc:spChg chg="add del">
-          <ac:chgData name="Roy Liu" userId="755465ea-a681-4840-afaf-3106d4ded39d" providerId="ADAL" clId="{26A4DA2E-3B26-4A19-981B-FA4B6FD33F58}" dt="2023-09-26T11:36:42.340" v="831" actId="26606"/>
-          <ac:spMkLst>
-            <pc:docMk/>
-            <pc:sldMk cId="833342778" sldId="261"/>
-            <ac:spMk id="78" creationId="{1B6E9D4E-1863-458E-8166-A6E64C865F07}"/>
-          </ac:spMkLst>
-        </pc:spChg>
-        <pc:spChg chg="add del">
-          <ac:chgData name="Roy Liu" userId="755465ea-a681-4840-afaf-3106d4ded39d" providerId="ADAL" clId="{26A4DA2E-3B26-4A19-981B-FA4B6FD33F58}" dt="2023-09-26T11:36:42.340" v="831" actId="26606"/>
-          <ac:spMkLst>
-            <pc:docMk/>
-            <pc:sldMk cId="833342778" sldId="261"/>
-            <ac:spMk id="80" creationId="{F6B9E73A-7DA5-4C84-B395-757FF1941041}"/>
-          </ac:spMkLst>
-        </pc:spChg>
-        <pc:spChg chg="add del">
-          <ac:chgData name="Roy Liu" userId="755465ea-a681-4840-afaf-3106d4ded39d" providerId="ADAL" clId="{26A4DA2E-3B26-4A19-981B-FA4B6FD33F58}" dt="2023-09-26T11:36:54.709" v="834" actId="26606"/>
-          <ac:spMkLst>
-            <pc:docMk/>
-            <pc:sldMk cId="833342778" sldId="261"/>
-            <ac:spMk id="85" creationId="{8651CFA9-6065-4243-AC48-858E359780B1}"/>
-          </ac:spMkLst>
-        </pc:spChg>
-        <pc:spChg chg="add del">
-          <ac:chgData name="Roy Liu" userId="755465ea-a681-4840-afaf-3106d4ded39d" providerId="ADAL" clId="{26A4DA2E-3B26-4A19-981B-FA4B6FD33F58}" dt="2023-09-26T11:36:54.709" v="834" actId="26606"/>
-          <ac:spMkLst>
-            <pc:docMk/>
-            <pc:sldMk cId="833342778" sldId="261"/>
-            <ac:spMk id="87" creationId="{5A8C81AE-8F0D-49F3-9FB4-334B0DCDF195}"/>
-          </ac:spMkLst>
-        </pc:spChg>
-        <pc:spChg chg="add del">
-          <ac:chgData name="Roy Liu" userId="755465ea-a681-4840-afaf-3106d4ded39d" providerId="ADAL" clId="{26A4DA2E-3B26-4A19-981B-FA4B6FD33F58}" dt="2023-09-26T11:36:54.691" v="833" actId="26606"/>
-          <ac:spMkLst>
-            <pc:docMk/>
-            <pc:sldMk cId="833342778" sldId="261"/>
-            <ac:spMk id="96" creationId="{4AB8125F-0FD8-48CD-9F43-73E5494EA774}"/>
-          </ac:spMkLst>
-        </pc:spChg>
-        <pc:spChg chg="add del">
-          <ac:chgData name="Roy Liu" userId="755465ea-a681-4840-afaf-3106d4ded39d" providerId="ADAL" clId="{26A4DA2E-3B26-4A19-981B-FA4B6FD33F58}" dt="2023-09-26T11:36:54.691" v="833" actId="26606"/>
-          <ac:spMkLst>
-            <pc:docMk/>
-            <pc:sldMk cId="833342778" sldId="261"/>
-            <ac:spMk id="98" creationId="{0019DD6C-5899-4C07-864B-EB0A7D104ACF}"/>
-          </ac:spMkLst>
-        </pc:spChg>
-        <pc:spChg chg="add">
-          <ac:chgData name="Roy Liu" userId="755465ea-a681-4840-afaf-3106d4ded39d" providerId="ADAL" clId="{26A4DA2E-3B26-4A19-981B-FA4B6FD33F58}" dt="2023-09-26T11:36:54.709" v="834" actId="26606"/>
-          <ac:spMkLst>
-            <pc:docMk/>
-            <pc:sldMk cId="833342778" sldId="261"/>
-            <ac:spMk id="104" creationId="{8651CFA9-6065-4243-AC48-858E359780B1}"/>
-          </ac:spMkLst>
-        </pc:spChg>
-        <pc:spChg chg="add">
-          <ac:chgData name="Roy Liu" userId="755465ea-a681-4840-afaf-3106d4ded39d" providerId="ADAL" clId="{26A4DA2E-3B26-4A19-981B-FA4B6FD33F58}" dt="2023-09-26T11:36:54.709" v="834" actId="26606"/>
-          <ac:spMkLst>
-            <pc:docMk/>
-            <pc:sldMk cId="833342778" sldId="261"/>
-            <ac:spMk id="105" creationId="{FBC8BBE5-981E-4B0B-9654-32B5668BFF31}"/>
-          </ac:spMkLst>
-        </pc:spChg>
-        <pc:grpChg chg="add del">
-          <ac:chgData name="Roy Liu" userId="755465ea-a681-4840-afaf-3106d4ded39d" providerId="ADAL" clId="{26A4DA2E-3B26-4A19-981B-FA4B6FD33F58}" dt="2023-09-26T10:14:13.489" v="656" actId="26606"/>
-          <ac:grpSpMkLst>
-            <pc:docMk/>
-            <pc:sldMk cId="833342778" sldId="261"/>
-            <ac:grpSpMk id="16" creationId="{8D6FD602-3113-4FC4-982F-15099614D2A6}"/>
-          </ac:grpSpMkLst>
-        </pc:grpChg>
-        <pc:grpChg chg="add del">
-          <ac:chgData name="Roy Liu" userId="755465ea-a681-4840-afaf-3106d4ded39d" providerId="ADAL" clId="{26A4DA2E-3B26-4A19-981B-FA4B6FD33F58}" dt="2023-09-26T10:14:14.595" v="658" actId="26606"/>
-          <ac:grpSpMkLst>
-            <pc:docMk/>
-            <pc:sldMk cId="833342778" sldId="261"/>
-            <ac:grpSpMk id="23" creationId="{9D739765-2266-4358-BC9F-0DC2A6B7CD17}"/>
-          </ac:grpSpMkLst>
-        </pc:grpChg>
-        <pc:grpChg chg="add del">
-          <ac:chgData name="Roy Liu" userId="755465ea-a681-4840-afaf-3106d4ded39d" providerId="ADAL" clId="{26A4DA2E-3B26-4A19-981B-FA4B6FD33F58}" dt="2023-09-26T10:14:19.660" v="660" actId="26606"/>
-          <ac:grpSpMkLst>
-            <pc:docMk/>
-            <pc:sldMk cId="833342778" sldId="261"/>
-            <ac:grpSpMk id="28" creationId="{14763DA8-CE3A-4B30-B2F5-0D128777F742}"/>
-          </ac:grpSpMkLst>
-        </pc:grpChg>
-        <pc:grpChg chg="add del">
-          <ac:chgData name="Roy Liu" userId="755465ea-a681-4840-afaf-3106d4ded39d" providerId="ADAL" clId="{26A4DA2E-3B26-4A19-981B-FA4B6FD33F58}" dt="2023-09-26T10:14:22.504" v="662" actId="26606"/>
-          <ac:grpSpMkLst>
-            <pc:docMk/>
-            <pc:sldMk cId="833342778" sldId="261"/>
-            <ac:grpSpMk id="33" creationId="{3489A2D2-B3AA-488C-B20E-15DBB97548C6}"/>
-          </ac:grpSpMkLst>
-        </pc:grpChg>
-        <pc:grpChg chg="add del">
-          <ac:chgData name="Roy Liu" userId="755465ea-a681-4840-afaf-3106d4ded39d" providerId="ADAL" clId="{26A4DA2E-3B26-4A19-981B-FA4B6FD33F58}" dt="2023-09-26T10:14:39.973" v="664" actId="26606"/>
-          <ac:grpSpMkLst>
-            <pc:docMk/>
-            <pc:sldMk cId="833342778" sldId="261"/>
-            <ac:grpSpMk id="38" creationId="{8D6FD602-3113-4FC4-982F-15099614D2A6}"/>
-          </ac:grpSpMkLst>
-        </pc:grpChg>
-        <pc:grpChg chg="add del">
-          <ac:chgData name="Roy Liu" userId="755465ea-a681-4840-afaf-3106d4ded39d" providerId="ADAL" clId="{26A4DA2E-3B26-4A19-981B-FA4B6FD33F58}" dt="2023-09-26T10:14:41.077" v="666" actId="26606"/>
-          <ac:grpSpMkLst>
-            <pc:docMk/>
-            <pc:sldMk cId="833342778" sldId="261"/>
-            <ac:grpSpMk id="43" creationId="{545001F7-3F8F-4035-8348-1B9798C77D29}"/>
-          </ac:grpSpMkLst>
-        </pc:grpChg>
-        <pc:grpChg chg="add del">
-          <ac:chgData name="Roy Liu" userId="755465ea-a681-4840-afaf-3106d4ded39d" providerId="ADAL" clId="{26A4DA2E-3B26-4A19-981B-FA4B6FD33F58}" dt="2023-09-26T10:15:50.081" v="668" actId="26606"/>
-          <ac:grpSpMkLst>
-            <pc:docMk/>
-            <pc:sldMk cId="833342778" sldId="261"/>
-            <ac:grpSpMk id="50" creationId="{8B308828-4749-4D6D-9CEA-433D2BD27EC0}"/>
-          </ac:grpSpMkLst>
-        </pc:grpChg>
-        <pc:grpChg chg="add del">
-          <ac:chgData name="Roy Liu" userId="755465ea-a681-4840-afaf-3106d4ded39d" providerId="ADAL" clId="{26A4DA2E-3B26-4A19-981B-FA4B6FD33F58}" dt="2023-09-26T11:21:44.938" v="747" actId="26606"/>
-          <ac:grpSpMkLst>
-            <pc:docMk/>
-            <pc:sldMk cId="833342778" sldId="261"/>
-            <ac:grpSpMk id="56" creationId="{14763DA8-CE3A-4B30-B2F5-0D128777F742}"/>
-          </ac:grpSpMkLst>
-        </pc:grpChg>
-        <pc:grpChg chg="add del">
-          <ac:chgData name="Roy Liu" userId="755465ea-a681-4840-afaf-3106d4ded39d" providerId="ADAL" clId="{26A4DA2E-3B26-4A19-981B-FA4B6FD33F58}" dt="2023-09-26T11:21:41.812" v="742" actId="26606"/>
-          <ac:grpSpMkLst>
-            <pc:docMk/>
-            <pc:sldMk cId="833342778" sldId="261"/>
-            <ac:grpSpMk id="66" creationId="{E54EDBA2-E203-497D-AB28-73A06B2DFDEE}"/>
-          </ac:grpSpMkLst>
-        </pc:grpChg>
-        <pc:grpChg chg="add del">
-          <ac:chgData name="Roy Liu" userId="755465ea-a681-4840-afaf-3106d4ded39d" providerId="ADAL" clId="{26A4DA2E-3B26-4A19-981B-FA4B6FD33F58}" dt="2023-09-26T11:21:44.923" v="746" actId="26606"/>
-          <ac:grpSpMkLst>
-            <pc:docMk/>
-            <pc:sldMk cId="833342778" sldId="261"/>
-            <ac:grpSpMk id="75" creationId="{EB40C5D5-6C8D-4E52-A87F-94BF781A0814}"/>
-          </ac:grpSpMkLst>
-        </pc:grpChg>
-        <pc:grpChg chg="add del">
-          <ac:chgData name="Roy Liu" userId="755465ea-a681-4840-afaf-3106d4ded39d" providerId="ADAL" clId="{26A4DA2E-3B26-4A19-981B-FA4B6FD33F58}" dt="2023-09-26T11:36:42.340" v="831" actId="26606"/>
-          <ac:grpSpMkLst>
-            <pc:docMk/>
-            <pc:sldMk cId="833342778" sldId="261"/>
-            <ac:grpSpMk id="79" creationId="{DDC08824-D5AF-47B4-A084-327F6A050FE5}"/>
-          </ac:grpSpMkLst>
-        </pc:grpChg>
-        <pc:grpChg chg="add del">
-          <ac:chgData name="Roy Liu" userId="755465ea-a681-4840-afaf-3106d4ded39d" providerId="ADAL" clId="{26A4DA2E-3B26-4A19-981B-FA4B6FD33F58}" dt="2023-09-26T11:36:54.709" v="834" actId="26606"/>
-          <ac:grpSpMkLst>
-            <pc:docMk/>
-            <pc:sldMk cId="833342778" sldId="261"/>
-            <ac:grpSpMk id="89" creationId="{A9EF8060-0D63-402B-8B09-4993D1FE8EFD}"/>
-          </ac:grpSpMkLst>
-        </pc:grpChg>
-        <pc:grpChg chg="add del">
-          <ac:chgData name="Roy Liu" userId="755465ea-a681-4840-afaf-3106d4ded39d" providerId="ADAL" clId="{26A4DA2E-3B26-4A19-981B-FA4B6FD33F58}" dt="2023-09-26T11:36:54.691" v="833" actId="26606"/>
-          <ac:grpSpMkLst>
-            <pc:docMk/>
-            <pc:sldMk cId="833342778" sldId="261"/>
-            <ac:grpSpMk id="100" creationId="{EB40C5D5-6C8D-4E52-A87F-94BF781A0814}"/>
-          </ac:grpSpMkLst>
-        </pc:grpChg>
-        <pc:grpChg chg="add">
-          <ac:chgData name="Roy Liu" userId="755465ea-a681-4840-afaf-3106d4ded39d" providerId="ADAL" clId="{26A4DA2E-3B26-4A19-981B-FA4B6FD33F58}" dt="2023-09-26T11:36:54.709" v="834" actId="26606"/>
-          <ac:grpSpMkLst>
-            <pc:docMk/>
-            <pc:sldMk cId="833342778" sldId="261"/>
-            <ac:grpSpMk id="106" creationId="{E54EDBA2-E203-497D-AB28-73A06B2DFDEE}"/>
-          </ac:grpSpMkLst>
-        </pc:grpChg>
-        <pc:picChg chg="add mod ord">
-          <ac:chgData name="Roy Liu" userId="755465ea-a681-4840-afaf-3106d4ded39d" providerId="ADAL" clId="{26A4DA2E-3B26-4A19-981B-FA4B6FD33F58}" dt="2023-09-26T11:37:16.616" v="839" actId="1076"/>
-          <ac:picMkLst>
-            <pc:docMk/>
-            <pc:sldMk cId="833342778" sldId="261"/>
-            <ac:picMk id="5" creationId="{FB218DE2-FC3D-8E76-7BFA-E86621CD02E0}"/>
-          </ac:picMkLst>
-        </pc:picChg>
-        <pc:picChg chg="add mod">
-          <ac:chgData name="Roy Liu" userId="755465ea-a681-4840-afaf-3106d4ded39d" providerId="ADAL" clId="{26A4DA2E-3B26-4A19-981B-FA4B6FD33F58}" dt="2023-09-26T11:38:54.265" v="841" actId="14826"/>
-          <ac:picMkLst>
-            <pc:docMk/>
-            <pc:sldMk cId="833342778" sldId="261"/>
-            <ac:picMk id="7" creationId="{EE3EA166-3E3C-09C5-0F51-348817C4A378}"/>
-          </ac:picMkLst>
-        </pc:picChg>
-      </pc:sldChg>
-      <pc:sldChg chg="modSp new mod">
-        <pc:chgData name="Roy Liu" userId="755465ea-a681-4840-afaf-3106d4ded39d" providerId="ADAL" clId="{26A4DA2E-3B26-4A19-981B-FA4B6FD33F58}" dt="2023-09-26T09:58:03.596" v="327" actId="20577"/>
-        <pc:sldMkLst>
-          <pc:docMk/>
-          <pc:sldMk cId="723807988" sldId="262"/>
-        </pc:sldMkLst>
-        <pc:spChg chg="mod">
-          <ac:chgData name="Roy Liu" userId="755465ea-a681-4840-afaf-3106d4ded39d" providerId="ADAL" clId="{26A4DA2E-3B26-4A19-981B-FA4B6FD33F58}" dt="2023-09-26T09:58:03.596" v="327" actId="20577"/>
-          <ac:spMkLst>
-            <pc:docMk/>
-            <pc:sldMk cId="723807988" sldId="262"/>
-            <ac:spMk id="2" creationId="{E9FCD3FF-F45B-8D90-0C9A-8B9444056B35}"/>
-          </ac:spMkLst>
-        </pc:spChg>
-      </pc:sldChg>
-      <pc:sldChg chg="new">
-        <pc:chgData name="Roy Liu" userId="755465ea-a681-4840-afaf-3106d4ded39d" providerId="ADAL" clId="{26A4DA2E-3B26-4A19-981B-FA4B6FD33F58}" dt="2023-09-26T09:58:07.628" v="328" actId="680"/>
-        <pc:sldMkLst>
-          <pc:docMk/>
-          <pc:sldMk cId="2129731390" sldId="263"/>
-        </pc:sldMkLst>
-      </pc:sldChg>
-      <pc:sldChg chg="addSp delSp modSp new mod setBg">
-        <pc:chgData name="Roy Liu" userId="755465ea-a681-4840-afaf-3106d4ded39d" providerId="ADAL" clId="{26A4DA2E-3B26-4A19-981B-FA4B6FD33F58}" dt="2023-09-27T10:06:48.402" v="1860" actId="20577"/>
-        <pc:sldMkLst>
-          <pc:docMk/>
-          <pc:sldMk cId="3854421792" sldId="264"/>
-        </pc:sldMkLst>
-        <pc:spChg chg="mod">
-          <ac:chgData name="Roy Liu" userId="755465ea-a681-4840-afaf-3106d4ded39d" providerId="ADAL" clId="{26A4DA2E-3B26-4A19-981B-FA4B6FD33F58}" dt="2023-09-27T09:56:02.713" v="1448" actId="20577"/>
-          <ac:spMkLst>
-            <pc:docMk/>
-            <pc:sldMk cId="3854421792" sldId="264"/>
-            <ac:spMk id="2" creationId="{30D33BD3-68A6-1A97-FA68-72D48555FE31}"/>
-          </ac:spMkLst>
-        </pc:spChg>
-        <pc:spChg chg="del">
-          <ac:chgData name="Roy Liu" userId="755465ea-a681-4840-afaf-3106d4ded39d" providerId="ADAL" clId="{26A4DA2E-3B26-4A19-981B-FA4B6FD33F58}" dt="2023-09-26T11:22:59.352" v="755" actId="26606"/>
-          <ac:spMkLst>
-            <pc:docMk/>
-            <pc:sldMk cId="3854421792" sldId="264"/>
-            <ac:spMk id="3" creationId="{9158AA1D-1B39-5503-1C8B-D93C5231A925}"/>
-          </ac:spMkLst>
-        </pc:spChg>
-        <pc:spChg chg="add del">
-          <ac:chgData name="Roy Liu" userId="755465ea-a681-4840-afaf-3106d4ded39d" providerId="ADAL" clId="{26A4DA2E-3B26-4A19-981B-FA4B6FD33F58}" dt="2023-09-26T11:23:20.471" v="757" actId="26606"/>
-          <ac:spMkLst>
-            <pc:docMk/>
-            <pc:sldMk cId="3854421792" sldId="264"/>
-            <ac:spMk id="10" creationId="{0BABF38A-8A0D-492E-BD20-6CF4D46B50BD}"/>
-          </ac:spMkLst>
-        </pc:spChg>
-        <pc:spChg chg="add del">
-          <ac:chgData name="Roy Liu" userId="755465ea-a681-4840-afaf-3106d4ded39d" providerId="ADAL" clId="{26A4DA2E-3B26-4A19-981B-FA4B6FD33F58}" dt="2023-09-26T11:23:20.471" v="757" actId="26606"/>
-          <ac:spMkLst>
-            <pc:docMk/>
-            <pc:sldMk cId="3854421792" sldId="264"/>
-            <ac:spMk id="14" creationId="{F1174801-1395-44C5-9B00-CCAC45C056E7}"/>
-          </ac:spMkLst>
-        </pc:spChg>
-        <pc:spChg chg="add del mod">
-          <ac:chgData name="Roy Liu" userId="755465ea-a681-4840-afaf-3106d4ded39d" providerId="ADAL" clId="{26A4DA2E-3B26-4A19-981B-FA4B6FD33F58}" dt="2023-09-26T11:33:38.416" v="807" actId="767"/>
-          <ac:spMkLst>
-            <pc:docMk/>
-            <pc:sldMk cId="3854421792" sldId="264"/>
-            <ac:spMk id="15" creationId="{612FC7FC-603D-33F5-0070-7BB01D7EC5D4}"/>
-          </ac:spMkLst>
-        </pc:spChg>
-        <pc:spChg chg="add del">
-          <ac:chgData name="Roy Liu" userId="755465ea-a681-4840-afaf-3106d4ded39d" providerId="ADAL" clId="{26A4DA2E-3B26-4A19-981B-FA4B6FD33F58}" dt="2023-09-26T11:23:20.471" v="757" actId="26606"/>
-          <ac:spMkLst>
-            <pc:docMk/>
-            <pc:sldMk cId="3854421792" sldId="264"/>
-            <ac:spMk id="16" creationId="{8BADB362-9771-4A3C-B9E5-6777F34C5041}"/>
-          </ac:spMkLst>
-        </pc:spChg>
-        <pc:spChg chg="add del mod">
-          <ac:chgData name="Roy Liu" userId="755465ea-a681-4840-afaf-3106d4ded39d" providerId="ADAL" clId="{26A4DA2E-3B26-4A19-981B-FA4B6FD33F58}" dt="2023-09-26T11:33:37.952" v="804" actId="767"/>
-          <ac:spMkLst>
-            <pc:docMk/>
-            <pc:sldMk cId="3854421792" sldId="264"/>
-            <ac:spMk id="17" creationId="{93479DC7-4C8A-F89F-3E4B-5881C91FD939}"/>
-          </ac:spMkLst>
-        </pc:spChg>
-        <pc:spChg chg="add del mod">
-          <ac:chgData name="Roy Liu" userId="755465ea-a681-4840-afaf-3106d4ded39d" providerId="ADAL" clId="{26A4DA2E-3B26-4A19-981B-FA4B6FD33F58}" dt="2023-09-27T10:06:48.402" v="1860" actId="20577"/>
-          <ac:spMkLst>
-            <pc:docMk/>
-            <pc:sldMk cId="3854421792" sldId="264"/>
-            <ac:spMk id="24" creationId="{FB105505-04CA-DC86-994C-17415E16A816}"/>
-          </ac:spMkLst>
-        </pc:spChg>
-        <pc:spChg chg="add">
-          <ac:chgData name="Roy Liu" userId="755465ea-a681-4840-afaf-3106d4ded39d" providerId="ADAL" clId="{26A4DA2E-3B26-4A19-981B-FA4B6FD33F58}" dt="2023-09-26T11:23:20.471" v="757" actId="26606"/>
-          <ac:spMkLst>
-            <pc:docMk/>
-            <pc:sldMk cId="3854421792" sldId="264"/>
-            <ac:spMk id="27" creationId="{8651CFA9-6065-4243-AC48-858E359780B1}"/>
-          </ac:spMkLst>
-        </pc:spChg>
-        <pc:spChg chg="add">
-          <ac:chgData name="Roy Liu" userId="755465ea-a681-4840-afaf-3106d4ded39d" providerId="ADAL" clId="{26A4DA2E-3B26-4A19-981B-FA4B6FD33F58}" dt="2023-09-26T11:23:20.471" v="757" actId="26606"/>
-          <ac:spMkLst>
-            <pc:docMk/>
-            <pc:sldMk cId="3854421792" sldId="264"/>
-            <ac:spMk id="29" creationId="{FBC8BBE5-981E-4B0B-9654-32B5668BFF31}"/>
-          </ac:spMkLst>
-        </pc:spChg>
-        <pc:grpChg chg="add del">
-          <ac:chgData name="Roy Liu" userId="755465ea-a681-4840-afaf-3106d4ded39d" providerId="ADAL" clId="{26A4DA2E-3B26-4A19-981B-FA4B6FD33F58}" dt="2023-09-26T11:23:20.471" v="757" actId="26606"/>
-          <ac:grpSpMkLst>
-            <pc:docMk/>
-            <pc:sldMk cId="3854421792" sldId="264"/>
-            <ac:grpSpMk id="18" creationId="{6C5D976F-50BF-4FEC-B797-AACEB2C35144}"/>
-          </ac:grpSpMkLst>
-        </pc:grpChg>
-        <pc:grpChg chg="add">
-          <ac:chgData name="Roy Liu" userId="755465ea-a681-4840-afaf-3106d4ded39d" providerId="ADAL" clId="{26A4DA2E-3B26-4A19-981B-FA4B6FD33F58}" dt="2023-09-26T11:23:20.471" v="757" actId="26606"/>
-          <ac:grpSpMkLst>
-            <pc:docMk/>
-            <pc:sldMk cId="3854421792" sldId="264"/>
-            <ac:grpSpMk id="31" creationId="{E54EDBA2-E203-497D-AB28-73A06B2DFDEE}"/>
-          </ac:grpSpMkLst>
-        </pc:grpChg>
-        <pc:picChg chg="add mod ord">
-          <ac:chgData name="Roy Liu" userId="755465ea-a681-4840-afaf-3106d4ded39d" providerId="ADAL" clId="{26A4DA2E-3B26-4A19-981B-FA4B6FD33F58}" dt="2023-09-26T11:29:05.643" v="773" actId="14100"/>
-          <ac:picMkLst>
-            <pc:docMk/>
-            <pc:sldMk cId="3854421792" sldId="264"/>
-            <ac:picMk id="5" creationId="{96936FE3-5CFA-7757-F1DE-FF4B00A109A8}"/>
-          </ac:picMkLst>
-        </pc:picChg>
-        <pc:picChg chg="add mod">
-          <ac:chgData name="Roy Liu" userId="755465ea-a681-4840-afaf-3106d4ded39d" providerId="ADAL" clId="{26A4DA2E-3B26-4A19-981B-FA4B6FD33F58}" dt="2023-09-26T11:28:28.063" v="770" actId="14826"/>
-          <ac:picMkLst>
-            <pc:docMk/>
-            <pc:sldMk cId="3854421792" sldId="264"/>
-            <ac:picMk id="7" creationId="{0FC2301A-6357-11A5-E913-C23B70C642F4}"/>
-          </ac:picMkLst>
-        </pc:picChg>
-        <pc:picChg chg="add del mod">
-          <ac:chgData name="Roy Liu" userId="755465ea-a681-4840-afaf-3106d4ded39d" providerId="ADAL" clId="{26A4DA2E-3B26-4A19-981B-FA4B6FD33F58}" dt="2023-09-26T11:32:24.825" v="783"/>
-          <ac:picMkLst>
-            <pc:docMk/>
-            <pc:sldMk cId="3854421792" sldId="264"/>
-            <ac:picMk id="9" creationId="{D50240B4-13E5-3BCA-F31F-13DA3D67DC41}"/>
-          </ac:picMkLst>
-        </pc:picChg>
-        <pc:picChg chg="add del">
-          <ac:chgData name="Roy Liu" userId="755465ea-a681-4840-afaf-3106d4ded39d" providerId="ADAL" clId="{26A4DA2E-3B26-4A19-981B-FA4B6FD33F58}" dt="2023-09-26T11:23:20.471" v="757" actId="26606"/>
-          <ac:picMkLst>
-            <pc:docMk/>
-            <pc:sldMk cId="3854421792" sldId="264"/>
-            <ac:picMk id="12" creationId="{BC526B7A-4801-4FD1-95C8-03AF22629E87}"/>
-          </ac:picMkLst>
-        </pc:picChg>
-        <pc:picChg chg="add del mod">
-          <ac:chgData name="Roy Liu" userId="755465ea-a681-4840-afaf-3106d4ded39d" providerId="ADAL" clId="{26A4DA2E-3B26-4A19-981B-FA4B6FD33F58}" dt="2023-09-26T11:33:39.635" v="809"/>
-          <ac:picMkLst>
-            <pc:docMk/>
-            <pc:sldMk cId="3854421792" sldId="264"/>
-            <ac:picMk id="13" creationId="{491E01A8-1008-15E9-3262-5AC90B860C51}"/>
-          </ac:picMkLst>
-        </pc:picChg>
-        <pc:picChg chg="add mod">
-          <ac:chgData name="Roy Liu" userId="755465ea-a681-4840-afaf-3106d4ded39d" providerId="ADAL" clId="{26A4DA2E-3B26-4A19-981B-FA4B6FD33F58}" dt="2023-09-26T11:33:54.593" v="821" actId="1076"/>
-          <ac:picMkLst>
-            <pc:docMk/>
-            <pc:sldMk cId="3854421792" sldId="264"/>
-            <ac:picMk id="22" creationId="{CF92AAA3-742D-F5AA-75F3-56814F81F59A}"/>
-          </ac:picMkLst>
-        </pc:picChg>
-      </pc:sldChg>
-      <pc:sldChg chg="modSp new mod">
-        <pc:chgData name="Roy Liu" userId="755465ea-a681-4840-afaf-3106d4ded39d" providerId="ADAL" clId="{26A4DA2E-3B26-4A19-981B-FA4B6FD33F58}" dt="2023-09-26T10:47:06.837" v="674" actId="20577"/>
-        <pc:sldMkLst>
-          <pc:docMk/>
-          <pc:sldMk cId="435654270" sldId="265"/>
-        </pc:sldMkLst>
-        <pc:spChg chg="mod">
-          <ac:chgData name="Roy Liu" userId="755465ea-a681-4840-afaf-3106d4ded39d" providerId="ADAL" clId="{26A4DA2E-3B26-4A19-981B-FA4B6FD33F58}" dt="2023-09-26T09:59:01.724" v="465" actId="20577"/>
-          <ac:spMkLst>
-            <pc:docMk/>
-            <pc:sldMk cId="435654270" sldId="265"/>
-            <ac:spMk id="2" creationId="{C467D37A-286A-5967-A2D3-A3CB3B01E5C0}"/>
-          </ac:spMkLst>
-        </pc:spChg>
-        <pc:spChg chg="mod">
-          <ac:chgData name="Roy Liu" userId="755465ea-a681-4840-afaf-3106d4ded39d" providerId="ADAL" clId="{26A4DA2E-3B26-4A19-981B-FA4B6FD33F58}" dt="2023-09-26T10:47:06.837" v="674" actId="20577"/>
-          <ac:spMkLst>
-            <pc:docMk/>
-            <pc:sldMk cId="435654270" sldId="265"/>
-            <ac:spMk id="3" creationId="{7F2E4967-6631-E036-3C10-AB476F921C5F}"/>
-          </ac:spMkLst>
-        </pc:spChg>
-      </pc:sldChg>
-      <pc:sldChg chg="modSp mod">
-        <pc:chgData name="Roy Liu" userId="755465ea-a681-4840-afaf-3106d4ded39d" providerId="ADAL" clId="{26A4DA2E-3B26-4A19-981B-FA4B6FD33F58}" dt="2023-09-26T11:30:56.916" v="775" actId="313"/>
-        <pc:sldMkLst>
-          <pc:docMk/>
-          <pc:sldMk cId="3257955536" sldId="268"/>
-        </pc:sldMkLst>
-        <pc:spChg chg="mod">
-          <ac:chgData name="Roy Liu" userId="755465ea-a681-4840-afaf-3106d4ded39d" providerId="ADAL" clId="{26A4DA2E-3B26-4A19-981B-FA4B6FD33F58}" dt="2023-09-26T11:30:56.916" v="775" actId="313"/>
-          <ac:spMkLst>
-            <pc:docMk/>
-            <pc:sldMk cId="3257955536" sldId="268"/>
-            <ac:spMk id="3" creationId="{40D137FA-18A4-4E72-3B1A-E45AE21D012B}"/>
-          </ac:spMkLst>
-        </pc:spChg>
-      </pc:sldChg>
-      <pc:sldChg chg="modSp new mod">
-        <pc:chgData name="Roy Liu" userId="755465ea-a681-4840-afaf-3106d4ded39d" providerId="ADAL" clId="{26A4DA2E-3B26-4A19-981B-FA4B6FD33F58}" dt="2023-09-27T09:56:54.619" v="1491" actId="20577"/>
-        <pc:sldMkLst>
-          <pc:docMk/>
-          <pc:sldMk cId="3751505815" sldId="269"/>
-        </pc:sldMkLst>
-        <pc:spChg chg="mod">
-          <ac:chgData name="Roy Liu" userId="755465ea-a681-4840-afaf-3106d4ded39d" providerId="ADAL" clId="{26A4DA2E-3B26-4A19-981B-FA4B6FD33F58}" dt="2023-09-27T09:56:54.619" v="1491" actId="20577"/>
-          <ac:spMkLst>
-            <pc:docMk/>
-            <pc:sldMk cId="3751505815" sldId="269"/>
-            <ac:spMk id="2" creationId="{88013891-86EF-454E-0A39-BC7185B11C4F}"/>
-          </ac:spMkLst>
-        </pc:spChg>
-      </pc:sldChg>
-      <pc:sldMasterChg chg="add del addSldLayout delSldLayout">
-        <pc:chgData name="Roy Liu" userId="755465ea-a681-4840-afaf-3106d4ded39d" providerId="ADAL" clId="{26A4DA2E-3B26-4A19-981B-FA4B6FD33F58}" dt="2023-09-20T11:39:52.354" v="148" actId="26606"/>
-        <pc:sldMasterMkLst>
-          <pc:docMk/>
-          <pc:sldMasterMk cId="789219319" sldId="2147483660"/>
-        </pc:sldMasterMkLst>
-        <pc:sldLayoutChg chg="add del">
-          <pc:chgData name="Roy Liu" userId="755465ea-a681-4840-afaf-3106d4ded39d" providerId="ADAL" clId="{26A4DA2E-3B26-4A19-981B-FA4B6FD33F58}" dt="2023-09-20T11:39:52.354" v="148" actId="26606"/>
-          <pc:sldLayoutMkLst>
-            <pc:docMk/>
-            <pc:sldMasterMk cId="789219319" sldId="2147483660"/>
-            <pc:sldLayoutMk cId="1809636922" sldId="2147483661"/>
-          </pc:sldLayoutMkLst>
-        </pc:sldLayoutChg>
-        <pc:sldLayoutChg chg="add del">
-          <pc:chgData name="Roy Liu" userId="755465ea-a681-4840-afaf-3106d4ded39d" providerId="ADAL" clId="{26A4DA2E-3B26-4A19-981B-FA4B6FD33F58}" dt="2023-09-20T11:39:52.354" v="148" actId="26606"/>
-          <pc:sldLayoutMkLst>
-            <pc:docMk/>
-            <pc:sldMasterMk cId="789219319" sldId="2147483660"/>
-            <pc:sldLayoutMk cId="2101453903" sldId="2147483662"/>
-          </pc:sldLayoutMkLst>
-        </pc:sldLayoutChg>
-        <pc:sldLayoutChg chg="add del">
-          <pc:chgData name="Roy Liu" userId="755465ea-a681-4840-afaf-3106d4ded39d" providerId="ADAL" clId="{26A4DA2E-3B26-4A19-981B-FA4B6FD33F58}" dt="2023-09-20T11:39:52.354" v="148" actId="26606"/>
-          <pc:sldLayoutMkLst>
-            <pc:docMk/>
-            <pc:sldMasterMk cId="789219319" sldId="2147483660"/>
-            <pc:sldLayoutMk cId="1251068635" sldId="2147483663"/>
-          </pc:sldLayoutMkLst>
-        </pc:sldLayoutChg>
-        <pc:sldLayoutChg chg="add del">
-          <pc:chgData name="Roy Liu" userId="755465ea-a681-4840-afaf-3106d4ded39d" providerId="ADAL" clId="{26A4DA2E-3B26-4A19-981B-FA4B6FD33F58}" dt="2023-09-20T11:39:52.354" v="148" actId="26606"/>
-          <pc:sldLayoutMkLst>
-            <pc:docMk/>
-            <pc:sldMasterMk cId="789219319" sldId="2147483660"/>
-            <pc:sldLayoutMk cId="2552483535" sldId="2147483664"/>
-          </pc:sldLayoutMkLst>
-        </pc:sldLayoutChg>
-        <pc:sldLayoutChg chg="add del">
-          <pc:chgData name="Roy Liu" userId="755465ea-a681-4840-afaf-3106d4ded39d" providerId="ADAL" clId="{26A4DA2E-3B26-4A19-981B-FA4B6FD33F58}" dt="2023-09-20T11:39:52.354" v="148" actId="26606"/>
-          <pc:sldLayoutMkLst>
-            <pc:docMk/>
-            <pc:sldMasterMk cId="789219319" sldId="2147483660"/>
-            <pc:sldLayoutMk cId="2033678604" sldId="2147483665"/>
-          </pc:sldLayoutMkLst>
-        </pc:sldLayoutChg>
-        <pc:sldLayoutChg chg="add del">
-          <pc:chgData name="Roy Liu" userId="755465ea-a681-4840-afaf-3106d4ded39d" providerId="ADAL" clId="{26A4DA2E-3B26-4A19-981B-FA4B6FD33F58}" dt="2023-09-20T11:39:52.354" v="148" actId="26606"/>
-          <pc:sldLayoutMkLst>
-            <pc:docMk/>
-            <pc:sldMasterMk cId="789219319" sldId="2147483660"/>
-            <pc:sldLayoutMk cId="1859807123" sldId="2147483666"/>
-          </pc:sldLayoutMkLst>
-        </pc:sldLayoutChg>
-        <pc:sldLayoutChg chg="add del">
-          <pc:chgData name="Roy Liu" userId="755465ea-a681-4840-afaf-3106d4ded39d" providerId="ADAL" clId="{26A4DA2E-3B26-4A19-981B-FA4B6FD33F58}" dt="2023-09-20T11:39:52.354" v="148" actId="26606"/>
-          <pc:sldLayoutMkLst>
-            <pc:docMk/>
-            <pc:sldMasterMk cId="789219319" sldId="2147483660"/>
-            <pc:sldLayoutMk cId="883036279" sldId="2147483667"/>
-          </pc:sldLayoutMkLst>
-        </pc:sldLayoutChg>
-        <pc:sldLayoutChg chg="add del">
-          <pc:chgData name="Roy Liu" userId="755465ea-a681-4840-afaf-3106d4ded39d" providerId="ADAL" clId="{26A4DA2E-3B26-4A19-981B-FA4B6FD33F58}" dt="2023-09-20T11:39:52.354" v="148" actId="26606"/>
-          <pc:sldLayoutMkLst>
-            <pc:docMk/>
-            <pc:sldMasterMk cId="789219319" sldId="2147483660"/>
-            <pc:sldLayoutMk cId="728350495" sldId="2147483668"/>
-          </pc:sldLayoutMkLst>
-        </pc:sldLayoutChg>
-        <pc:sldLayoutChg chg="add del">
-          <pc:chgData name="Roy Liu" userId="755465ea-a681-4840-afaf-3106d4ded39d" providerId="ADAL" clId="{26A4DA2E-3B26-4A19-981B-FA4B6FD33F58}" dt="2023-09-20T11:39:52.354" v="148" actId="26606"/>
-          <pc:sldLayoutMkLst>
-            <pc:docMk/>
-            <pc:sldMasterMk cId="789219319" sldId="2147483660"/>
-            <pc:sldLayoutMk cId="2132223704" sldId="2147483669"/>
-          </pc:sldLayoutMkLst>
-        </pc:sldLayoutChg>
-        <pc:sldLayoutChg chg="add del">
-          <pc:chgData name="Roy Liu" userId="755465ea-a681-4840-afaf-3106d4ded39d" providerId="ADAL" clId="{26A4DA2E-3B26-4A19-981B-FA4B6FD33F58}" dt="2023-09-20T11:39:52.354" v="148" actId="26606"/>
-          <pc:sldLayoutMkLst>
-            <pc:docMk/>
-            <pc:sldMasterMk cId="789219319" sldId="2147483660"/>
-            <pc:sldLayoutMk cId="173961049" sldId="2147483670"/>
-          </pc:sldLayoutMkLst>
-        </pc:sldLayoutChg>
-        <pc:sldLayoutChg chg="add del">
-          <pc:chgData name="Roy Liu" userId="755465ea-a681-4840-afaf-3106d4ded39d" providerId="ADAL" clId="{26A4DA2E-3B26-4A19-981B-FA4B6FD33F58}" dt="2023-09-20T11:39:52.354" v="148" actId="26606"/>
-          <pc:sldLayoutMkLst>
-            <pc:docMk/>
-            <pc:sldMasterMk cId="789219319" sldId="2147483660"/>
-            <pc:sldLayoutMk cId="2950409454" sldId="2147483671"/>
-          </pc:sldLayoutMkLst>
-        </pc:sldLayoutChg>
-      </pc:sldMasterChg>
-      <pc:sldMasterChg chg="add del replId addSldLayout delSldLayout">
-        <pc:chgData name="Roy Liu" userId="755465ea-a681-4840-afaf-3106d4ded39d" providerId="ADAL" clId="{26A4DA2E-3B26-4A19-981B-FA4B6FD33F58}" dt="2023-09-20T11:39:10.769" v="139" actId="26606"/>
-        <pc:sldMasterMkLst>
-          <pc:docMk/>
-          <pc:sldMasterMk cId="4127245905" sldId="2147483672"/>
-        </pc:sldMasterMkLst>
-        <pc:sldLayoutChg chg="add del">
-          <pc:chgData name="Roy Liu" userId="755465ea-a681-4840-afaf-3106d4ded39d" providerId="ADAL" clId="{26A4DA2E-3B26-4A19-981B-FA4B6FD33F58}" dt="2023-09-20T11:39:10.769" v="139" actId="26606"/>
-          <pc:sldLayoutMkLst>
-            <pc:docMk/>
-            <pc:sldMasterMk cId="4127245905" sldId="2147483672"/>
-            <pc:sldLayoutMk cId="1429118868" sldId="2147483673"/>
-          </pc:sldLayoutMkLst>
-        </pc:sldLayoutChg>
-        <pc:sldLayoutChg chg="add del replId">
-          <pc:chgData name="Roy Liu" userId="755465ea-a681-4840-afaf-3106d4ded39d" providerId="ADAL" clId="{26A4DA2E-3B26-4A19-981B-FA4B6FD33F58}" dt="2023-09-20T11:39:10.769" v="139" actId="26606"/>
-          <pc:sldLayoutMkLst>
-            <pc:docMk/>
-            <pc:sldMasterMk cId="4127245905" sldId="2147483672"/>
-            <pc:sldLayoutMk cId="1612413609" sldId="2147483674"/>
-          </pc:sldLayoutMkLst>
-        </pc:sldLayoutChg>
-        <pc:sldLayoutChg chg="add del replId">
-          <pc:chgData name="Roy Liu" userId="755465ea-a681-4840-afaf-3106d4ded39d" providerId="ADAL" clId="{26A4DA2E-3B26-4A19-981B-FA4B6FD33F58}" dt="2023-09-20T11:39:10.769" v="139" actId="26606"/>
-          <pc:sldLayoutMkLst>
-            <pc:docMk/>
-            <pc:sldMasterMk cId="4127245905" sldId="2147483672"/>
-            <pc:sldLayoutMk cId="838334733" sldId="2147483675"/>
-          </pc:sldLayoutMkLst>
-        </pc:sldLayoutChg>
-        <pc:sldLayoutChg chg="add del replId">
-          <pc:chgData name="Roy Liu" userId="755465ea-a681-4840-afaf-3106d4ded39d" providerId="ADAL" clId="{26A4DA2E-3B26-4A19-981B-FA4B6FD33F58}" dt="2023-09-20T11:39:10.769" v="139" actId="26606"/>
-          <pc:sldLayoutMkLst>
-            <pc:docMk/>
-            <pc:sldMasterMk cId="4127245905" sldId="2147483672"/>
-            <pc:sldLayoutMk cId="3846711166" sldId="2147483676"/>
-          </pc:sldLayoutMkLst>
-        </pc:sldLayoutChg>
-        <pc:sldLayoutChg chg="add del replId">
-          <pc:chgData name="Roy Liu" userId="755465ea-a681-4840-afaf-3106d4ded39d" providerId="ADAL" clId="{26A4DA2E-3B26-4A19-981B-FA4B6FD33F58}" dt="2023-09-20T11:39:10.769" v="139" actId="26606"/>
-          <pc:sldLayoutMkLst>
-            <pc:docMk/>
-            <pc:sldMasterMk cId="4127245905" sldId="2147483672"/>
-            <pc:sldLayoutMk cId="2652795275" sldId="2147483677"/>
-          </pc:sldLayoutMkLst>
-        </pc:sldLayoutChg>
-        <pc:sldLayoutChg chg="add del replId">
-          <pc:chgData name="Roy Liu" userId="755465ea-a681-4840-afaf-3106d4ded39d" providerId="ADAL" clId="{26A4DA2E-3B26-4A19-981B-FA4B6FD33F58}" dt="2023-09-20T11:39:10.769" v="139" actId="26606"/>
-          <pc:sldLayoutMkLst>
-            <pc:docMk/>
-            <pc:sldMasterMk cId="4127245905" sldId="2147483672"/>
-            <pc:sldLayoutMk cId="4201483436" sldId="2147483678"/>
-          </pc:sldLayoutMkLst>
-        </pc:sldLayoutChg>
-        <pc:sldLayoutChg chg="add del replId">
-          <pc:chgData name="Roy Liu" userId="755465ea-a681-4840-afaf-3106d4ded39d" providerId="ADAL" clId="{26A4DA2E-3B26-4A19-981B-FA4B6FD33F58}" dt="2023-09-20T11:39:10.769" v="139" actId="26606"/>
-          <pc:sldLayoutMkLst>
-            <pc:docMk/>
-            <pc:sldMasterMk cId="4127245905" sldId="2147483672"/>
-            <pc:sldLayoutMk cId="3069532564" sldId="2147483679"/>
-          </pc:sldLayoutMkLst>
-        </pc:sldLayoutChg>
-        <pc:sldLayoutChg chg="add del replId">
-          <pc:chgData name="Roy Liu" userId="755465ea-a681-4840-afaf-3106d4ded39d" providerId="ADAL" clId="{26A4DA2E-3B26-4A19-981B-FA4B6FD33F58}" dt="2023-09-20T11:39:10.769" v="139" actId="26606"/>
-          <pc:sldLayoutMkLst>
-            <pc:docMk/>
-            <pc:sldMasterMk cId="4127245905" sldId="2147483672"/>
-            <pc:sldLayoutMk cId="1984730009" sldId="2147483680"/>
-          </pc:sldLayoutMkLst>
-        </pc:sldLayoutChg>
-        <pc:sldLayoutChg chg="add del replId">
-          <pc:chgData name="Roy Liu" userId="755465ea-a681-4840-afaf-3106d4ded39d" providerId="ADAL" clId="{26A4DA2E-3B26-4A19-981B-FA4B6FD33F58}" dt="2023-09-20T11:39:10.769" v="139" actId="26606"/>
-          <pc:sldLayoutMkLst>
-            <pc:docMk/>
-            <pc:sldMasterMk cId="4127245905" sldId="2147483672"/>
-            <pc:sldLayoutMk cId="1973024183" sldId="2147483681"/>
-          </pc:sldLayoutMkLst>
-        </pc:sldLayoutChg>
-        <pc:sldLayoutChg chg="add del replId">
-          <pc:chgData name="Roy Liu" userId="755465ea-a681-4840-afaf-3106d4ded39d" providerId="ADAL" clId="{26A4DA2E-3B26-4A19-981B-FA4B6FD33F58}" dt="2023-09-20T11:39:10.769" v="139" actId="26606"/>
-          <pc:sldLayoutMkLst>
-            <pc:docMk/>
-            <pc:sldMasterMk cId="4127245905" sldId="2147483672"/>
-            <pc:sldLayoutMk cId="3356146414" sldId="2147483682"/>
-          </pc:sldLayoutMkLst>
-        </pc:sldLayoutChg>
-        <pc:sldLayoutChg chg="add del replId">
-          <pc:chgData name="Roy Liu" userId="755465ea-a681-4840-afaf-3106d4ded39d" providerId="ADAL" clId="{26A4DA2E-3B26-4A19-981B-FA4B6FD33F58}" dt="2023-09-20T11:39:10.769" v="139" actId="26606"/>
-          <pc:sldLayoutMkLst>
-            <pc:docMk/>
-            <pc:sldMasterMk cId="4127245905" sldId="2147483672"/>
-            <pc:sldLayoutMk cId="4135450878" sldId="2147483683"/>
-          </pc:sldLayoutMkLst>
-        </pc:sldLayoutChg>
-      </pc:sldMasterChg>
-      <pc:sldMasterChg chg="add del addSldLayout delSldLayout">
-        <pc:chgData name="Roy Liu" userId="755465ea-a681-4840-afaf-3106d4ded39d" providerId="ADAL" clId="{26A4DA2E-3B26-4A19-981B-FA4B6FD33F58}" dt="2023-09-20T11:39:52.354" v="148" actId="26606"/>
-        <pc:sldMasterMkLst>
-          <pc:docMk/>
-          <pc:sldMasterMk cId="3139187229" sldId="2147483698"/>
-        </pc:sldMasterMkLst>
-        <pc:sldLayoutChg chg="add del">
-          <pc:chgData name="Roy Liu" userId="755465ea-a681-4840-afaf-3106d4ded39d" providerId="ADAL" clId="{26A4DA2E-3B26-4A19-981B-FA4B6FD33F58}" dt="2023-09-20T11:39:52.354" v="148" actId="26606"/>
-          <pc:sldLayoutMkLst>
-            <pc:docMk/>
-            <pc:sldMasterMk cId="3139187229" sldId="2147483698"/>
-            <pc:sldLayoutMk cId="356345958" sldId="2147483687"/>
-          </pc:sldLayoutMkLst>
-        </pc:sldLayoutChg>
-        <pc:sldLayoutChg chg="add del">
-          <pc:chgData name="Roy Liu" userId="755465ea-a681-4840-afaf-3106d4ded39d" providerId="ADAL" clId="{26A4DA2E-3B26-4A19-981B-FA4B6FD33F58}" dt="2023-09-20T11:39:52.354" v="148" actId="26606"/>
-          <pc:sldLayoutMkLst>
-            <pc:docMk/>
-            <pc:sldMasterMk cId="3139187229" sldId="2147483698"/>
-            <pc:sldLayoutMk cId="2704023781" sldId="2147483688"/>
-          </pc:sldLayoutMkLst>
-        </pc:sldLayoutChg>
-        <pc:sldLayoutChg chg="add del">
-          <pc:chgData name="Roy Liu" userId="755465ea-a681-4840-afaf-3106d4ded39d" providerId="ADAL" clId="{26A4DA2E-3B26-4A19-981B-FA4B6FD33F58}" dt="2023-09-20T11:39:52.354" v="148" actId="26606"/>
-          <pc:sldLayoutMkLst>
-            <pc:docMk/>
-            <pc:sldMasterMk cId="3139187229" sldId="2147483698"/>
-            <pc:sldLayoutMk cId="395939718" sldId="2147483689"/>
-          </pc:sldLayoutMkLst>
-        </pc:sldLayoutChg>
-        <pc:sldLayoutChg chg="add del">
-          <pc:chgData name="Roy Liu" userId="755465ea-a681-4840-afaf-3106d4ded39d" providerId="ADAL" clId="{26A4DA2E-3B26-4A19-981B-FA4B6FD33F58}" dt="2023-09-20T11:39:52.354" v="148" actId="26606"/>
-          <pc:sldLayoutMkLst>
-            <pc:docMk/>
-            <pc:sldMasterMk cId="3139187229" sldId="2147483698"/>
-            <pc:sldLayoutMk cId="2278752544" sldId="2147483690"/>
-          </pc:sldLayoutMkLst>
-        </pc:sldLayoutChg>
-        <pc:sldLayoutChg chg="add del">
-          <pc:chgData name="Roy Liu" userId="755465ea-a681-4840-afaf-3106d4ded39d" providerId="ADAL" clId="{26A4DA2E-3B26-4A19-981B-FA4B6FD33F58}" dt="2023-09-20T11:39:52.354" v="148" actId="26606"/>
-          <pc:sldLayoutMkLst>
-            <pc:docMk/>
-            <pc:sldMasterMk cId="3139187229" sldId="2147483698"/>
-            <pc:sldLayoutMk cId="1225069123" sldId="2147483691"/>
-          </pc:sldLayoutMkLst>
-        </pc:sldLayoutChg>
-        <pc:sldLayoutChg chg="add del">
-          <pc:chgData name="Roy Liu" userId="755465ea-a681-4840-afaf-3106d4ded39d" providerId="ADAL" clId="{26A4DA2E-3B26-4A19-981B-FA4B6FD33F58}" dt="2023-09-20T11:39:52.354" v="148" actId="26606"/>
-          <pc:sldLayoutMkLst>
-            <pc:docMk/>
-            <pc:sldMasterMk cId="3139187229" sldId="2147483698"/>
-            <pc:sldLayoutMk cId="1946154289" sldId="2147483692"/>
-          </pc:sldLayoutMkLst>
-        </pc:sldLayoutChg>
-        <pc:sldLayoutChg chg="add del">
-          <pc:chgData name="Roy Liu" userId="755465ea-a681-4840-afaf-3106d4ded39d" providerId="ADAL" clId="{26A4DA2E-3B26-4A19-981B-FA4B6FD33F58}" dt="2023-09-20T11:39:52.354" v="148" actId="26606"/>
-          <pc:sldLayoutMkLst>
-            <pc:docMk/>
-            <pc:sldMasterMk cId="3139187229" sldId="2147483698"/>
-            <pc:sldLayoutMk cId="84961155" sldId="2147483693"/>
-          </pc:sldLayoutMkLst>
-        </pc:sldLayoutChg>
-        <pc:sldLayoutChg chg="add del">
-          <pc:chgData name="Roy Liu" userId="755465ea-a681-4840-afaf-3106d4ded39d" providerId="ADAL" clId="{26A4DA2E-3B26-4A19-981B-FA4B6FD33F58}" dt="2023-09-20T11:39:52.354" v="148" actId="26606"/>
-          <pc:sldLayoutMkLst>
-            <pc:docMk/>
-            <pc:sldMasterMk cId="3139187229" sldId="2147483698"/>
-            <pc:sldLayoutMk cId="2385091365" sldId="2147483694"/>
-          </pc:sldLayoutMkLst>
-        </pc:sldLayoutChg>
-        <pc:sldLayoutChg chg="add del">
-          <pc:chgData name="Roy Liu" userId="755465ea-a681-4840-afaf-3106d4ded39d" providerId="ADAL" clId="{26A4DA2E-3B26-4A19-981B-FA4B6FD33F58}" dt="2023-09-20T11:39:52.354" v="148" actId="26606"/>
-          <pc:sldLayoutMkLst>
-            <pc:docMk/>
-            <pc:sldMasterMk cId="3139187229" sldId="2147483698"/>
-            <pc:sldLayoutMk cId="1982246214" sldId="2147483695"/>
-          </pc:sldLayoutMkLst>
-        </pc:sldLayoutChg>
-        <pc:sldLayoutChg chg="add del">
-          <pc:chgData name="Roy Liu" userId="755465ea-a681-4840-afaf-3106d4ded39d" providerId="ADAL" clId="{26A4DA2E-3B26-4A19-981B-FA4B6FD33F58}" dt="2023-09-20T11:39:52.354" v="148" actId="26606"/>
-          <pc:sldLayoutMkLst>
-            <pc:docMk/>
-            <pc:sldMasterMk cId="3139187229" sldId="2147483698"/>
-            <pc:sldLayoutMk cId="2416492150" sldId="2147483696"/>
-          </pc:sldLayoutMkLst>
-        </pc:sldLayoutChg>
-        <pc:sldLayoutChg chg="add del">
-          <pc:chgData name="Roy Liu" userId="755465ea-a681-4840-afaf-3106d4ded39d" providerId="ADAL" clId="{26A4DA2E-3B26-4A19-981B-FA4B6FD33F58}" dt="2023-09-20T11:39:52.354" v="148" actId="26606"/>
-          <pc:sldLayoutMkLst>
-            <pc:docMk/>
-            <pc:sldMasterMk cId="3139187229" sldId="2147483698"/>
-            <pc:sldLayoutMk cId="378628906" sldId="2147483697"/>
-          </pc:sldLayoutMkLst>
-        </pc:sldLayoutChg>
-      </pc:sldMasterChg>
-      <pc:sldMasterChg chg="add del addSldLayout delSldLayout">
-        <pc:chgData name="Roy Liu" userId="755465ea-a681-4840-afaf-3106d4ded39d" providerId="ADAL" clId="{26A4DA2E-3B26-4A19-981B-FA4B6FD33F58}" dt="2023-09-20T11:39:49.982" v="145" actId="26606"/>
-        <pc:sldMasterMkLst>
-          <pc:docMk/>
-          <pc:sldMasterMk cId="4137531801" sldId="2147483750"/>
-        </pc:sldMasterMkLst>
-        <pc:sldLayoutChg chg="add del">
-          <pc:chgData name="Roy Liu" userId="755465ea-a681-4840-afaf-3106d4ded39d" providerId="ADAL" clId="{26A4DA2E-3B26-4A19-981B-FA4B6FD33F58}" dt="2023-09-20T11:39:49.982" v="145" actId="26606"/>
-          <pc:sldLayoutMkLst>
-            <pc:docMk/>
-            <pc:sldMasterMk cId="4137531801" sldId="2147483750"/>
-            <pc:sldLayoutMk cId="132888358" sldId="2147483739"/>
-          </pc:sldLayoutMkLst>
-        </pc:sldLayoutChg>
-        <pc:sldLayoutChg chg="add del">
-          <pc:chgData name="Roy Liu" userId="755465ea-a681-4840-afaf-3106d4ded39d" providerId="ADAL" clId="{26A4DA2E-3B26-4A19-981B-FA4B6FD33F58}" dt="2023-09-20T11:39:49.982" v="145" actId="26606"/>
-          <pc:sldLayoutMkLst>
-            <pc:docMk/>
-            <pc:sldMasterMk cId="4137531801" sldId="2147483750"/>
-            <pc:sldLayoutMk cId="3453804309" sldId="2147483740"/>
-          </pc:sldLayoutMkLst>
-        </pc:sldLayoutChg>
-        <pc:sldLayoutChg chg="add del">
-          <pc:chgData name="Roy Liu" userId="755465ea-a681-4840-afaf-3106d4ded39d" providerId="ADAL" clId="{26A4DA2E-3B26-4A19-981B-FA4B6FD33F58}" dt="2023-09-20T11:39:49.982" v="145" actId="26606"/>
-          <pc:sldLayoutMkLst>
-            <pc:docMk/>
-            <pc:sldMasterMk cId="4137531801" sldId="2147483750"/>
-            <pc:sldLayoutMk cId="76274929" sldId="2147483741"/>
-          </pc:sldLayoutMkLst>
-        </pc:sldLayoutChg>
-        <pc:sldLayoutChg chg="add del">
-          <pc:chgData name="Roy Liu" userId="755465ea-a681-4840-afaf-3106d4ded39d" providerId="ADAL" clId="{26A4DA2E-3B26-4A19-981B-FA4B6FD33F58}" dt="2023-09-20T11:39:49.982" v="145" actId="26606"/>
-          <pc:sldLayoutMkLst>
-            <pc:docMk/>
-            <pc:sldMasterMk cId="4137531801" sldId="2147483750"/>
-            <pc:sldLayoutMk cId="3044339433" sldId="2147483742"/>
-          </pc:sldLayoutMkLst>
-        </pc:sldLayoutChg>
-        <pc:sldLayoutChg chg="add del">
-          <pc:chgData name="Roy Liu" userId="755465ea-a681-4840-afaf-3106d4ded39d" providerId="ADAL" clId="{26A4DA2E-3B26-4A19-981B-FA4B6FD33F58}" dt="2023-09-20T11:39:49.982" v="145" actId="26606"/>
-          <pc:sldLayoutMkLst>
-            <pc:docMk/>
-            <pc:sldMasterMk cId="4137531801" sldId="2147483750"/>
-            <pc:sldLayoutMk cId="1908676235" sldId="2147483743"/>
-          </pc:sldLayoutMkLst>
-        </pc:sldLayoutChg>
-        <pc:sldLayoutChg chg="add del">
-          <pc:chgData name="Roy Liu" userId="755465ea-a681-4840-afaf-3106d4ded39d" providerId="ADAL" clId="{26A4DA2E-3B26-4A19-981B-FA4B6FD33F58}" dt="2023-09-20T11:39:49.982" v="145" actId="26606"/>
-          <pc:sldLayoutMkLst>
-            <pc:docMk/>
-            <pc:sldMasterMk cId="4137531801" sldId="2147483750"/>
-            <pc:sldLayoutMk cId="314010309" sldId="2147483744"/>
-          </pc:sldLayoutMkLst>
-        </pc:sldLayoutChg>
-        <pc:sldLayoutChg chg="add del">
-          <pc:chgData name="Roy Liu" userId="755465ea-a681-4840-afaf-3106d4ded39d" providerId="ADAL" clId="{26A4DA2E-3B26-4A19-981B-FA4B6FD33F58}" dt="2023-09-20T11:39:49.982" v="145" actId="26606"/>
-          <pc:sldLayoutMkLst>
-            <pc:docMk/>
-            <pc:sldMasterMk cId="4137531801" sldId="2147483750"/>
-            <pc:sldLayoutMk cId="4185690392" sldId="2147483745"/>
-          </pc:sldLayoutMkLst>
-        </pc:sldLayoutChg>
-        <pc:sldLayoutChg chg="add del">
-          <pc:chgData name="Roy Liu" userId="755465ea-a681-4840-afaf-3106d4ded39d" providerId="ADAL" clId="{26A4DA2E-3B26-4A19-981B-FA4B6FD33F58}" dt="2023-09-20T11:39:49.982" v="145" actId="26606"/>
-          <pc:sldLayoutMkLst>
-            <pc:docMk/>
-            <pc:sldMasterMk cId="4137531801" sldId="2147483750"/>
-            <pc:sldLayoutMk cId="280367108" sldId="2147483746"/>
-          </pc:sldLayoutMkLst>
-        </pc:sldLayoutChg>
-        <pc:sldLayoutChg chg="add del">
-          <pc:chgData name="Roy Liu" userId="755465ea-a681-4840-afaf-3106d4ded39d" providerId="ADAL" clId="{26A4DA2E-3B26-4A19-981B-FA4B6FD33F58}" dt="2023-09-20T11:39:49.982" v="145" actId="26606"/>
-          <pc:sldLayoutMkLst>
-            <pc:docMk/>
-            <pc:sldMasterMk cId="4137531801" sldId="2147483750"/>
-            <pc:sldLayoutMk cId="4260407630" sldId="2147483747"/>
-          </pc:sldLayoutMkLst>
-        </pc:sldLayoutChg>
-        <pc:sldLayoutChg chg="add del">
-          <pc:chgData name="Roy Liu" userId="755465ea-a681-4840-afaf-3106d4ded39d" providerId="ADAL" clId="{26A4DA2E-3B26-4A19-981B-FA4B6FD33F58}" dt="2023-09-20T11:39:49.982" v="145" actId="26606"/>
-          <pc:sldLayoutMkLst>
-            <pc:docMk/>
-            <pc:sldMasterMk cId="4137531801" sldId="2147483750"/>
-            <pc:sldLayoutMk cId="3749109380" sldId="2147483748"/>
-          </pc:sldLayoutMkLst>
-        </pc:sldLayoutChg>
-        <pc:sldLayoutChg chg="add del">
-          <pc:chgData name="Roy Liu" userId="755465ea-a681-4840-afaf-3106d4ded39d" providerId="ADAL" clId="{26A4DA2E-3B26-4A19-981B-FA4B6FD33F58}" dt="2023-09-20T11:39:49.982" v="145" actId="26606"/>
-          <pc:sldLayoutMkLst>
-            <pc:docMk/>
-            <pc:sldMasterMk cId="4137531801" sldId="2147483750"/>
-            <pc:sldLayoutMk cId="3923863840" sldId="2147483749"/>
-          </pc:sldLayoutMkLst>
-        </pc:sldLayoutChg>
-      </pc:sldMasterChg>
-      <pc:sldMasterChg chg="add del addSldLayout delSldLayout">
-        <pc:chgData name="Roy Liu" userId="755465ea-a681-4840-afaf-3106d4ded39d" providerId="ADAL" clId="{26A4DA2E-3B26-4A19-981B-FA4B6FD33F58}" dt="2023-09-20T11:39:52.314" v="147" actId="26606"/>
-        <pc:sldMasterMkLst>
-          <pc:docMk/>
-          <pc:sldMasterMk cId="2396023725" sldId="2147483763"/>
-        </pc:sldMasterMkLst>
-        <pc:sldLayoutChg chg="add del">
-          <pc:chgData name="Roy Liu" userId="755465ea-a681-4840-afaf-3106d4ded39d" providerId="ADAL" clId="{26A4DA2E-3B26-4A19-981B-FA4B6FD33F58}" dt="2023-09-20T11:39:52.314" v="147" actId="26606"/>
-          <pc:sldLayoutMkLst>
-            <pc:docMk/>
-            <pc:sldMasterMk cId="2396023725" sldId="2147483763"/>
-            <pc:sldLayoutMk cId="958344890" sldId="2147483752"/>
-          </pc:sldLayoutMkLst>
-        </pc:sldLayoutChg>
-        <pc:sldLayoutChg chg="add del">
-          <pc:chgData name="Roy Liu" userId="755465ea-a681-4840-afaf-3106d4ded39d" providerId="ADAL" clId="{26A4DA2E-3B26-4A19-981B-FA4B6FD33F58}" dt="2023-09-20T11:39:52.314" v="147" actId="26606"/>
-          <pc:sldLayoutMkLst>
-            <pc:docMk/>
-            <pc:sldMasterMk cId="2396023725" sldId="2147483763"/>
-            <pc:sldLayoutMk cId="4270449318" sldId="2147483753"/>
-          </pc:sldLayoutMkLst>
-        </pc:sldLayoutChg>
-        <pc:sldLayoutChg chg="add del">
-          <pc:chgData name="Roy Liu" userId="755465ea-a681-4840-afaf-3106d4ded39d" providerId="ADAL" clId="{26A4DA2E-3B26-4A19-981B-FA4B6FD33F58}" dt="2023-09-20T11:39:52.314" v="147" actId="26606"/>
-          <pc:sldLayoutMkLst>
-            <pc:docMk/>
-            <pc:sldMasterMk cId="2396023725" sldId="2147483763"/>
-            <pc:sldLayoutMk cId="2399139964" sldId="2147483754"/>
-          </pc:sldLayoutMkLst>
-        </pc:sldLayoutChg>
-        <pc:sldLayoutChg chg="add del">
-          <pc:chgData name="Roy Liu" userId="755465ea-a681-4840-afaf-3106d4ded39d" providerId="ADAL" clId="{26A4DA2E-3B26-4A19-981B-FA4B6FD33F58}" dt="2023-09-20T11:39:52.314" v="147" actId="26606"/>
-          <pc:sldLayoutMkLst>
-            <pc:docMk/>
-            <pc:sldMasterMk cId="2396023725" sldId="2147483763"/>
-            <pc:sldLayoutMk cId="1693984252" sldId="2147483755"/>
-          </pc:sldLayoutMkLst>
-        </pc:sldLayoutChg>
-        <pc:sldLayoutChg chg="add del">
-          <pc:chgData name="Roy Liu" userId="755465ea-a681-4840-afaf-3106d4ded39d" providerId="ADAL" clId="{26A4DA2E-3B26-4A19-981B-FA4B6FD33F58}" dt="2023-09-20T11:39:52.314" v="147" actId="26606"/>
-          <pc:sldLayoutMkLst>
-            <pc:docMk/>
-            <pc:sldMasterMk cId="2396023725" sldId="2147483763"/>
-            <pc:sldLayoutMk cId="4543520" sldId="2147483756"/>
-          </pc:sldLayoutMkLst>
-        </pc:sldLayoutChg>
-        <pc:sldLayoutChg chg="add del">
-          <pc:chgData name="Roy Liu" userId="755465ea-a681-4840-afaf-3106d4ded39d" providerId="ADAL" clId="{26A4DA2E-3B26-4A19-981B-FA4B6FD33F58}" dt="2023-09-20T11:39:52.314" v="147" actId="26606"/>
-          <pc:sldLayoutMkLst>
-            <pc:docMk/>
-            <pc:sldMasterMk cId="2396023725" sldId="2147483763"/>
-            <pc:sldLayoutMk cId="3396188322" sldId="2147483757"/>
-          </pc:sldLayoutMkLst>
-        </pc:sldLayoutChg>
-        <pc:sldLayoutChg chg="add del">
-          <pc:chgData name="Roy Liu" userId="755465ea-a681-4840-afaf-3106d4ded39d" providerId="ADAL" clId="{26A4DA2E-3B26-4A19-981B-FA4B6FD33F58}" dt="2023-09-20T11:39:52.314" v="147" actId="26606"/>
-          <pc:sldLayoutMkLst>
-            <pc:docMk/>
-            <pc:sldMasterMk cId="2396023725" sldId="2147483763"/>
-            <pc:sldLayoutMk cId="2637560780" sldId="2147483758"/>
-          </pc:sldLayoutMkLst>
-        </pc:sldLayoutChg>
-        <pc:sldLayoutChg chg="add del">
-          <pc:chgData name="Roy Liu" userId="755465ea-a681-4840-afaf-3106d4ded39d" providerId="ADAL" clId="{26A4DA2E-3B26-4A19-981B-FA4B6FD33F58}" dt="2023-09-20T11:39:52.314" v="147" actId="26606"/>
-          <pc:sldLayoutMkLst>
-            <pc:docMk/>
-            <pc:sldMasterMk cId="2396023725" sldId="2147483763"/>
-            <pc:sldLayoutMk cId="2863320743" sldId="2147483759"/>
-          </pc:sldLayoutMkLst>
-        </pc:sldLayoutChg>
-        <pc:sldLayoutChg chg="add del">
-          <pc:chgData name="Roy Liu" userId="755465ea-a681-4840-afaf-3106d4ded39d" providerId="ADAL" clId="{26A4DA2E-3B26-4A19-981B-FA4B6FD33F58}" dt="2023-09-20T11:39:52.314" v="147" actId="26606"/>
-          <pc:sldLayoutMkLst>
-            <pc:docMk/>
-            <pc:sldMasterMk cId="2396023725" sldId="2147483763"/>
-            <pc:sldLayoutMk cId="2427292896" sldId="2147483760"/>
-          </pc:sldLayoutMkLst>
-        </pc:sldLayoutChg>
-        <pc:sldLayoutChg chg="add del">
-          <pc:chgData name="Roy Liu" userId="755465ea-a681-4840-afaf-3106d4ded39d" providerId="ADAL" clId="{26A4DA2E-3B26-4A19-981B-FA4B6FD33F58}" dt="2023-09-20T11:39:52.314" v="147" actId="26606"/>
-          <pc:sldLayoutMkLst>
-            <pc:docMk/>
-            <pc:sldMasterMk cId="2396023725" sldId="2147483763"/>
-            <pc:sldLayoutMk cId="1431543505" sldId="2147483761"/>
-          </pc:sldLayoutMkLst>
-        </pc:sldLayoutChg>
-        <pc:sldLayoutChg chg="add del">
-          <pc:chgData name="Roy Liu" userId="755465ea-a681-4840-afaf-3106d4ded39d" providerId="ADAL" clId="{26A4DA2E-3B26-4A19-981B-FA4B6FD33F58}" dt="2023-09-20T11:39:52.314" v="147" actId="26606"/>
-          <pc:sldLayoutMkLst>
-            <pc:docMk/>
-            <pc:sldMasterMk cId="2396023725" sldId="2147483763"/>
-            <pc:sldLayoutMk cId="2371968821" sldId="2147483762"/>
-          </pc:sldLayoutMkLst>
-        </pc:sldLayoutChg>
-      </pc:sldMasterChg>
-    </pc:docChg>
-  </pc:docChgLst>
-  <pc:docChgLst>
     <pc:chgData name="Viktória Szabó" userId="S::viktoria22000@student.hamk.fi::55ff7ae3-70d3-4f82-942e-28ce8109f0e2" providerId="AD" clId="Web-{6E52E18D-70C0-C0CD-E9D5-B6670395D0A7}"/>
     <pc:docChg chg="modSld">
       <pc:chgData name="Viktória Szabó" userId="S::viktoria22000@student.hamk.fi::55ff7ae3-70d3-4f82-942e-28ce8109f0e2" providerId="AD" clId="Web-{6E52E18D-70C0-C0CD-E9D5-B6670395D0A7}" dt="2023-09-27T10:30:17.758" v="30" actId="20577"/>
@@ -1732,475 +2217,26 @@
     </pc:docChg>
   </pc:docChgLst>
   <pc:docChgLst>
-    <pc:chgData name="Viktória Szabó" userId="S::viktoria22000@student.hamk.fi::55ff7ae3-70d3-4f82-942e-28ce8109f0e2" providerId="AD" clId="Web-{99DD3772-D7DA-ACAF-C41D-2125D048CA4C}"/>
-    <pc:docChg chg="addSld modSld">
-      <pc:chgData name="Viktória Szabó" userId="S::viktoria22000@student.hamk.fi::55ff7ae3-70d3-4f82-942e-28ce8109f0e2" providerId="AD" clId="Web-{99DD3772-D7DA-ACAF-C41D-2125D048CA4C}" dt="2023-09-26T10:46:12.597" v="684" actId="20577"/>
+    <pc:chgData name="Viktória Szabó" userId="S::viktoria22000@student.hamk.fi::55ff7ae3-70d3-4f82-942e-28ce8109f0e2" providerId="AD" clId="Web-{2FDE26DA-918B-C5FD-BEDC-B05DF466947D}"/>
+    <pc:docChg chg="modSld">
+      <pc:chgData name="Viktória Szabó" userId="S::viktoria22000@student.hamk.fi::55ff7ae3-70d3-4f82-942e-28ce8109f0e2" providerId="AD" clId="Web-{2FDE26DA-918B-C5FD-BEDC-B05DF466947D}" dt="2023-09-27T10:08:32.022" v="232" actId="20577"/>
       <pc:docMkLst>
         <pc:docMk/>
       </pc:docMkLst>
       <pc:sldChg chg="modSp">
-        <pc:chgData name="Viktória Szabó" userId="S::viktoria22000@student.hamk.fi::55ff7ae3-70d3-4f82-942e-28ce8109f0e2" providerId="AD" clId="Web-{99DD3772-D7DA-ACAF-C41D-2125D048CA4C}" dt="2023-09-26T10:41:09.971" v="450" actId="1076"/>
+        <pc:chgData name="Viktória Szabó" userId="S::viktoria22000@student.hamk.fi::55ff7ae3-70d3-4f82-942e-28ce8109f0e2" providerId="AD" clId="Web-{2FDE26DA-918B-C5FD-BEDC-B05DF466947D}" dt="2023-09-27T10:08:32.022" v="232" actId="20577"/>
         <pc:sldMkLst>
           <pc:docMk/>
-          <pc:sldMk cId="4059361716" sldId="256"/>
+          <pc:sldMk cId="3751505815" sldId="269"/>
         </pc:sldMkLst>
         <pc:spChg chg="mod">
-          <ac:chgData name="Viktória Szabó" userId="S::viktoria22000@student.hamk.fi::55ff7ae3-70d3-4f82-942e-28ce8109f0e2" providerId="AD" clId="Web-{99DD3772-D7DA-ACAF-C41D-2125D048CA4C}" dt="2023-09-26T10:40:47.721" v="446" actId="20577"/>
-          <ac:spMkLst>
-            <pc:docMk/>
-            <pc:sldMk cId="4059361716" sldId="256"/>
-            <ac:spMk id="2" creationId="{FB1621ED-E470-38C9-3C00-E64A512B7968}"/>
-          </ac:spMkLst>
-        </pc:spChg>
-        <pc:spChg chg="mod">
-          <ac:chgData name="Viktória Szabó" userId="S::viktoria22000@student.hamk.fi::55ff7ae3-70d3-4f82-942e-28ce8109f0e2" providerId="AD" clId="Web-{99DD3772-D7DA-ACAF-C41D-2125D048CA4C}" dt="2023-09-26T10:41:09.971" v="450" actId="1076"/>
-          <ac:spMkLst>
-            <pc:docMk/>
-            <pc:sldMk cId="4059361716" sldId="256"/>
-            <ac:spMk id="3" creationId="{A1373B98-8ED3-37B9-5EB5-687324157D0A}"/>
-          </ac:spMkLst>
-        </pc:spChg>
-      </pc:sldChg>
-      <pc:sldChg chg="addSp modSp mod setBg">
-        <pc:chgData name="Viktória Szabó" userId="S::viktoria22000@student.hamk.fi::55ff7ae3-70d3-4f82-942e-28ce8109f0e2" providerId="AD" clId="Web-{99DD3772-D7DA-ACAF-C41D-2125D048CA4C}" dt="2023-09-26T10:46:12.597" v="684" actId="20577"/>
-        <pc:sldMkLst>
-          <pc:docMk/>
-          <pc:sldMk cId="1499829321" sldId="257"/>
-        </pc:sldMkLst>
-        <pc:spChg chg="mod">
-          <ac:chgData name="Viktória Szabó" userId="S::viktoria22000@student.hamk.fi::55ff7ae3-70d3-4f82-942e-28ce8109f0e2" providerId="AD" clId="Web-{99DD3772-D7DA-ACAF-C41D-2125D048CA4C}" dt="2023-09-26T10:44:18.987" v="658"/>
-          <ac:spMkLst>
-            <pc:docMk/>
-            <pc:sldMk cId="1499829321" sldId="257"/>
-            <ac:spMk id="2" creationId="{6E7FAB23-3BBF-1A08-4ADC-40F67AE0A9F3}"/>
-          </ac:spMkLst>
-        </pc:spChg>
-        <pc:spChg chg="mod">
-          <ac:chgData name="Viktória Szabó" userId="S::viktoria22000@student.hamk.fi::55ff7ae3-70d3-4f82-942e-28ce8109f0e2" providerId="AD" clId="Web-{99DD3772-D7DA-ACAF-C41D-2125D048CA4C}" dt="2023-09-26T10:46:12.597" v="684" actId="20577"/>
-          <ac:spMkLst>
-            <pc:docMk/>
-            <pc:sldMk cId="1499829321" sldId="257"/>
-            <ac:spMk id="3" creationId="{27880FD4-D46A-B9D5-23AC-6C0D8D9629D2}"/>
-          </ac:spMkLst>
-        </pc:spChg>
-        <pc:spChg chg="add">
-          <ac:chgData name="Viktória Szabó" userId="S::viktoria22000@student.hamk.fi::55ff7ae3-70d3-4f82-942e-28ce8109f0e2" providerId="AD" clId="Web-{99DD3772-D7DA-ACAF-C41D-2125D048CA4C}" dt="2023-09-26T10:44:18.987" v="658"/>
-          <ac:spMkLst>
-            <pc:docMk/>
-            <pc:sldMk cId="1499829321" sldId="257"/>
-            <ac:spMk id="8" creationId="{8651CFA9-6065-4243-AC48-858E359780B1}"/>
-          </ac:spMkLst>
-        </pc:spChg>
-        <pc:spChg chg="add">
-          <ac:chgData name="Viktória Szabó" userId="S::viktoria22000@student.hamk.fi::55ff7ae3-70d3-4f82-942e-28ce8109f0e2" providerId="AD" clId="Web-{99DD3772-D7DA-ACAF-C41D-2125D048CA4C}" dt="2023-09-26T10:44:18.987" v="658"/>
-          <ac:spMkLst>
-            <pc:docMk/>
-            <pc:sldMk cId="1499829321" sldId="257"/>
-            <ac:spMk id="10" creationId="{7462BFBC-0E19-4E6F-B0C7-CD5C519BC311}"/>
-          </ac:spMkLst>
-        </pc:spChg>
-        <pc:spChg chg="add">
-          <ac:chgData name="Viktória Szabó" userId="S::viktoria22000@student.hamk.fi::55ff7ae3-70d3-4f82-942e-28ce8109f0e2" providerId="AD" clId="Web-{99DD3772-D7DA-ACAF-C41D-2125D048CA4C}" dt="2023-09-26T10:44:18.987" v="658"/>
-          <ac:spMkLst>
-            <pc:docMk/>
-            <pc:sldMk cId="1499829321" sldId="257"/>
-            <ac:spMk id="16" creationId="{D813CD98-5EBE-426D-A4AC-FA5518B099DE}"/>
-          </ac:spMkLst>
-        </pc:spChg>
-        <pc:spChg chg="add">
-          <ac:chgData name="Viktória Szabó" userId="S::viktoria22000@student.hamk.fi::55ff7ae3-70d3-4f82-942e-28ce8109f0e2" providerId="AD" clId="Web-{99DD3772-D7DA-ACAF-C41D-2125D048CA4C}" dt="2023-09-26T10:44:18.987" v="658"/>
-          <ac:spMkLst>
-            <pc:docMk/>
-            <pc:sldMk cId="1499829321" sldId="257"/>
-            <ac:spMk id="18" creationId="{B453545A-B2D3-41EE-A91C-DBF43402DD43}"/>
-          </ac:spMkLst>
-        </pc:spChg>
-        <pc:grpChg chg="add">
-          <ac:chgData name="Viktória Szabó" userId="S::viktoria22000@student.hamk.fi::55ff7ae3-70d3-4f82-942e-28ce8109f0e2" providerId="AD" clId="Web-{99DD3772-D7DA-ACAF-C41D-2125D048CA4C}" dt="2023-09-26T10:44:18.987" v="658"/>
-          <ac:grpSpMkLst>
-            <pc:docMk/>
-            <pc:sldMk cId="1499829321" sldId="257"/>
-            <ac:grpSpMk id="12" creationId="{F2C2A007-4AE9-49C4-B364-5FDF34596224}"/>
-          </ac:grpSpMkLst>
-        </pc:grpChg>
-      </pc:sldChg>
-      <pc:sldChg chg="addSp modSp">
-        <pc:chgData name="Viktória Szabó" userId="S::viktoria22000@student.hamk.fi::55ff7ae3-70d3-4f82-942e-28ce8109f0e2" providerId="AD" clId="Web-{99DD3772-D7DA-ACAF-C41D-2125D048CA4C}" dt="2023-09-26T10:46:04.019" v="682" actId="20577"/>
-        <pc:sldMkLst>
-          <pc:docMk/>
-          <pc:sldMk cId="723807988" sldId="262"/>
-        </pc:sldMkLst>
-        <pc:spChg chg="mod">
-          <ac:chgData name="Viktória Szabó" userId="S::viktoria22000@student.hamk.fi::55ff7ae3-70d3-4f82-942e-28ce8109f0e2" providerId="AD" clId="Web-{99DD3772-D7DA-ACAF-C41D-2125D048CA4C}" dt="2023-09-26T10:46:04.019" v="682" actId="20577"/>
-          <ac:spMkLst>
-            <pc:docMk/>
-            <pc:sldMk cId="723807988" sldId="262"/>
-            <ac:spMk id="2" creationId="{E9FCD3FF-F45B-8D90-0C9A-8B9444056B35}"/>
-          </ac:spMkLst>
-        </pc:spChg>
-        <pc:spChg chg="mod">
-          <ac:chgData name="Viktória Szabó" userId="S::viktoria22000@student.hamk.fi::55ff7ae3-70d3-4f82-942e-28ce8109f0e2" providerId="AD" clId="Web-{99DD3772-D7DA-ACAF-C41D-2125D048CA4C}" dt="2023-09-26T10:45:39.847" v="675" actId="20577"/>
-          <ac:spMkLst>
-            <pc:docMk/>
-            <pc:sldMk cId="723807988" sldId="262"/>
-            <ac:spMk id="3" creationId="{F7903209-7B69-F2CF-7AFD-F8DAB8DE1B72}"/>
-          </ac:spMkLst>
-        </pc:spChg>
-        <pc:picChg chg="add mod">
-          <ac:chgData name="Viktória Szabó" userId="S::viktoria22000@student.hamk.fi::55ff7ae3-70d3-4f82-942e-28ce8109f0e2" providerId="AD" clId="Web-{99DD3772-D7DA-ACAF-C41D-2125D048CA4C}" dt="2023-09-26T10:30:49.923" v="42" actId="1076"/>
-          <ac:picMkLst>
-            <pc:docMk/>
-            <pc:sldMk cId="723807988" sldId="262"/>
-            <ac:picMk id="4" creationId="{93560767-ED00-007D-38F6-FA4111FC431C}"/>
-          </ac:picMkLst>
-        </pc:picChg>
-        <pc:picChg chg="add mod">
-          <ac:chgData name="Viktória Szabó" userId="S::viktoria22000@student.hamk.fi::55ff7ae3-70d3-4f82-942e-28ce8109f0e2" providerId="AD" clId="Web-{99DD3772-D7DA-ACAF-C41D-2125D048CA4C}" dt="2023-09-26T10:30:47.330" v="39" actId="1076"/>
-          <ac:picMkLst>
-            <pc:docMk/>
-            <pc:sldMk cId="723807988" sldId="262"/>
-            <ac:picMk id="5" creationId="{6147C8E2-A9FF-BF4C-8D74-AB061E226477}"/>
-          </ac:picMkLst>
-        </pc:picChg>
-      </pc:sldChg>
-      <pc:sldChg chg="addSp delSp modSp mod setBg modClrScheme addAnim delAnim chgLayout">
-        <pc:chgData name="Viktória Szabó" userId="S::viktoria22000@student.hamk.fi::55ff7ae3-70d3-4f82-942e-28ce8109f0e2" providerId="AD" clId="Web-{99DD3772-D7DA-ACAF-C41D-2125D048CA4C}" dt="2023-09-26T10:40:38.549" v="440" actId="20577"/>
-        <pc:sldMkLst>
-          <pc:docMk/>
-          <pc:sldMk cId="2129731390" sldId="263"/>
-        </pc:sldMkLst>
-        <pc:spChg chg="mod ord">
-          <ac:chgData name="Viktória Szabó" userId="S::viktoria22000@student.hamk.fi::55ff7ae3-70d3-4f82-942e-28ce8109f0e2" providerId="AD" clId="Web-{99DD3772-D7DA-ACAF-C41D-2125D048CA4C}" dt="2023-09-26T10:40:38.549" v="440" actId="20577"/>
-          <ac:spMkLst>
-            <pc:docMk/>
-            <pc:sldMk cId="2129731390" sldId="263"/>
-            <ac:spMk id="2" creationId="{D35C279A-F607-F2FC-CE91-DEE49601EC63}"/>
-          </ac:spMkLst>
-        </pc:spChg>
-        <pc:spChg chg="mod ord">
-          <ac:chgData name="Viktória Szabó" userId="S::viktoria22000@student.hamk.fi::55ff7ae3-70d3-4f82-942e-28ce8109f0e2" providerId="AD" clId="Web-{99DD3772-D7DA-ACAF-C41D-2125D048CA4C}" dt="2023-09-26T10:40:35.331" v="437"/>
-          <ac:spMkLst>
-            <pc:docMk/>
-            <pc:sldMk cId="2129731390" sldId="263"/>
-            <ac:spMk id="3" creationId="{1FBB4542-7416-E7B0-5988-8C7D2AFB8EA8}"/>
-          </ac:spMkLst>
-        </pc:spChg>
-        <pc:spChg chg="add del">
-          <ac:chgData name="Viktória Szabó" userId="S::viktoria22000@student.hamk.fi::55ff7ae3-70d3-4f82-942e-28ce8109f0e2" providerId="AD" clId="Web-{99DD3772-D7DA-ACAF-C41D-2125D048CA4C}" dt="2023-09-26T10:40:35.331" v="437"/>
-          <ac:spMkLst>
-            <pc:docMk/>
-            <pc:sldMk cId="2129731390" sldId="263"/>
-            <ac:spMk id="8" creationId="{DE61FBD7-E37C-4B38-BE44-A6D4978D7486}"/>
-          </ac:spMkLst>
-        </pc:spChg>
-        <pc:spChg chg="add del">
-          <ac:chgData name="Viktória Szabó" userId="S::viktoria22000@student.hamk.fi::55ff7ae3-70d3-4f82-942e-28ce8109f0e2" providerId="AD" clId="Web-{99DD3772-D7DA-ACAF-C41D-2125D048CA4C}" dt="2023-09-26T10:40:35.331" v="437"/>
-          <ac:spMkLst>
-            <pc:docMk/>
-            <pc:sldMk cId="2129731390" sldId="263"/>
-            <ac:spMk id="10" creationId="{823772C2-0911-45A0-B7B6-D811380C75AC}"/>
-          </ac:spMkLst>
-        </pc:spChg>
-        <pc:grpChg chg="add del">
-          <ac:chgData name="Viktória Szabó" userId="S::viktoria22000@student.hamk.fi::55ff7ae3-70d3-4f82-942e-28ce8109f0e2" providerId="AD" clId="Web-{99DD3772-D7DA-ACAF-C41D-2125D048CA4C}" dt="2023-09-26T10:40:35.331" v="437"/>
-          <ac:grpSpMkLst>
-            <pc:docMk/>
-            <pc:sldMk cId="2129731390" sldId="263"/>
-            <ac:grpSpMk id="12" creationId="{53A6A32E-D196-4536-A9E8-56D5BB884FCA}"/>
-          </ac:grpSpMkLst>
-        </pc:grpChg>
-      </pc:sldChg>
-      <pc:sldChg chg="addSp delSp modSp">
-        <pc:chgData name="Viktória Szabó" userId="S::viktoria22000@student.hamk.fi::55ff7ae3-70d3-4f82-942e-28ce8109f0e2" providerId="AD" clId="Web-{99DD3772-D7DA-ACAF-C41D-2125D048CA4C}" dt="2023-09-26T10:45:55.987" v="679" actId="20577"/>
-        <pc:sldMkLst>
-          <pc:docMk/>
-          <pc:sldMk cId="435654270" sldId="265"/>
-        </pc:sldMkLst>
-        <pc:spChg chg="mod">
-          <ac:chgData name="Viktória Szabó" userId="S::viktoria22000@student.hamk.fi::55ff7ae3-70d3-4f82-942e-28ce8109f0e2" providerId="AD" clId="Web-{99DD3772-D7DA-ACAF-C41D-2125D048CA4C}" dt="2023-09-26T10:45:55.987" v="679" actId="20577"/>
-          <ac:spMkLst>
-            <pc:docMk/>
-            <pc:sldMk cId="435654270" sldId="265"/>
-            <ac:spMk id="2" creationId="{C467D37A-286A-5967-A2D3-A3CB3B01E5C0}"/>
-          </ac:spMkLst>
-        </pc:spChg>
-        <pc:spChg chg="mod">
-          <ac:chgData name="Viktória Szabó" userId="S::viktoria22000@student.hamk.fi::55ff7ae3-70d3-4f82-942e-28ce8109f0e2" providerId="AD" clId="Web-{99DD3772-D7DA-ACAF-C41D-2125D048CA4C}" dt="2023-09-26T10:45:44.784" v="677" actId="20577"/>
-          <ac:spMkLst>
-            <pc:docMk/>
-            <pc:sldMk cId="435654270" sldId="265"/>
-            <ac:spMk id="3" creationId="{7F2E4967-6631-E036-3C10-AB476F921C5F}"/>
-          </ac:spMkLst>
-        </pc:spChg>
-        <pc:picChg chg="add del mod">
-          <ac:chgData name="Viktória Szabó" userId="S::viktoria22000@student.hamk.fi::55ff7ae3-70d3-4f82-942e-28ce8109f0e2" providerId="AD" clId="Web-{99DD3772-D7DA-ACAF-C41D-2125D048CA4C}" dt="2023-09-26T10:29:48.470" v="14"/>
-          <ac:picMkLst>
-            <pc:docMk/>
-            <pc:sldMk cId="435654270" sldId="265"/>
-            <ac:picMk id="4" creationId="{8BE72F5C-83A2-3231-A9E6-18AE4085838E}"/>
-          </ac:picMkLst>
-        </pc:picChg>
-        <pc:picChg chg="add mod">
-          <ac:chgData name="Viktória Szabó" userId="S::viktoria22000@student.hamk.fi::55ff7ae3-70d3-4f82-942e-28ce8109f0e2" providerId="AD" clId="Web-{99DD3772-D7DA-ACAF-C41D-2125D048CA4C}" dt="2023-09-26T10:30:08.236" v="24" actId="1076"/>
-          <ac:picMkLst>
-            <pc:docMk/>
-            <pc:sldMk cId="435654270" sldId="265"/>
-            <ac:picMk id="5" creationId="{3746FFB8-CB00-DA0E-CC83-3F8B80704B55}"/>
-          </ac:picMkLst>
-        </pc:picChg>
-        <pc:picChg chg="add mod">
-          <ac:chgData name="Viktória Szabó" userId="S::viktoria22000@student.hamk.fi::55ff7ae3-70d3-4f82-942e-28ce8109f0e2" providerId="AD" clId="Web-{99DD3772-D7DA-ACAF-C41D-2125D048CA4C}" dt="2023-09-26T10:30:08.986" v="25" actId="1076"/>
-          <ac:picMkLst>
-            <pc:docMk/>
-            <pc:sldMk cId="435654270" sldId="265"/>
-            <ac:picMk id="6" creationId="{F2B7F44B-D5B4-17C7-5D2E-B87E3E17631B}"/>
-          </ac:picMkLst>
-        </pc:picChg>
-      </pc:sldChg>
-      <pc:sldChg chg="addSp delSp modSp new mod setBg">
-        <pc:chgData name="Viktória Szabó" userId="S::viktoria22000@student.hamk.fi::55ff7ae3-70d3-4f82-942e-28ce8109f0e2" providerId="AD" clId="Web-{99DD3772-D7DA-ACAF-C41D-2125D048CA4C}" dt="2023-09-26T10:38:53.596" v="342" actId="20577"/>
-        <pc:sldMkLst>
-          <pc:docMk/>
-          <pc:sldMk cId="3124489379" sldId="266"/>
-        </pc:sldMkLst>
-        <pc:spChg chg="mod">
-          <ac:chgData name="Viktória Szabó" userId="S::viktoria22000@student.hamk.fi::55ff7ae3-70d3-4f82-942e-28ce8109f0e2" providerId="AD" clId="Web-{99DD3772-D7DA-ACAF-C41D-2125D048CA4C}" dt="2023-09-26T10:38:27.143" v="331" actId="14100"/>
-          <ac:spMkLst>
-            <pc:docMk/>
-            <pc:sldMk cId="3124489379" sldId="266"/>
-            <ac:spMk id="2" creationId="{5A78A3DA-970E-9077-A1C4-CA9DCFC7D8B1}"/>
-          </ac:spMkLst>
-        </pc:spChg>
-        <pc:spChg chg="del mod">
-          <ac:chgData name="Viktória Szabó" userId="S::viktoria22000@student.hamk.fi::55ff7ae3-70d3-4f82-942e-28ce8109f0e2" providerId="AD" clId="Web-{99DD3772-D7DA-ACAF-C41D-2125D048CA4C}" dt="2023-09-26T10:33:59.189" v="157"/>
-          <ac:spMkLst>
-            <pc:docMk/>
-            <pc:sldMk cId="3124489379" sldId="266"/>
-            <ac:spMk id="3" creationId="{4281A879-1BFE-2B9D-DCF9-C30DD0B20DA9}"/>
-          </ac:spMkLst>
-        </pc:spChg>
-        <pc:spChg chg="add del mod">
-          <ac:chgData name="Viktória Szabó" userId="S::viktoria22000@student.hamk.fi::55ff7ae3-70d3-4f82-942e-28ce8109f0e2" providerId="AD" clId="Web-{99DD3772-D7DA-ACAF-C41D-2125D048CA4C}" dt="2023-09-26T10:34:25.580" v="164"/>
-          <ac:spMkLst>
-            <pc:docMk/>
-            <pc:sldMk cId="3124489379" sldId="266"/>
-            <ac:spMk id="6" creationId="{D1BA41D9-85B3-2BCE-7BAD-563E9B67B612}"/>
-          </ac:spMkLst>
-        </pc:spChg>
-        <pc:spChg chg="add mod">
-          <ac:chgData name="Viktória Szabó" userId="S::viktoria22000@student.hamk.fi::55ff7ae3-70d3-4f82-942e-28ce8109f0e2" providerId="AD" clId="Web-{99DD3772-D7DA-ACAF-C41D-2125D048CA4C}" dt="2023-09-26T10:38:53.596" v="342" actId="20577"/>
-          <ac:spMkLst>
-            <pc:docMk/>
-            <pc:sldMk cId="3124489379" sldId="266"/>
-            <ac:spMk id="8" creationId="{8A5A1EB3-A69E-9C30-F146-0A35F818E211}"/>
-          </ac:spMkLst>
-        </pc:spChg>
-        <pc:spChg chg="add del mod">
-          <ac:chgData name="Viktória Szabó" userId="S::viktoria22000@student.hamk.fi::55ff7ae3-70d3-4f82-942e-28ce8109f0e2" providerId="AD" clId="Web-{99DD3772-D7DA-ACAF-C41D-2125D048CA4C}" dt="2023-09-26T10:36:06.049" v="197"/>
-          <ac:spMkLst>
-            <pc:docMk/>
-            <pc:sldMk cId="3124489379" sldId="266"/>
-            <ac:spMk id="10" creationId="{4B3DFF6C-0CD4-14E2-1AF2-08FBD165385D}"/>
-          </ac:spMkLst>
-        </pc:spChg>
-        <pc:spChg chg="add del mod">
-          <ac:chgData name="Viktória Szabó" userId="S::viktoria22000@student.hamk.fi::55ff7ae3-70d3-4f82-942e-28ce8109f0e2" providerId="AD" clId="Web-{99DD3772-D7DA-ACAF-C41D-2125D048CA4C}" dt="2023-09-26T10:37:03.987" v="251"/>
-          <ac:spMkLst>
-            <pc:docMk/>
-            <pc:sldMk cId="3124489379" sldId="266"/>
-            <ac:spMk id="13" creationId="{1612404F-C7EC-5F64-DBD7-1B4C037A66D6}"/>
-          </ac:spMkLst>
-        </pc:spChg>
-        <pc:spChg chg="add del">
-          <ac:chgData name="Viktória Szabó" userId="S::viktoria22000@student.hamk.fi::55ff7ae3-70d3-4f82-942e-28ce8109f0e2" providerId="AD" clId="Web-{99DD3772-D7DA-ACAF-C41D-2125D048CA4C}" dt="2023-09-26T10:37:07.955" v="252"/>
-          <ac:spMkLst>
-            <pc:docMk/>
-            <pc:sldMk cId="3124489379" sldId="266"/>
-            <ac:spMk id="16" creationId="{A4FB2F27-3F7D-440E-A905-86607A926A29}"/>
-          </ac:spMkLst>
-        </pc:spChg>
-        <pc:spChg chg="add del">
-          <ac:chgData name="Viktória Szabó" userId="S::viktoria22000@student.hamk.fi::55ff7ae3-70d3-4f82-942e-28ce8109f0e2" providerId="AD" clId="Web-{99DD3772-D7DA-ACAF-C41D-2125D048CA4C}" dt="2023-09-26T10:37:07.955" v="252"/>
-          <ac:spMkLst>
-            <pc:docMk/>
-            <pc:sldMk cId="3124489379" sldId="266"/>
-            <ac:spMk id="18" creationId="{AF678C14-A033-4139-BCA9-8382B039648B}"/>
-          </ac:spMkLst>
-        </pc:spChg>
-        <pc:spChg chg="add">
-          <ac:chgData name="Viktória Szabó" userId="S::viktoria22000@student.hamk.fi::55ff7ae3-70d3-4f82-942e-28ce8109f0e2" providerId="AD" clId="Web-{99DD3772-D7DA-ACAF-C41D-2125D048CA4C}" dt="2023-09-26T10:37:07.955" v="252"/>
-          <ac:spMkLst>
-            <pc:docMk/>
-            <pc:sldMk cId="3124489379" sldId="266"/>
-            <ac:spMk id="27" creationId="{A4FB2F27-3F7D-440E-A905-86607A926A29}"/>
-          </ac:spMkLst>
-        </pc:spChg>
-        <pc:spChg chg="add">
-          <ac:chgData name="Viktória Szabó" userId="S::viktoria22000@student.hamk.fi::55ff7ae3-70d3-4f82-942e-28ce8109f0e2" providerId="AD" clId="Web-{99DD3772-D7DA-ACAF-C41D-2125D048CA4C}" dt="2023-09-26T10:37:07.955" v="252"/>
-          <ac:spMkLst>
-            <pc:docMk/>
-            <pc:sldMk cId="3124489379" sldId="266"/>
-            <ac:spMk id="29" creationId="{AF678C14-A033-4139-BCA9-8382B039648B}"/>
-          </ac:spMkLst>
-        </pc:spChg>
-        <pc:grpChg chg="add del">
-          <ac:chgData name="Viktória Szabó" userId="S::viktoria22000@student.hamk.fi::55ff7ae3-70d3-4f82-942e-28ce8109f0e2" providerId="AD" clId="Web-{99DD3772-D7DA-ACAF-C41D-2125D048CA4C}" dt="2023-09-26T10:37:07.955" v="252"/>
-          <ac:grpSpMkLst>
-            <pc:docMk/>
-            <pc:sldMk cId="3124489379" sldId="266"/>
-            <ac:grpSpMk id="20" creationId="{14763DA8-CE3A-4B30-B2F5-0D128777F742}"/>
-          </ac:grpSpMkLst>
-        </pc:grpChg>
-        <pc:grpChg chg="add">
-          <ac:chgData name="Viktória Szabó" userId="S::viktoria22000@student.hamk.fi::55ff7ae3-70d3-4f82-942e-28ce8109f0e2" providerId="AD" clId="Web-{99DD3772-D7DA-ACAF-C41D-2125D048CA4C}" dt="2023-09-26T10:37:07.955" v="252"/>
-          <ac:grpSpMkLst>
-            <pc:docMk/>
-            <pc:sldMk cId="3124489379" sldId="266"/>
-            <ac:grpSpMk id="31" creationId="{14763DA8-CE3A-4B30-B2F5-0D128777F742}"/>
-          </ac:grpSpMkLst>
-        </pc:grpChg>
-        <pc:picChg chg="add del mod ord">
-          <ac:chgData name="Viktória Szabó" userId="S::viktoria22000@student.hamk.fi::55ff7ae3-70d3-4f82-942e-28ce8109f0e2" providerId="AD" clId="Web-{99DD3772-D7DA-ACAF-C41D-2125D048CA4C}" dt="2023-09-26T10:34:08.814" v="163"/>
-          <ac:picMkLst>
-            <pc:docMk/>
-            <pc:sldMk cId="3124489379" sldId="266"/>
-            <ac:picMk id="4" creationId="{B593B090-7674-1DB8-1F95-BAD21059DCD5}"/>
-          </ac:picMkLst>
-        </pc:picChg>
-        <pc:picChg chg="add del mod ord">
-          <ac:chgData name="Viktória Szabó" userId="S::viktoria22000@student.hamk.fi::55ff7ae3-70d3-4f82-942e-28ce8109f0e2" providerId="AD" clId="Web-{99DD3772-D7DA-ACAF-C41D-2125D048CA4C}" dt="2023-09-26T10:35:57.752" v="196"/>
-          <ac:picMkLst>
-            <pc:docMk/>
-            <pc:sldMk cId="3124489379" sldId="266"/>
-            <ac:picMk id="7" creationId="{8433EB4E-D398-DB6F-DA21-84FBD156D770}"/>
-          </ac:picMkLst>
-        </pc:picChg>
-        <pc:picChg chg="add del mod ord">
-          <ac:chgData name="Viktória Szabó" userId="S::viktoria22000@student.hamk.fi::55ff7ae3-70d3-4f82-942e-28ce8109f0e2" providerId="AD" clId="Web-{99DD3772-D7DA-ACAF-C41D-2125D048CA4C}" dt="2023-09-26T10:36:58.737" v="250"/>
-          <ac:picMkLst>
-            <pc:docMk/>
-            <pc:sldMk cId="3124489379" sldId="266"/>
-            <ac:picMk id="11" creationId="{AFDD4BE1-2151-DB20-AAD9-711A905EE7CF}"/>
-          </ac:picMkLst>
-        </pc:picChg>
-        <pc:picChg chg="add mod ord">
-          <ac:chgData name="Viktória Szabó" userId="S::viktoria22000@student.hamk.fi::55ff7ae3-70d3-4f82-942e-28ce8109f0e2" providerId="AD" clId="Web-{99DD3772-D7DA-ACAF-C41D-2125D048CA4C}" dt="2023-09-26T10:38:34.143" v="335" actId="1076"/>
-          <ac:picMkLst>
-            <pc:docMk/>
-            <pc:sldMk cId="3124489379" sldId="266"/>
-            <ac:picMk id="14" creationId="{A1D47B57-A6BA-7DE0-5AB6-9C7DD840B542}"/>
-          </ac:picMkLst>
-        </pc:picChg>
-      </pc:sldChg>
-      <pc:sldChg chg="addSp modSp new mod setBg modClrScheme chgLayout">
-        <pc:chgData name="Viktória Szabó" userId="S::viktoria22000@student.hamk.fi::55ff7ae3-70d3-4f82-942e-28ce8109f0e2" providerId="AD" clId="Web-{99DD3772-D7DA-ACAF-C41D-2125D048CA4C}" dt="2023-09-26T10:40:43.440" v="442" actId="20577"/>
-        <pc:sldMkLst>
-          <pc:docMk/>
-          <pc:sldMk cId="1072539886" sldId="267"/>
-        </pc:sldMkLst>
-        <pc:spChg chg="mod ord">
-          <ac:chgData name="Viktória Szabó" userId="S::viktoria22000@student.hamk.fi::55ff7ae3-70d3-4f82-942e-28ce8109f0e2" providerId="AD" clId="Web-{99DD3772-D7DA-ACAF-C41D-2125D048CA4C}" dt="2023-09-26T10:40:43.440" v="442" actId="20577"/>
-          <ac:spMkLst>
-            <pc:docMk/>
-            <pc:sldMk cId="1072539886" sldId="267"/>
-            <ac:spMk id="2" creationId="{A378FD55-E9A7-E9D0-7B36-80A46C94A82A}"/>
-          </ac:spMkLst>
-        </pc:spChg>
-        <pc:spChg chg="mod ord">
-          <ac:chgData name="Viktória Szabó" userId="S::viktoria22000@student.hamk.fi::55ff7ae3-70d3-4f82-942e-28ce8109f0e2" providerId="AD" clId="Web-{99DD3772-D7DA-ACAF-C41D-2125D048CA4C}" dt="2023-09-26T10:39:26.221" v="376"/>
-          <ac:spMkLst>
-            <pc:docMk/>
-            <pc:sldMk cId="1072539886" sldId="267"/>
-            <ac:spMk id="3" creationId="{C167499C-17E5-A7E0-2485-CF328CAC9FE9}"/>
-          </ac:spMkLst>
-        </pc:spChg>
-        <pc:spChg chg="add">
-          <ac:chgData name="Viktória Szabó" userId="S::viktoria22000@student.hamk.fi::55ff7ae3-70d3-4f82-942e-28ce8109f0e2" providerId="AD" clId="Web-{99DD3772-D7DA-ACAF-C41D-2125D048CA4C}" dt="2023-09-26T10:39:26.221" v="376"/>
-          <ac:spMkLst>
-            <pc:docMk/>
-            <pc:sldMk cId="1072539886" sldId="267"/>
-            <ac:spMk id="8" creationId="{DE61FBD7-E37C-4B38-BE44-A6D4978D7486}"/>
-          </ac:spMkLst>
-        </pc:spChg>
-        <pc:spChg chg="add">
-          <ac:chgData name="Viktória Szabó" userId="S::viktoria22000@student.hamk.fi::55ff7ae3-70d3-4f82-942e-28ce8109f0e2" providerId="AD" clId="Web-{99DD3772-D7DA-ACAF-C41D-2125D048CA4C}" dt="2023-09-26T10:39:26.221" v="376"/>
-          <ac:spMkLst>
-            <pc:docMk/>
-            <pc:sldMk cId="1072539886" sldId="267"/>
-            <ac:spMk id="10" creationId="{823772C2-0911-45A0-B7B6-D811380C75AC}"/>
-          </ac:spMkLst>
-        </pc:spChg>
-        <pc:grpChg chg="add">
-          <ac:chgData name="Viktória Szabó" userId="S::viktoria22000@student.hamk.fi::55ff7ae3-70d3-4f82-942e-28ce8109f0e2" providerId="AD" clId="Web-{99DD3772-D7DA-ACAF-C41D-2125D048CA4C}" dt="2023-09-26T10:39:26.221" v="376"/>
-          <ac:grpSpMkLst>
-            <pc:docMk/>
-            <pc:sldMk cId="1072539886" sldId="267"/>
-            <ac:grpSpMk id="12" creationId="{53A6A32E-D196-4536-A9E8-56D5BB884FCA}"/>
-          </ac:grpSpMkLst>
-        </pc:grpChg>
-      </pc:sldChg>
-      <pc:sldChg chg="addSp modSp new mod setBg">
-        <pc:chgData name="Viktória Szabó" userId="S::viktoria22000@student.hamk.fi::55ff7ae3-70d3-4f82-942e-28ce8109f0e2" providerId="AD" clId="Web-{99DD3772-D7DA-ACAF-C41D-2125D048CA4C}" dt="2023-09-26T10:44:11.831" v="657"/>
-        <pc:sldMkLst>
-          <pc:docMk/>
-          <pc:sldMk cId="3257955536" sldId="268"/>
-        </pc:sldMkLst>
-        <pc:spChg chg="mod">
-          <ac:chgData name="Viktória Szabó" userId="S::viktoria22000@student.hamk.fi::55ff7ae3-70d3-4f82-942e-28ce8109f0e2" providerId="AD" clId="Web-{99DD3772-D7DA-ACAF-C41D-2125D048CA4C}" dt="2023-09-26T10:44:11.831" v="657"/>
-          <ac:spMkLst>
-            <pc:docMk/>
-            <pc:sldMk cId="3257955536" sldId="268"/>
-            <ac:spMk id="2" creationId="{280DD61B-22A7-3D58-A0ED-2C2AFB5E9234}"/>
-          </ac:spMkLst>
-        </pc:spChg>
-        <pc:spChg chg="mod">
-          <ac:chgData name="Viktória Szabó" userId="S::viktoria22000@student.hamk.fi::55ff7ae3-70d3-4f82-942e-28ce8109f0e2" providerId="AD" clId="Web-{99DD3772-D7DA-ACAF-C41D-2125D048CA4C}" dt="2023-09-26T10:44:11.831" v="657"/>
-          <ac:spMkLst>
-            <pc:docMk/>
-            <pc:sldMk cId="3257955536" sldId="268"/>
-            <ac:spMk id="3" creationId="{40D137FA-18A4-4E72-3B1A-E45AE21D012B}"/>
-          </ac:spMkLst>
-        </pc:spChg>
-        <pc:spChg chg="add">
-          <ac:chgData name="Viktória Szabó" userId="S::viktoria22000@student.hamk.fi::55ff7ae3-70d3-4f82-942e-28ce8109f0e2" providerId="AD" clId="Web-{99DD3772-D7DA-ACAF-C41D-2125D048CA4C}" dt="2023-09-26T10:44:11.831" v="657"/>
-          <ac:spMkLst>
-            <pc:docMk/>
-            <pc:sldMk cId="3257955536" sldId="268"/>
-            <ac:spMk id="8" creationId="{8651CFA9-6065-4243-AC48-858E359780B1}"/>
-          </ac:spMkLst>
-        </pc:spChg>
-        <pc:spChg chg="add">
-          <ac:chgData name="Viktória Szabó" userId="S::viktoria22000@student.hamk.fi::55ff7ae3-70d3-4f82-942e-28ce8109f0e2" providerId="AD" clId="Web-{99DD3772-D7DA-ACAF-C41D-2125D048CA4C}" dt="2023-09-26T10:44:11.831" v="657"/>
-          <ac:spMkLst>
-            <pc:docMk/>
-            <pc:sldMk cId="3257955536" sldId="268"/>
-            <ac:spMk id="10" creationId="{7462BFBC-0E19-4E6F-B0C7-CD5C519BC311}"/>
-          </ac:spMkLst>
-        </pc:spChg>
-        <pc:spChg chg="add">
-          <ac:chgData name="Viktória Szabó" userId="S::viktoria22000@student.hamk.fi::55ff7ae3-70d3-4f82-942e-28ce8109f0e2" providerId="AD" clId="Web-{99DD3772-D7DA-ACAF-C41D-2125D048CA4C}" dt="2023-09-26T10:44:11.831" v="657"/>
-          <ac:spMkLst>
-            <pc:docMk/>
-            <pc:sldMk cId="3257955536" sldId="268"/>
-            <ac:spMk id="16" creationId="{D813CD98-5EBE-426D-A4AC-FA5518B099DE}"/>
-          </ac:spMkLst>
-        </pc:spChg>
-        <pc:spChg chg="add">
-          <ac:chgData name="Viktória Szabó" userId="S::viktoria22000@student.hamk.fi::55ff7ae3-70d3-4f82-942e-28ce8109f0e2" providerId="AD" clId="Web-{99DD3772-D7DA-ACAF-C41D-2125D048CA4C}" dt="2023-09-26T10:44:11.831" v="657"/>
-          <ac:spMkLst>
-            <pc:docMk/>
-            <pc:sldMk cId="3257955536" sldId="268"/>
-            <ac:spMk id="18" creationId="{B453545A-B2D3-41EE-A91C-DBF43402DD43}"/>
-          </ac:spMkLst>
-        </pc:spChg>
-        <pc:grpChg chg="add">
-          <ac:chgData name="Viktória Szabó" userId="S::viktoria22000@student.hamk.fi::55ff7ae3-70d3-4f82-942e-28ce8109f0e2" providerId="AD" clId="Web-{99DD3772-D7DA-ACAF-C41D-2125D048CA4C}" dt="2023-09-26T10:44:11.831" v="657"/>
-          <ac:grpSpMkLst>
-            <pc:docMk/>
-            <pc:sldMk cId="3257955536" sldId="268"/>
-            <ac:grpSpMk id="12" creationId="{F2C2A007-4AE9-49C4-B364-5FDF34596224}"/>
-          </ac:grpSpMkLst>
-        </pc:grpChg>
+          <ac:chgData name="Viktória Szabó" userId="S::viktoria22000@student.hamk.fi::55ff7ae3-70d3-4f82-942e-28ce8109f0e2" providerId="AD" clId="Web-{2FDE26DA-918B-C5FD-BEDC-B05DF466947D}" dt="2023-09-27T10:08:32.022" v="232" actId="20577"/>
+          <ac:spMkLst>
+            <pc:docMk/>
+            <pc:sldMk cId="3751505815" sldId="269"/>
+            <ac:spMk id="3" creationId="{284301AF-09D3-6BEB-2BC6-2BDF6F9CBC62}"/>
+          </ac:spMkLst>
+        </pc:spChg>
       </pc:sldChg>
     </pc:docChg>
   </pc:docChgLst>
@@ -2485,6 +2521,60 @@
             <pc:docMk/>
             <pc:sldMk cId="3751505815" sldId="269"/>
             <ac:spMk id="3" creationId="{284301AF-09D3-6BEB-2BC6-2BDF6F9CBC62}"/>
+          </ac:spMkLst>
+        </pc:spChg>
+      </pc:sldChg>
+    </pc:docChg>
+  </pc:docChgLst>
+  <pc:docChgLst>
+    <pc:chgData name="Viktória Szabó" userId="S::viktoria22000@student.hamk.fi::55ff7ae3-70d3-4f82-942e-28ce8109f0e2" providerId="AD" clId="Web-{C4D42948-8866-3437-1BA9-3871038CE292}"/>
+    <pc:docChg chg="addSld modSld">
+      <pc:chgData name="Viktória Szabó" userId="S::viktoria22000@student.hamk.fi::55ff7ae3-70d3-4f82-942e-28ce8109f0e2" providerId="AD" clId="Web-{C4D42948-8866-3437-1BA9-3871038CE292}" dt="2023-09-27T10:25:38.896" v="53" actId="20577"/>
+      <pc:docMkLst>
+        <pc:docMk/>
+      </pc:docMkLst>
+      <pc:sldChg chg="modSp">
+        <pc:chgData name="Viktória Szabó" userId="S::viktoria22000@student.hamk.fi::55ff7ae3-70d3-4f82-942e-28ce8109f0e2" providerId="AD" clId="Web-{C4D42948-8866-3437-1BA9-3871038CE292}" dt="2023-09-27T10:25:04.770" v="5" actId="20577"/>
+        <pc:sldMkLst>
+          <pc:docMk/>
+          <pc:sldMk cId="723807988" sldId="262"/>
+        </pc:sldMkLst>
+        <pc:spChg chg="mod">
+          <ac:chgData name="Viktória Szabó" userId="S::viktoria22000@student.hamk.fi::55ff7ae3-70d3-4f82-942e-28ce8109f0e2" providerId="AD" clId="Web-{C4D42948-8866-3437-1BA9-3871038CE292}" dt="2023-09-27T10:25:04.770" v="5" actId="20577"/>
+          <ac:spMkLst>
+            <pc:docMk/>
+            <pc:sldMk cId="723807988" sldId="262"/>
+            <ac:spMk id="2" creationId="{E9FCD3FF-F45B-8D90-0C9A-8B9444056B35}"/>
+          </ac:spMkLst>
+        </pc:spChg>
+      </pc:sldChg>
+      <pc:sldChg chg="modSp">
+        <pc:chgData name="Viktória Szabó" userId="S::viktoria22000@student.hamk.fi::55ff7ae3-70d3-4f82-942e-28ce8109f0e2" providerId="AD" clId="Web-{C4D42948-8866-3437-1BA9-3871038CE292}" dt="2023-09-27T10:25:11.723" v="8" actId="20577"/>
+        <pc:sldMkLst>
+          <pc:docMk/>
+          <pc:sldMk cId="435654270" sldId="265"/>
+        </pc:sldMkLst>
+        <pc:spChg chg="mod">
+          <ac:chgData name="Viktória Szabó" userId="S::viktoria22000@student.hamk.fi::55ff7ae3-70d3-4f82-942e-28ce8109f0e2" providerId="AD" clId="Web-{C4D42948-8866-3437-1BA9-3871038CE292}" dt="2023-09-27T10:25:11.723" v="8" actId="20577"/>
+          <ac:spMkLst>
+            <pc:docMk/>
+            <pc:sldMk cId="435654270" sldId="265"/>
+            <ac:spMk id="2" creationId="{C467D37A-286A-5967-A2D3-A3CB3B01E5C0}"/>
+          </ac:spMkLst>
+        </pc:spChg>
+      </pc:sldChg>
+      <pc:sldChg chg="modSp new">
+        <pc:chgData name="Viktória Szabó" userId="S::viktoria22000@student.hamk.fi::55ff7ae3-70d3-4f82-942e-28ce8109f0e2" providerId="AD" clId="Web-{C4D42948-8866-3437-1BA9-3871038CE292}" dt="2023-09-27T10:25:38.896" v="53" actId="20577"/>
+        <pc:sldMkLst>
+          <pc:docMk/>
+          <pc:sldMk cId="2351471326" sldId="270"/>
+        </pc:sldMkLst>
+        <pc:spChg chg="mod">
+          <ac:chgData name="Viktória Szabó" userId="S::viktoria22000@student.hamk.fi::55ff7ae3-70d3-4f82-942e-28ce8109f0e2" providerId="AD" clId="Web-{C4D42948-8866-3437-1BA9-3871038CE292}" dt="2023-09-27T10:25:38.896" v="53" actId="20577"/>
+          <ac:spMkLst>
+            <pc:docMk/>
+            <pc:sldMk cId="2351471326" sldId="270"/>
+            <ac:spMk id="2" creationId="{25EBB419-52F1-F773-5B78-04CD3918F1CA}"/>
           </ac:spMkLst>
         </pc:spChg>
       </pc:sldChg>
@@ -2654,7 +2744,7 @@
             <a:fld id="{11A6662E-FAF4-44BC-88B5-85A7CBFB6D30}" type="datetime1">
               <a:rPr lang="en-US" smtClean="0"/>
               <a:pPr/>
-              <a:t>9/27/2023</a:t>
+              <a:t>10/1/2023</a:t>
             </a:fld>
             <a:endParaRPr lang="en-US"/>
           </a:p>
@@ -2881,7 +2971,7 @@
           <a:p>
             <a:fld id="{4C559632-1575-4E14-B53B-3DC3D5ED3947}" type="datetime1">
               <a:rPr lang="en-US" smtClean="0"/>
-              <a:t>9/27/2023</a:t>
+              <a:t>10/1/2023</a:t>
             </a:fld>
             <a:endParaRPr lang="en-US"/>
           </a:p>
@@ -3089,7 +3179,7 @@
           <a:p>
             <a:fld id="{CC4A6868-2568-4CC9-B302-F37117B01A6E}" type="datetime1">
               <a:rPr lang="en-US" smtClean="0"/>
-              <a:t>9/27/2023</a:t>
+              <a:t>10/1/2023</a:t>
             </a:fld>
             <a:endParaRPr lang="en-US"/>
           </a:p>
@@ -3292,7 +3382,7 @@
           <a:p>
             <a:fld id="{0055F08A-1E71-4B2B-BB49-E743F2903911}" type="datetime1">
               <a:rPr lang="en-US" smtClean="0"/>
-              <a:t>9/27/2023</a:t>
+              <a:t>10/1/2023</a:t>
             </a:fld>
             <a:endParaRPr lang="en-US"/>
           </a:p>
@@ -3565,7 +3655,7 @@
           <a:p>
             <a:fld id="{15417D9E-721A-44BB-8863-9873FE64DA75}" type="datetime1">
               <a:rPr lang="en-US" smtClean="0"/>
-              <a:t>9/27/2023</a:t>
+              <a:t>10/1/2023</a:t>
             </a:fld>
             <a:endParaRPr lang="en-US"/>
           </a:p>
@@ -3835,7 +3925,7 @@
           <a:p>
             <a:fld id="{5F31DA2F-80B8-49CF-99FB-5ABCA53A607A}" type="datetime1">
               <a:rPr lang="en-US" smtClean="0"/>
-              <a:t>9/27/2023</a:t>
+              <a:t>10/1/2023</a:t>
             </a:fld>
             <a:endParaRPr lang="en-US"/>
           </a:p>
@@ -4247,7 +4337,7 @@
           <a:p>
             <a:fld id="{28852172-E6C9-4B6C-929A-A9DE3837BBF1}" type="datetime1">
               <a:rPr lang="en-US" smtClean="0"/>
-              <a:t>9/27/2023</a:t>
+              <a:t>10/1/2023</a:t>
             </a:fld>
             <a:endParaRPr lang="en-US"/>
           </a:p>
@@ -4398,7 +4488,7 @@
           <a:p>
             <a:fld id="{3AB41CFF-90C9-47B3-9DA1-F2BF8D839F7E}" type="datetime1">
               <a:rPr lang="en-US" smtClean="0"/>
-              <a:t>9/27/2023</a:t>
+              <a:t>10/1/2023</a:t>
             </a:fld>
             <a:endParaRPr lang="en-US"/>
           </a:p>
@@ -4511,7 +4601,7 @@
           <a:p>
             <a:fld id="{F06048FA-06AB-4884-A69B-986B96E68A24}" type="datetime1">
               <a:rPr lang="en-US" smtClean="0"/>
-              <a:t>9/27/2023</a:t>
+              <a:t>10/1/2023</a:t>
             </a:fld>
             <a:endParaRPr lang="en-US"/>
           </a:p>
@@ -4822,7 +4912,7 @@
           <a:p>
             <a:fld id="{50DB7ABA-0172-4F9C-889D-567164F66BCD}" type="datetime1">
               <a:rPr lang="en-US" smtClean="0"/>
-              <a:t>9/27/2023</a:t>
+              <a:t>10/1/2023</a:t>
             </a:fld>
             <a:endParaRPr lang="en-US"/>
           </a:p>
@@ -5113,7 +5203,7 @@
           <a:p>
             <a:fld id="{78AC6A5B-8AE7-4A41-B5A7-9ADC6686DC18}" type="datetime1">
               <a:rPr lang="en-US" smtClean="0"/>
-              <a:t>9/27/2023</a:t>
+              <a:t>10/1/2023</a:t>
             </a:fld>
             <a:endParaRPr lang="en-US"/>
           </a:p>
@@ -5422,7 +5512,7 @@
             <a:fld id="{57E0CF6C-748E-4B7A-BC8B-3011EF78ED13}" type="datetime1">
               <a:rPr lang="en-US" smtClean="0"/>
               <a:pPr/>
-              <a:t>9/27/2023</a:t>
+              <a:t>10/1/2023</a:t>
             </a:fld>
             <a:endParaRPr lang="en-US"/>
           </a:p>
@@ -6958,7 +7048,7 @@
           <a:lstStyle/>
           <a:p>
             <a:r>
-              <a:rPr lang="en-US" sz="4100"/>
+              <a:rPr lang="en-US" sz="4100" dirty="0"/>
               <a:t>Analysis between family status and salary (Roy) </a:t>
             </a:r>
           </a:p>
@@ -7127,6 +7217,14 @@
 <file path=ppt/slides/slide12.xml><?xml version="1.0" encoding="utf-8"?>
 <p:sld xmlns:a="http://schemas.openxmlformats.org/drawingml/2006/main" xmlns:r="http://schemas.openxmlformats.org/officeDocument/2006/relationships" xmlns:p="http://schemas.openxmlformats.org/presentationml/2006/main">
   <p:cSld>
+    <p:bg>
+      <p:bgPr>
+        <a:solidFill>
+          <a:schemeClr val="bg1"/>
+        </a:solidFill>
+        <a:effectLst/>
+      </p:bgPr>
+    </p:bg>
     <p:spTree>
       <p:nvGrpSpPr>
         <p:cNvPr id="1" name=""/>
@@ -7141,61 +7239,299 @@
           <a:chExt cx="0" cy="0"/>
         </a:xfrm>
       </p:grpSpPr>
-      <p:sp>
+      <p:sp useBgFill="1">
         <p:nvSpPr>
-          <p:cNvPr id="2" name="Title 1">
-            <a:extLst>
-              <a:ext uri="{FF2B5EF4-FFF2-40B4-BE49-F238E27FC236}">
-                <a16:creationId xmlns:a16="http://schemas.microsoft.com/office/drawing/2014/main" id="{88013891-86EF-454E-0A39-BC7185B11C4F}"/>
+          <p:cNvPr id="23" name="Rectangle 22">
+            <a:extLst>
+              <a:ext uri="{FF2B5EF4-FFF2-40B4-BE49-F238E27FC236}">
+                <a16:creationId xmlns:a16="http://schemas.microsoft.com/office/drawing/2014/main" id="{A4FB2F27-3F7D-440E-A905-86607A926A29}"/>
+              </a:ext>
+              <a:ext uri="{C183D7F6-B498-43B3-948B-1728B52AA6E4}">
+                <adec:decorative xmlns:adec="http://schemas.microsoft.com/office/drawing/2017/decorative" val="1"/>
               </a:ext>
             </a:extLst>
           </p:cNvPr>
           <p:cNvSpPr>
-            <a:spLocks noGrp="1"/>
+            <a:spLocks noGrp="1" noRot="1" noChangeAspect="1" noMove="1" noResize="1" noEditPoints="1" noAdjustHandles="1" noChangeArrowheads="1" noChangeShapeType="1" noTextEdit="1"/>
           </p:cNvSpPr>
           <p:nvPr>
-            <p:ph type="title"/>
+            <p:extLst>
+              <p:ext uri="{386F3935-93C4-4BCD-93E2-E3B085C9AB24}">
+                <p16:designElem xmlns:p16="http://schemas.microsoft.com/office/powerpoint/2015/main" val="1"/>
+              </p:ext>
+            </p:extLst>
           </p:nvPr>
         </p:nvSpPr>
-        <p:spPr/>
+        <p:spPr>
+          <a:xfrm>
+            <a:off x="0" y="0"/>
+            <a:ext cx="12188952" cy="6858000"/>
+          </a:xfrm>
+          <a:prstGeom prst="rect">
+            <a:avLst/>
+          </a:prstGeom>
+          <a:ln>
+            <a:solidFill>
+              <a:schemeClr val="bg1">
+                <a:lumMod val="95000"/>
+              </a:schemeClr>
+            </a:solidFill>
+          </a:ln>
+        </p:spPr>
+        <p:style>
+          <a:lnRef idx="2">
+            <a:schemeClr val="accent1">
+              <a:shade val="50000"/>
+            </a:schemeClr>
+          </a:lnRef>
+          <a:fillRef idx="1">
+            <a:schemeClr val="accent1"/>
+          </a:fillRef>
+          <a:effectRef idx="0">
+            <a:schemeClr val="accent1"/>
+          </a:effectRef>
+          <a:fontRef idx="minor">
+            <a:schemeClr val="lt1"/>
+          </a:fontRef>
+        </p:style>
         <p:txBody>
-          <a:bodyPr/>
+          <a:bodyPr rtlCol="0" anchor="ctr"/>
           <a:lstStyle/>
           <a:p>
-            <a:r>
-              <a:rPr lang="fi-FI" err="1"/>
-              <a:t>Family</a:t>
-            </a:r>
-            <a:r>
-              <a:rPr lang="fi-FI"/>
-              <a:t> / </a:t>
-            </a:r>
-            <a:r>
-              <a:rPr lang="fi-FI" err="1"/>
-              <a:t>Salary</a:t>
-            </a:r>
-            <a:r>
-              <a:rPr lang="fi-FI"/>
-              <a:t> </a:t>
-            </a:r>
-            <a:r>
-              <a:rPr lang="fi-FI" err="1"/>
-              <a:t>Satisfaction</a:t>
-            </a:r>
-            <a:r>
-              <a:rPr lang="fi-FI"/>
-              <a:t> (Roy)</a:t>
-            </a:r>
-            <a:endParaRPr lang="LID4096"/>
+            <a:pPr algn="ctr"/>
+            <a:endParaRPr lang="en-US" dirty="0">
+              <a:solidFill>
+                <a:schemeClr val="tx1">
+                  <a:lumMod val="65000"/>
+                  <a:lumOff val="35000"/>
+                </a:schemeClr>
+              </a:solidFill>
+              <a:latin typeface="AvenirNext LT Pro Medium" panose="020B0504020202020204" pitchFamily="34" charset="0"/>
+            </a:endParaRPr>
           </a:p>
         </p:txBody>
       </p:sp>
       <p:sp>
         <p:nvSpPr>
-          <p:cNvPr id="3" name="Content Placeholder 2">
-            <a:extLst>
-              <a:ext uri="{FF2B5EF4-FFF2-40B4-BE49-F238E27FC236}">
-                <a16:creationId xmlns:a16="http://schemas.microsoft.com/office/drawing/2014/main" id="{284301AF-09D3-6BEB-2BC6-2BDF6F9CBC62}"/>
+          <p:cNvPr id="25" name="Rectangle 24">
+            <a:extLst>
+              <a:ext uri="{FF2B5EF4-FFF2-40B4-BE49-F238E27FC236}">
+                <a16:creationId xmlns:a16="http://schemas.microsoft.com/office/drawing/2014/main" id="{AF678C14-A033-4139-BCA9-8382B039648B}"/>
+              </a:ext>
+              <a:ext uri="{C183D7F6-B498-43B3-948B-1728B52AA6E4}">
+                <adec:decorative xmlns:adec="http://schemas.microsoft.com/office/drawing/2017/decorative" val="1"/>
+              </a:ext>
+            </a:extLst>
+          </p:cNvPr>
+          <p:cNvSpPr>
+            <a:spLocks noGrp="1" noRot="1" noChangeAspect="1" noMove="1" noResize="1" noEditPoints="1" noAdjustHandles="1" noChangeArrowheads="1" noChangeShapeType="1" noTextEdit="1"/>
+          </p:cNvSpPr>
+          <p:nvPr>
+            <p:extLst>
+              <p:ext uri="{386F3935-93C4-4BCD-93E2-E3B085C9AB24}">
+                <p16:designElem xmlns:p16="http://schemas.microsoft.com/office/powerpoint/2015/main" val="1"/>
+              </p:ext>
+            </p:extLst>
+          </p:nvPr>
+        </p:nvSpPr>
+        <p:spPr>
+          <a:xfrm>
+            <a:off x="3048" y="0"/>
+            <a:ext cx="12188952" cy="6858000"/>
+          </a:xfrm>
+          <a:prstGeom prst="rect">
+            <a:avLst/>
+          </a:prstGeom>
+          <a:solidFill>
+            <a:schemeClr val="bg2">
+              <a:lumMod val="90000"/>
+              <a:alpha val="70000"/>
+            </a:schemeClr>
+          </a:solidFill>
+          <a:ln>
+            <a:noFill/>
+          </a:ln>
+        </p:spPr>
+        <p:style>
+          <a:lnRef idx="2">
+            <a:schemeClr val="accent1">
+              <a:shade val="50000"/>
+            </a:schemeClr>
+          </a:lnRef>
+          <a:fillRef idx="1">
+            <a:schemeClr val="accent1"/>
+          </a:fillRef>
+          <a:effectRef idx="0">
+            <a:schemeClr val="accent1"/>
+          </a:effectRef>
+          <a:fontRef idx="minor">
+            <a:schemeClr val="lt1"/>
+          </a:fontRef>
+        </p:style>
+        <p:txBody>
+          <a:bodyPr rtlCol="0" anchor="ctr"/>
+          <a:lstStyle/>
+          <a:p>
+            <a:pPr algn="ctr"/>
+            <a:endParaRPr lang="en-US">
+              <a:solidFill>
+                <a:schemeClr val="tx1">
+                  <a:lumMod val="65000"/>
+                  <a:lumOff val="35000"/>
+                </a:schemeClr>
+              </a:solidFill>
+              <a:latin typeface="AvenirNext LT Pro Medium" panose="020B0504020202020204" pitchFamily="34" charset="0"/>
+            </a:endParaRPr>
+          </a:p>
+        </p:txBody>
+      </p:sp>
+      <p:grpSp>
+        <p:nvGrpSpPr>
+          <p:cNvPr id="27" name="Group 26">
+            <a:extLst>
+              <a:ext uri="{FF2B5EF4-FFF2-40B4-BE49-F238E27FC236}">
+                <a16:creationId xmlns:a16="http://schemas.microsoft.com/office/drawing/2014/main" id="{F54E156B-C3CF-4290-AAE3-FA3BD6BE8456}"/>
+              </a:ext>
+              <a:ext uri="{C183D7F6-B498-43B3-948B-1728B52AA6E4}">
+                <adec:decorative xmlns:adec="http://schemas.microsoft.com/office/drawing/2017/decorative" val="1"/>
+              </a:ext>
+            </a:extLst>
+          </p:cNvPr>
+          <p:cNvGrpSpPr>
+            <a:grpSpLocks noGrp="1" noUngrp="1" noRot="1" noChangeAspect="1" noMove="1" noResize="1"/>
+          </p:cNvGrpSpPr>
+          <p:nvPr>
+            <p:extLst>
+              <p:ext uri="{386F3935-93C4-4BCD-93E2-E3B085C9AB24}">
+                <p16:designElem xmlns:p16="http://schemas.microsoft.com/office/powerpoint/2015/main" val="1"/>
+              </p:ext>
+            </p:extLst>
+          </p:nvPr>
+        </p:nvGrpSpPr>
+        <p:grpSpPr>
+          <a:xfrm>
+            <a:off x="4464881" y="0"/>
+            <a:ext cx="7724071" cy="6858000"/>
+            <a:chOff x="4464881" y="0"/>
+            <a:chExt cx="7724071" cy="6858000"/>
+          </a:xfrm>
+        </p:grpSpPr>
+        <p:pic>
+          <p:nvPicPr>
+            <p:cNvPr id="28" name="Picture 27">
+              <a:extLst>
+                <a:ext uri="{FF2B5EF4-FFF2-40B4-BE49-F238E27FC236}">
+                  <a16:creationId xmlns:a16="http://schemas.microsoft.com/office/drawing/2014/main" id="{886638AD-AE91-49BD-AE6F-DA6DD5FCBA88}"/>
+                </a:ext>
+                <a:ext uri="{C183D7F6-B498-43B3-948B-1728B52AA6E4}">
+                  <adec:decorative xmlns:adec="http://schemas.microsoft.com/office/drawing/2017/decorative" val="1"/>
+                </a:ext>
+              </a:extLst>
+            </p:cNvPr>
+            <p:cNvPicPr>
+              <a:picLocks noChangeAspect="1"/>
+            </p:cNvPicPr>
+            <p:nvPr>
+              <p:extLst>
+                <p:ext uri="{386F3935-93C4-4BCD-93E2-E3B085C9AB24}">
+                  <p16:designElem xmlns:p16="http://schemas.microsoft.com/office/powerpoint/2015/main" val="1"/>
+                </p:ext>
+              </p:extLst>
+            </p:nvPr>
+          </p:nvPicPr>
+          <p:blipFill>
+            <a:blip r:embed="rId2">
+              <a:duotone>
+                <a:schemeClr val="accent6">
+                  <a:shade val="45000"/>
+                  <a:satMod val="135000"/>
+                </a:schemeClr>
+                <a:prstClr val="white"/>
+              </a:duotone>
+              <a:alphaModFix amt="15000"/>
+              <a:extLst>
+                <a:ext uri="{28A0092B-C50C-407E-A947-70E740481C1C}">
+                  <a14:useLocalDpi xmlns:a14="http://schemas.microsoft.com/office/drawing/2010/main" val="0"/>
+                </a:ext>
+              </a:extLst>
+            </a:blip>
+            <a:stretch>
+              <a:fillRect/>
+            </a:stretch>
+          </p:blipFill>
+          <p:spPr>
+            <a:xfrm>
+              <a:off x="7073255" y="0"/>
+              <a:ext cx="5115697" cy="6858000"/>
+            </a:xfrm>
+            <a:prstGeom prst="rect">
+              <a:avLst/>
+            </a:prstGeom>
+          </p:spPr>
+        </p:pic>
+        <p:pic>
+          <p:nvPicPr>
+            <p:cNvPr id="29" name="Picture 28">
+              <a:extLst>
+                <a:ext uri="{FF2B5EF4-FFF2-40B4-BE49-F238E27FC236}">
+                  <a16:creationId xmlns:a16="http://schemas.microsoft.com/office/drawing/2014/main" id="{367238FA-4030-4D69-9A1A-42918D7BB8D3}"/>
+                </a:ext>
+                <a:ext uri="{C183D7F6-B498-43B3-948B-1728B52AA6E4}">
+                  <adec:decorative xmlns:adec="http://schemas.microsoft.com/office/drawing/2017/decorative" val="1"/>
+                </a:ext>
+              </a:extLst>
+            </p:cNvPr>
+            <p:cNvPicPr>
+              <a:picLocks noChangeAspect="1"/>
+            </p:cNvPicPr>
+            <p:nvPr>
+              <p:extLst>
+                <p:ext uri="{386F3935-93C4-4BCD-93E2-E3B085C9AB24}">
+                  <p16:designElem xmlns:p16="http://schemas.microsoft.com/office/powerpoint/2015/main" val="1"/>
+                </p:ext>
+              </p:extLst>
+            </p:nvPr>
+          </p:nvPicPr>
+          <p:blipFill>
+            <a:blip r:embed="rId3">
+              <a:duotone>
+                <a:schemeClr val="accent6">
+                  <a:shade val="45000"/>
+                  <a:satMod val="135000"/>
+                </a:schemeClr>
+                <a:prstClr val="white"/>
+              </a:duotone>
+              <a:alphaModFix amt="7000"/>
+              <a:extLst>
+                <a:ext uri="{28A0092B-C50C-407E-A947-70E740481C1C}">
+                  <a14:useLocalDpi xmlns:a14="http://schemas.microsoft.com/office/drawing/2010/main" val="0"/>
+                </a:ext>
+              </a:extLst>
+            </a:blip>
+            <a:stretch>
+              <a:fillRect/>
+            </a:stretch>
+          </p:blipFill>
+          <p:spPr>
+            <a:xfrm rot="16200000">
+              <a:off x="5412135" y="-947254"/>
+              <a:ext cx="5562598" cy="7457106"/>
+            </a:xfrm>
+            <a:prstGeom prst="rect">
+              <a:avLst/>
+            </a:prstGeom>
+            <a:effectLst>
+              <a:softEdge rad="0"/>
+            </a:effectLst>
+          </p:spPr>
+        </p:pic>
+      </p:grpSp>
+      <p:sp>
+        <p:nvSpPr>
+          <p:cNvPr id="2" name="Title 1">
+            <a:extLst>
+              <a:ext uri="{FF2B5EF4-FFF2-40B4-BE49-F238E27FC236}">
+                <a16:creationId xmlns:a16="http://schemas.microsoft.com/office/drawing/2014/main" id="{88013891-86EF-454E-0A39-BC7185B11C4F}"/>
               </a:ext>
             </a:extLst>
           </p:cNvPr>
@@ -7203,107 +7539,222 @@
             <a:spLocks noGrp="1"/>
           </p:cNvSpPr>
           <p:nvPr>
-            <p:ph idx="1"/>
+            <p:ph type="title"/>
           </p:nvPr>
         </p:nvSpPr>
-        <p:spPr/>
+        <p:spPr>
+          <a:xfrm>
+            <a:off x="838200" y="461339"/>
+            <a:ext cx="5257800" cy="2831136"/>
+          </a:xfrm>
+        </p:spPr>
         <p:txBody>
-          <a:bodyPr vert="horz" lIns="91440" tIns="45720" rIns="91440" bIns="45720" rtlCol="0" anchor="t">
+          <a:bodyPr>
             <a:normAutofit/>
           </a:bodyPr>
           <a:lstStyle/>
           <a:p>
-            <a:pPr marL="0" indent="0">
-              <a:buNone/>
-            </a:pPr>
-            <a:r>
-              <a:rPr lang="en-GB"/>
-              <a:t>Rory is an idiot </a:t>
-            </a:r>
-            <a:r>
-              <a:rPr lang="en-GB">
-                <a:sym typeface="Wingdings" panose="05000000000000000000" pitchFamily="2" charset="2"/>
-              </a:rPr>
-              <a:t></a:t>
-            </a:r>
-          </a:p>
-          <a:p>
-            <a:pPr marL="0" indent="0">
-              <a:buNone/>
-            </a:pPr>
-            <a:r>
-              <a:rPr lang="en-GB">
-                <a:sym typeface="Wingdings" panose="05000000000000000000" pitchFamily="2" charset="2"/>
-              </a:rPr>
-              <a:t>All of you are idiots :) </a:t>
-            </a:r>
-            <a:endParaRPr lang="en-GB"/>
-          </a:p>
-          <a:p>
-            <a:pPr marL="0" indent="0">
-              <a:buNone/>
-            </a:pPr>
-            <a:r>
-              <a:rPr lang="en-GB"/>
-              <a:t>TRASHING BILLBOARD: place your bullshit thoughts here so we can pull it down the drain (especially you, </a:t>
-            </a:r>
-            <a:r>
-              <a:rPr lang="en-GB" err="1"/>
-              <a:t>roy</a:t>
-            </a:r>
-            <a:r>
-              <a:rPr lang="en-GB"/>
-              <a:t>) </a:t>
-            </a:r>
-          </a:p>
-          <a:p>
-            <a:pPr marL="457200" indent="-457200">
-              <a:buFont typeface="Calibri" panose="020B0604020202020204" pitchFamily="34" charset="0"/>
-              <a:buChar char="-"/>
-            </a:pPr>
-            <a:r>
-              <a:rPr lang="en-GB" i="1" err="1"/>
-              <a:t>Im</a:t>
-            </a:r>
-            <a:r>
-              <a:rPr lang="en-GB" i="1"/>
+            <a:r>
+              <a:rPr lang="fi-FI" dirty="0" err="1"/>
+              <a:t>Family</a:t>
+            </a:r>
+            <a:r>
+              <a:rPr lang="fi-FI" dirty="0"/>
+              <a:t> status and </a:t>
+            </a:r>
+            <a:r>
+              <a:rPr lang="fi-FI" dirty="0" err="1"/>
+              <a:t>Salary</a:t>
+            </a:r>
+            <a:r>
+              <a:rPr lang="fi-FI" dirty="0"/>
               <a:t> </a:t>
             </a:r>
             <a:r>
-              <a:rPr lang="en-GB" i="1" err="1"/>
-              <a:t>gonna</a:t>
-            </a:r>
-            <a:r>
-              <a:rPr lang="en-GB" i="1"/>
-              <a:t> push you around, well I will, well I will / </a:t>
-            </a:r>
-            <a:r>
-              <a:rPr lang="en-GB" i="1" err="1"/>
-              <a:t>Im</a:t>
-            </a:r>
-            <a:r>
-              <a:rPr lang="en-GB" i="1"/>
-              <a:t> </a:t>
-            </a:r>
-            <a:r>
-              <a:rPr lang="en-GB" i="1" err="1"/>
-              <a:t>gonna</a:t>
-            </a:r>
-            <a:r>
-              <a:rPr lang="en-GB" i="1"/>
-              <a:t> take you for </a:t>
-            </a:r>
-            <a:r>
-              <a:rPr lang="en-GB" i="1" err="1"/>
-              <a:t>grantererererererererered</a:t>
-            </a:r>
-            <a:r>
-              <a:rPr lang="en-GB" i="1"/>
-              <a:t> (Gregorian catholic music, cc 1504, Vatican City) </a:t>
-            </a:r>
+              <a:rPr lang="fi-FI" dirty="0" err="1"/>
+              <a:t>Satisfaction</a:t>
+            </a:r>
+            <a:r>
+              <a:rPr lang="fi-FI" dirty="0"/>
+              <a:t> (Roy)</a:t>
+            </a:r>
+            <a:endParaRPr lang="LID4096" dirty="0"/>
           </a:p>
         </p:txBody>
       </p:sp>
+      <p:pic>
+        <p:nvPicPr>
+          <p:cNvPr id="5" name="Content Placeholder 4" descr="A graph of a bar graph&#10;&#10;Description automatically generated with medium confidence">
+            <a:extLst>
+              <a:ext uri="{FF2B5EF4-FFF2-40B4-BE49-F238E27FC236}">
+                <a16:creationId xmlns:a16="http://schemas.microsoft.com/office/drawing/2014/main" id="{4F149E62-64F5-8A18-7178-7C0266DA5581}"/>
+              </a:ext>
+            </a:extLst>
+          </p:cNvPr>
+          <p:cNvPicPr>
+            <a:picLocks noChangeAspect="1"/>
+          </p:cNvPicPr>
+          <p:nvPr/>
+        </p:nvPicPr>
+        <p:blipFill rotWithShape="1">
+          <a:blip r:embed="rId4">
+            <a:extLst>
+              <a:ext uri="{28A0092B-C50C-407E-A947-70E740481C1C}">
+                <a14:useLocalDpi xmlns:a14="http://schemas.microsoft.com/office/drawing/2010/main" val="0"/>
+              </a:ext>
+            </a:extLst>
+          </a:blip>
+          <a:srcRect r="3" b="3308"/>
+          <a:stretch/>
+        </p:blipFill>
+        <p:spPr>
+          <a:xfrm>
+            <a:off x="6415635" y="477959"/>
+            <a:ext cx="5296838" cy="3764502"/>
+          </a:xfrm>
+          <a:prstGeom prst="rect">
+            <a:avLst/>
+          </a:prstGeom>
+        </p:spPr>
+      </p:pic>
+      <p:sp>
+        <p:nvSpPr>
+          <p:cNvPr id="9" name="Content Placeholder 8">
+            <a:extLst>
+              <a:ext uri="{FF2B5EF4-FFF2-40B4-BE49-F238E27FC236}">
+                <a16:creationId xmlns:a16="http://schemas.microsoft.com/office/drawing/2014/main" id="{A751F638-9411-D00F-1726-CFD6AAA8845B}"/>
+              </a:ext>
+            </a:extLst>
+          </p:cNvPr>
+          <p:cNvSpPr>
+            <a:spLocks noGrp="1"/>
+          </p:cNvSpPr>
+          <p:nvPr>
+            <p:ph idx="1"/>
+          </p:nvPr>
+        </p:nvSpPr>
+        <p:spPr>
+          <a:xfrm>
+            <a:off x="838201" y="3429000"/>
+            <a:ext cx="5257462" cy="2585613"/>
+          </a:xfrm>
+        </p:spPr>
+        <p:txBody>
+          <a:bodyPr>
+            <a:normAutofit/>
+          </a:bodyPr>
+          <a:lstStyle/>
+          <a:p>
+            <a:r>
+              <a:rPr lang="en-US" sz="1800" dirty="0"/>
+              <a:t>Generally, people are not satisfied with their salary, majority being “very unsatisfied”</a:t>
+            </a:r>
+          </a:p>
+          <a:p>
+            <a:r>
+              <a:rPr lang="en-US" sz="1800"/>
+              <a:t>P </a:t>
+            </a:r>
+            <a:r>
+              <a:rPr lang="en-US" sz="1800" dirty="0"/>
+              <a:t>value is ~0.29 and it makes this comparison insignificant</a:t>
+            </a:r>
+          </a:p>
+          <a:p>
+            <a:endParaRPr lang="en-US" sz="1800" dirty="0"/>
+          </a:p>
+        </p:txBody>
+      </p:sp>
+      <p:pic>
+        <p:nvPicPr>
+          <p:cNvPr id="7" name="Picture 6">
+            <a:extLst>
+              <a:ext uri="{FF2B5EF4-FFF2-40B4-BE49-F238E27FC236}">
+                <a16:creationId xmlns:a16="http://schemas.microsoft.com/office/drawing/2014/main" id="{C800F6F5-EBD3-B533-78F5-EAE29261AAE8}"/>
+              </a:ext>
+            </a:extLst>
+          </p:cNvPr>
+          <p:cNvPicPr>
+            <a:picLocks noChangeAspect="1"/>
+          </p:cNvPicPr>
+          <p:nvPr/>
+        </p:nvPicPr>
+        <p:blipFill>
+          <a:blip r:embed="rId5"/>
+          <a:stretch>
+            <a:fillRect/>
+          </a:stretch>
+        </p:blipFill>
+        <p:spPr>
+          <a:xfrm>
+            <a:off x="8519837" y="4536290"/>
+            <a:ext cx="3026745" cy="1116006"/>
+          </a:xfrm>
+          <a:prstGeom prst="rect">
+            <a:avLst/>
+          </a:prstGeom>
+        </p:spPr>
+      </p:pic>
+      <p:pic>
+        <p:nvPicPr>
+          <p:cNvPr id="10" name="Picture 9">
+            <a:extLst>
+              <a:ext uri="{FF2B5EF4-FFF2-40B4-BE49-F238E27FC236}">
+                <a16:creationId xmlns:a16="http://schemas.microsoft.com/office/drawing/2014/main" id="{0BFC9D82-9049-A6E7-BFFC-45D0C0449163}"/>
+              </a:ext>
+            </a:extLst>
+          </p:cNvPr>
+          <p:cNvPicPr>
+            <a:picLocks noChangeAspect="1"/>
+          </p:cNvPicPr>
+          <p:nvPr/>
+        </p:nvPicPr>
+        <p:blipFill>
+          <a:blip r:embed="rId6"/>
+          <a:stretch>
+            <a:fillRect/>
+          </a:stretch>
+        </p:blipFill>
+        <p:spPr>
+          <a:xfrm>
+            <a:off x="6415634" y="5844455"/>
+            <a:ext cx="5600988" cy="184159"/>
+          </a:xfrm>
+          <a:prstGeom prst="rect">
+            <a:avLst/>
+          </a:prstGeom>
+        </p:spPr>
+      </p:pic>
+      <p:pic>
+        <p:nvPicPr>
+          <p:cNvPr id="13" name="Picture 12">
+            <a:extLst>
+              <a:ext uri="{FF2B5EF4-FFF2-40B4-BE49-F238E27FC236}">
+                <a16:creationId xmlns:a16="http://schemas.microsoft.com/office/drawing/2014/main" id="{DA80BC7E-9CCE-6BDE-B33F-3B42045F189C}"/>
+              </a:ext>
+            </a:extLst>
+          </p:cNvPr>
+          <p:cNvPicPr>
+            <a:picLocks noChangeAspect="1"/>
+          </p:cNvPicPr>
+          <p:nvPr/>
+        </p:nvPicPr>
+        <p:blipFill>
+          <a:blip r:embed="rId7"/>
+          <a:stretch>
+            <a:fillRect/>
+          </a:stretch>
+        </p:blipFill>
+        <p:spPr>
+          <a:xfrm>
+            <a:off x="6415634" y="4383389"/>
+            <a:ext cx="1595849" cy="1367870"/>
+          </a:xfrm>
+          <a:prstGeom prst="rect">
+            <a:avLst/>
+          </a:prstGeom>
+        </p:spPr>
+      </p:pic>
     </p:spTree>
     <p:extLst>
       <p:ext uri="{BB962C8B-B14F-4D97-AF65-F5344CB8AC3E}">

</xml_diff>